<commit_message>
Removed /pmacro to many files, added _SAVE.mac to many files
</commit_message>
<xml_diff>
--- a/Macro-Mania.pptx
+++ b/Macro-Mania.pptx
@@ -6521,12 +6521,6 @@
         <p:txBody>
           <a:bodyPr/>
           <a:lstStyle/>
-          <a:p>
-            <a:r>
-              <a:rPr lang="en-US" dirty="0" smtClean="0"/>
-              <a:t>Making your computer do your work so you can go surfing</a:t>
-            </a:r>
-          </a:p>
           <a:p>
             <a:endParaRPr lang="en-US" dirty="0" smtClean="0"/>
           </a:p>
@@ -8118,11 +8112,7 @@
             <a:pPr algn="r"/>
             <a:r>
               <a:rPr lang="en-US" sz="1600" dirty="0" smtClean="0"/>
-              <a:t>“</a:t>
-            </a:r>
-            <a:r>
-              <a:rPr lang="en-US" sz="1600" dirty="0" smtClean="0"/>
-              <a:t>Think: </a:t>
+              <a:t>“Think: </a:t>
             </a:r>
             <a:r>
               <a:rPr lang="en-US" sz="1600" dirty="0" smtClean="0">
@@ -9149,7 +9139,15 @@
           <a:p>
             <a:r>
               <a:rPr lang="en-US" dirty="0" smtClean="0"/>
-              <a:t>Does anyone headers?</a:t>
+              <a:t>Does </a:t>
+            </a:r>
+            <a:r>
+              <a:rPr lang="en-US" dirty="0" smtClean="0"/>
+              <a:t>anyone read </a:t>
+            </a:r>
+            <a:r>
+              <a:rPr lang="en-US" dirty="0" smtClean="0"/>
+              <a:t>headers?</a:t>
             </a:r>
             <a:endParaRPr lang="en-US" dirty="0"/>
           </a:p>
@@ -9222,11 +9220,7 @@
             <a:pPr algn="r"/>
             <a:r>
               <a:rPr lang="en-US" sz="1600" dirty="0" smtClean="0"/>
-              <a:t>“</a:t>
-            </a:r>
-            <a:r>
-              <a:rPr lang="en-US" sz="1600" dirty="0" smtClean="0"/>
-              <a:t>Think: </a:t>
+              <a:t>“Think: </a:t>
             </a:r>
             <a:r>
               <a:rPr lang="en-US" sz="1600" dirty="0" smtClean="0">
@@ -9507,7 +9501,15 @@
           <a:p>
             <a:r>
               <a:rPr lang="en-US" dirty="0" smtClean="0"/>
-              <a:t>Does anyone headers?</a:t>
+              <a:t>Does </a:t>
+            </a:r>
+            <a:r>
+              <a:rPr lang="en-US" dirty="0" smtClean="0"/>
+              <a:t>anyone read </a:t>
+            </a:r>
+            <a:r>
+              <a:rPr lang="en-US" dirty="0" smtClean="0"/>
+              <a:t>headers?</a:t>
             </a:r>
             <a:endParaRPr lang="en-US" dirty="0"/>
           </a:p>
@@ -9578,11 +9580,7 @@
             <a:pPr algn="r"/>
             <a:r>
               <a:rPr lang="en-US" sz="1600" dirty="0" smtClean="0"/>
-              <a:t>“</a:t>
-            </a:r>
-            <a:r>
-              <a:rPr lang="en-US" sz="1600" dirty="0" smtClean="0"/>
-              <a:t>Think: </a:t>
+              <a:t>“Think: </a:t>
             </a:r>
             <a:r>
               <a:rPr lang="en-US" sz="1600" dirty="0" smtClean="0">
@@ -9641,7 +9639,7 @@
         <p:spPr>
           <a:xfrm>
             <a:off x="155275" y="2145109"/>
-            <a:ext cx="3381555" cy="1015663"/>
+            <a:ext cx="3381555" cy="769441"/>
           </a:xfrm>
           <a:prstGeom prst="rect">
             <a:avLst/>
@@ -9655,10 +9653,10 @@
           <a:lstStyle/>
           <a:p>
             <a:r>
-              <a:rPr lang="en-US" sz="6000" dirty="0" smtClean="0"/>
+              <a:rPr lang="en-US" sz="4400" dirty="0" smtClean="0"/>
               <a:t>_FRONT</a:t>
             </a:r>
-            <a:endParaRPr lang="en-US" sz="6000" dirty="0"/>
+            <a:endParaRPr lang="en-US" sz="4400" dirty="0"/>
           </a:p>
         </p:txBody>
       </p:sp>
@@ -9670,8 +9668,8 @@
         </p:nvSpPr>
         <p:spPr>
           <a:xfrm>
-            <a:off x="155268" y="3065267"/>
-            <a:ext cx="2700075" cy="1015663"/>
+            <a:off x="181147" y="2858233"/>
+            <a:ext cx="2700075" cy="769441"/>
           </a:xfrm>
           <a:prstGeom prst="rect">
             <a:avLst/>
@@ -9685,10 +9683,10 @@
           <a:lstStyle/>
           <a:p>
             <a:r>
-              <a:rPr lang="en-US" sz="6000" dirty="0" smtClean="0"/>
+              <a:rPr lang="en-US" sz="4400" dirty="0" smtClean="0"/>
               <a:t>_TOP</a:t>
             </a:r>
-            <a:endParaRPr lang="en-US" sz="6000" dirty="0"/>
+            <a:endParaRPr lang="en-US" sz="4400" dirty="0"/>
           </a:p>
         </p:txBody>
       </p:sp>
@@ -9700,7 +9698,7 @@
         </p:nvSpPr>
         <p:spPr>
           <a:xfrm>
-            <a:off x="5158596" y="1984080"/>
+            <a:off x="5331123" y="1854684"/>
             <a:ext cx="3355676" cy="523220"/>
           </a:xfrm>
           <a:prstGeom prst="rect">
@@ -9753,8 +9751,8 @@
         </p:nvSpPr>
         <p:spPr>
           <a:xfrm>
-            <a:off x="155276" y="4045808"/>
-            <a:ext cx="1854680" cy="1015663"/>
+            <a:off x="198408" y="3554102"/>
+            <a:ext cx="1854680" cy="769441"/>
           </a:xfrm>
           <a:prstGeom prst="rect">
             <a:avLst/>
@@ -9768,10 +9766,10 @@
           <a:lstStyle/>
           <a:p>
             <a:r>
-              <a:rPr lang="en-US" sz="6000" dirty="0" smtClean="0"/>
+              <a:rPr lang="en-US" sz="4400" dirty="0" smtClean="0"/>
               <a:t>_FIT</a:t>
             </a:r>
-            <a:endParaRPr lang="en-US" sz="6000" dirty="0"/>
+            <a:endParaRPr lang="en-US" sz="4400" dirty="0"/>
           </a:p>
         </p:txBody>
       </p:sp>
@@ -9783,7 +9781,7 @@
         </p:nvSpPr>
         <p:spPr>
           <a:xfrm>
-            <a:off x="3280807" y="4590070"/>
+            <a:off x="2271513" y="3960342"/>
             <a:ext cx="2501006" cy="369332"/>
           </a:xfrm>
           <a:prstGeom prst="rect">
@@ -9804,15 +9802,7 @@
             </a:r>
             <a:r>
               <a:rPr lang="en-US" dirty="0" smtClean="0"/>
-              <a:t> fit model </a:t>
-            </a:r>
-            <a:r>
-              <a:rPr lang="en-US" dirty="0" smtClean="0"/>
-              <a:t>in the </a:t>
-            </a:r>
-            <a:r>
-              <a:rPr lang="en-US" dirty="0" smtClean="0"/>
-              <a:t>view</a:t>
+              <a:t> fit model in the view</a:t>
             </a:r>
             <a:endParaRPr lang="en-US" dirty="0"/>
           </a:p>
@@ -9826,8 +9816,8 @@
         </p:nvSpPr>
         <p:spPr>
           <a:xfrm>
-            <a:off x="3289433" y="3580775"/>
-            <a:ext cx="3065263" cy="369332"/>
+            <a:off x="2271513" y="3227091"/>
+            <a:ext cx="2749471" cy="338554"/>
           </a:xfrm>
           <a:prstGeom prst="rect">
             <a:avLst/>
@@ -9840,16 +9830,16 @@
           <a:lstStyle/>
           <a:p>
             <a:r>
-              <a:rPr lang="en-US" dirty="0" smtClean="0">
+              <a:rPr lang="en-US" sz="1600" dirty="0" smtClean="0">
                 <a:sym typeface="Wingdings" pitchFamily="2" charset="2"/>
               </a:rPr>
               <a:t></a:t>
             </a:r>
             <a:r>
-              <a:rPr lang="en-US" dirty="0" smtClean="0"/>
+              <a:rPr lang="en-US" sz="1600" dirty="0" smtClean="0"/>
               <a:t> view model from the front</a:t>
             </a:r>
-            <a:endParaRPr lang="en-US" dirty="0"/>
+            <a:endParaRPr lang="en-US" sz="1600" dirty="0"/>
           </a:p>
         </p:txBody>
       </p:sp>
@@ -9861,8 +9851,8 @@
         </p:nvSpPr>
         <p:spPr>
           <a:xfrm>
-            <a:off x="3289433" y="2649117"/>
-            <a:ext cx="3065263" cy="369332"/>
+            <a:off x="2271513" y="2493842"/>
+            <a:ext cx="2749471" cy="338554"/>
           </a:xfrm>
           <a:prstGeom prst="rect">
             <a:avLst/>
@@ -9875,16 +9865,16 @@
           <a:lstStyle/>
           <a:p>
             <a:r>
-              <a:rPr lang="en-US" dirty="0" smtClean="0">
+              <a:rPr lang="en-US" sz="1600" dirty="0" smtClean="0">
                 <a:sym typeface="Wingdings" pitchFamily="2" charset="2"/>
               </a:rPr>
               <a:t></a:t>
             </a:r>
             <a:r>
-              <a:rPr lang="en-US" dirty="0" smtClean="0"/>
+              <a:rPr lang="en-US" sz="1600" dirty="0" smtClean="0"/>
               <a:t> view model from the front</a:t>
             </a:r>
-            <a:endParaRPr lang="en-US" dirty="0"/>
+            <a:endParaRPr lang="en-US" sz="1600" dirty="0"/>
           </a:p>
         </p:txBody>
       </p:sp>
@@ -9993,7 +9983,7 @@
         </p:nvSpPr>
         <p:spPr>
           <a:xfrm>
-            <a:off x="457200" y="6132274"/>
+            <a:off x="439948" y="6184032"/>
             <a:ext cx="1035170" cy="253916"/>
           </a:xfrm>
           <a:prstGeom prst="rect">
@@ -10008,11 +9998,7 @@
           <a:p>
             <a:r>
               <a:rPr lang="en-US" sz="1050" b="1" dirty="0" smtClean="0"/>
-              <a:t>Guru Bonus</a:t>
-            </a:r>
-            <a:r>
-              <a:rPr lang="en-US" sz="1050" b="1" dirty="0" smtClean="0"/>
-              <a:t>:</a:t>
+              <a:t>Guru Bonus:</a:t>
             </a:r>
             <a:endParaRPr lang="en-US" sz="1050" dirty="0"/>
           </a:p>
@@ -10041,11 +10027,7 @@
           <a:p>
             <a:r>
               <a:rPr lang="en-US" sz="1100" dirty="0" smtClean="0"/>
-              <a:t>I </a:t>
-            </a:r>
-            <a:r>
-              <a:rPr lang="en-US" sz="1100" dirty="0" smtClean="0"/>
-              <a:t>have one of the extra buttons on my mouse set to “return” that way in order to quickly refresh the screen, all I have to do is type “g” and press a button, Horary </a:t>
+              <a:t>I have one of the extra buttons on my mouse set to “return” that way in order to quickly refresh the screen, all I have to do is type “g” and press a button, Horary </a:t>
             </a:r>
             <a:r>
               <a:rPr lang="en-US" sz="1100" dirty="0" err="1" smtClean="0"/>
@@ -10082,13 +10064,138 @@
           <a:p>
             <a:r>
               <a:rPr lang="en-US" sz="1100" dirty="0" smtClean="0"/>
-              <a:t>You may think it’s crazy to create a macro that does exactly the same thing as /rep, however, those typing those extra letters ads up. </a:t>
-            </a:r>
-            <a:r>
-              <a:rPr lang="en-US" sz="1100" dirty="0" smtClean="0"/>
-              <a:t>I chose g because it’s not used for anything else, and it’s on the home row.</a:t>
-            </a:r>
-            <a:endParaRPr lang="en-US" sz="1100" dirty="0" smtClean="0"/>
+              <a:t>You may think it’s crazy to create a macro that does exactly the same thing as /rep, however, those typing those extra letters ads up. I chose g because it’s not used for anything else, and it’s on the home row.</a:t>
+            </a:r>
+          </a:p>
+        </p:txBody>
+      </p:sp>
+      <p:sp>
+        <p:nvSpPr>
+          <p:cNvPr id="19" name="TextBox 18"/>
+          <p:cNvSpPr txBox="1"/>
+          <p:nvPr/>
+        </p:nvSpPr>
+        <p:spPr>
+          <a:xfrm>
+            <a:off x="195531" y="4316091"/>
+            <a:ext cx="3381555" cy="769441"/>
+          </a:xfrm>
+          <a:prstGeom prst="rect">
+            <a:avLst/>
+          </a:prstGeom>
+          <a:noFill/>
+        </p:spPr>
+        <p:txBody>
+          <a:bodyPr wrap="square" rtlCol="0">
+            <a:spAutoFit/>
+          </a:bodyPr>
+          <a:lstStyle/>
+          <a:p>
+            <a:r>
+              <a:rPr lang="en-US" sz="4400" dirty="0" smtClean="0"/>
+              <a:t>_RIGHT</a:t>
+            </a:r>
+            <a:endParaRPr lang="en-US" sz="4400" dirty="0"/>
+          </a:p>
+        </p:txBody>
+      </p:sp>
+      <p:sp>
+        <p:nvSpPr>
+          <p:cNvPr id="23" name="TextBox 22"/>
+          <p:cNvSpPr txBox="1"/>
+          <p:nvPr/>
+        </p:nvSpPr>
+        <p:spPr>
+          <a:xfrm>
+            <a:off x="4741645" y="4316091"/>
+            <a:ext cx="2700075" cy="769441"/>
+          </a:xfrm>
+          <a:prstGeom prst="rect">
+            <a:avLst/>
+          </a:prstGeom>
+          <a:noFill/>
+        </p:spPr>
+        <p:txBody>
+          <a:bodyPr wrap="square" rtlCol="0">
+            <a:spAutoFit/>
+          </a:bodyPr>
+          <a:lstStyle/>
+          <a:p>
+            <a:r>
+              <a:rPr lang="en-US" sz="4400" dirty="0" smtClean="0"/>
+              <a:t>_LEFT</a:t>
+            </a:r>
+            <a:endParaRPr lang="en-US" sz="4400" dirty="0"/>
+          </a:p>
+        </p:txBody>
+      </p:sp>
+      <p:sp>
+        <p:nvSpPr>
+          <p:cNvPr id="24" name="Rectangle 23"/>
+          <p:cNvSpPr/>
+          <p:nvPr/>
+        </p:nvSpPr>
+        <p:spPr>
+          <a:xfrm>
+            <a:off x="6394529" y="4695653"/>
+            <a:ext cx="2749471" cy="338554"/>
+          </a:xfrm>
+          <a:prstGeom prst="rect">
+            <a:avLst/>
+          </a:prstGeom>
+        </p:spPr>
+        <p:txBody>
+          <a:bodyPr wrap="none">
+            <a:spAutoFit/>
+          </a:bodyPr>
+          <a:lstStyle/>
+          <a:p>
+            <a:r>
+              <a:rPr lang="en-US" sz="1600" dirty="0" smtClean="0">
+                <a:sym typeface="Wingdings" pitchFamily="2" charset="2"/>
+              </a:rPr>
+              <a:t></a:t>
+            </a:r>
+            <a:r>
+              <a:rPr lang="en-US" sz="1600" dirty="0" smtClean="0"/>
+              <a:t> view model from the front</a:t>
+            </a:r>
+            <a:endParaRPr lang="en-US" sz="1600" dirty="0"/>
+          </a:p>
+        </p:txBody>
+      </p:sp>
+      <p:sp>
+        <p:nvSpPr>
+          <p:cNvPr id="25" name="Rectangle 24"/>
+          <p:cNvSpPr/>
+          <p:nvPr/>
+        </p:nvSpPr>
+        <p:spPr>
+          <a:xfrm>
+            <a:off x="2277263" y="4695653"/>
+            <a:ext cx="2419252" cy="307777"/>
+          </a:xfrm>
+          <a:prstGeom prst="rect">
+            <a:avLst/>
+          </a:prstGeom>
+        </p:spPr>
+        <p:txBody>
+          <a:bodyPr wrap="none">
+            <a:spAutoFit/>
+          </a:bodyPr>
+          <a:lstStyle/>
+          <a:p>
+            <a:r>
+              <a:rPr lang="en-US" sz="1400" dirty="0" smtClean="0">
+                <a:sym typeface="Wingdings" pitchFamily="2" charset="2"/>
+              </a:rPr>
+              <a:t></a:t>
+            </a:r>
+            <a:r>
+              <a:rPr lang="en-US" sz="1400" dirty="0" smtClean="0"/>
+              <a:t> view model from the front</a:t>
+            </a:r>
+            <a:endParaRPr lang="en-US" sz="1400" dirty="0"/>
           </a:p>
         </p:txBody>
       </p:sp>
@@ -10392,7 +10499,34 @@
                                           </p:stCondLst>
                                         </p:cTn>
                                         <p:tgtEl>
-                                          <p:spTgt spid="9"/>
+                                          <p:spTgt spid="19"/>
+                                        </p:tgtEl>
+                                        <p:attrNameLst>
+                                          <p:attrName>style.visibility</p:attrName>
+                                        </p:attrNameLst>
+                                      </p:cBhvr>
+                                      <p:to>
+                                        <p:strVal val="visible"/>
+                                      </p:to>
+                                    </p:set>
+                                  </p:childTnLst>
+                                </p:cTn>
+                              </p:par>
+                              <p:par>
+                                <p:cTn id="29" presetID="1" presetClass="entr" presetSubtype="0" fill="hold" grpId="0" nodeType="withEffect">
+                                  <p:stCondLst>
+                                    <p:cond delay="0"/>
+                                  </p:stCondLst>
+                                  <p:childTnLst>
+                                    <p:set>
+                                      <p:cBhvr>
+                                        <p:cTn id="30" dur="1" fill="hold">
+                                          <p:stCondLst>
+                                            <p:cond delay="0"/>
+                                          </p:stCondLst>
+                                        </p:cTn>
+                                        <p:tgtEl>
+                                          <p:spTgt spid="25"/>
                                         </p:tgtEl>
                                         <p:attrNameLst>
                                           <p:attrName>style.visibility</p:attrName>
@@ -10412,32 +10546,32 @@
                     </p:cTn>
                   </p:par>
                   <p:par>
-                    <p:cTn id="29" fill="hold">
+                    <p:cTn id="31" fill="hold">
                       <p:stCondLst>
                         <p:cond delay="indefinite"/>
                       </p:stCondLst>
                       <p:childTnLst>
                         <p:par>
-                          <p:cTn id="30" fill="hold">
+                          <p:cTn id="32" fill="hold">
                             <p:stCondLst>
                               <p:cond delay="0"/>
                             </p:stCondLst>
                             <p:childTnLst>
                               <p:par>
-                                <p:cTn id="31" presetID="1" presetClass="entr" presetSubtype="0" fill="hold" grpId="0" nodeType="clickEffect">
+                                <p:cTn id="33" presetID="1" presetClass="entr" presetSubtype="0" fill="hold" grpId="0" nodeType="clickEffect">
                                   <p:stCondLst>
                                     <p:cond delay="0"/>
                                   </p:stCondLst>
                                   <p:childTnLst>
                                     <p:set>
                                       <p:cBhvr>
-                                        <p:cTn id="32" dur="1" fill="hold">
+                                        <p:cTn id="34" dur="1" fill="hold">
                                           <p:stCondLst>
                                             <p:cond delay="0"/>
                                           </p:stCondLst>
                                         </p:cTn>
                                         <p:tgtEl>
-                                          <p:spTgt spid="14"/>
+                                          <p:spTgt spid="23"/>
                                         </p:tgtEl>
                                         <p:attrNameLst>
                                           <p:attrName>style.visibility</p:attrName>
@@ -10451,20 +10585,20 @@
                                 </p:cTn>
                               </p:par>
                               <p:par>
-                                <p:cTn id="33" presetID="1" presetClass="entr" presetSubtype="0" fill="hold" grpId="0" nodeType="withEffect">
+                                <p:cTn id="35" presetID="1" presetClass="entr" presetSubtype="0" fill="hold" grpId="0" nodeType="withEffect">
                                   <p:stCondLst>
                                     <p:cond delay="0"/>
                                   </p:stCondLst>
                                   <p:childTnLst>
                                     <p:set>
                                       <p:cBhvr>
-                                        <p:cTn id="34" dur="1" fill="hold">
+                                        <p:cTn id="36" dur="1" fill="hold">
                                           <p:stCondLst>
                                             <p:cond delay="0"/>
                                           </p:stCondLst>
                                         </p:cTn>
                                         <p:tgtEl>
-                                          <p:spTgt spid="16"/>
+                                          <p:spTgt spid="24"/>
                                         </p:tgtEl>
                                         <p:attrNameLst>
                                           <p:attrName>style.visibility</p:attrName>
@@ -10484,46 +10618,19 @@
                     </p:cTn>
                   </p:par>
                   <p:par>
-                    <p:cTn id="35" fill="hold">
+                    <p:cTn id="37" fill="hold">
                       <p:stCondLst>
                         <p:cond delay="indefinite"/>
                       </p:stCondLst>
                       <p:childTnLst>
                         <p:par>
-                          <p:cTn id="36" fill="hold">
+                          <p:cTn id="38" fill="hold">
                             <p:stCondLst>
                               <p:cond delay="0"/>
                             </p:stCondLst>
                             <p:childTnLst>
                               <p:par>
-                                <p:cTn id="37" presetID="1" presetClass="entr" presetSubtype="0" fill="hold" grpId="0" nodeType="clickEffect">
-                                  <p:stCondLst>
-                                    <p:cond delay="0"/>
-                                  </p:stCondLst>
-                                  <p:childTnLst>
-                                    <p:set>
-                                      <p:cBhvr>
-                                        <p:cTn id="38" dur="1" fill="hold">
-                                          <p:stCondLst>
-                                            <p:cond delay="0"/>
-                                          </p:stCondLst>
-                                        </p:cTn>
-                                        <p:tgtEl>
-                                          <p:spTgt spid="17"/>
-                                        </p:tgtEl>
-                                        <p:attrNameLst>
-                                          <p:attrName>style.visibility</p:attrName>
-                                        </p:attrNameLst>
-                                      </p:cBhvr>
-                                      <p:to>
-                                        <p:strVal val="visible"/>
-                                      </p:to>
-                                    </p:set>
-                                  </p:childTnLst>
-                                </p:cTn>
-                              </p:par>
-                              <p:par>
-                                <p:cTn id="39" presetID="1" presetClass="entr" presetSubtype="0" fill="hold" grpId="0" nodeType="withEffect">
+                                <p:cTn id="39" presetID="1" presetClass="entr" presetSubtype="0" fill="hold" grpId="0" nodeType="clickEffect">
                                   <p:stCondLst>
                                     <p:cond delay="0"/>
                                   </p:stCondLst>
@@ -10536,7 +10643,7 @@
                                           </p:stCondLst>
                                         </p:cTn>
                                         <p:tgtEl>
-                                          <p:spTgt spid="22"/>
+                                          <p:spTgt spid="9"/>
                                         </p:tgtEl>
                                         <p:attrNameLst>
                                           <p:attrName>style.visibility</p:attrName>
@@ -10581,7 +10688,7 @@
                                           </p:stCondLst>
                                         </p:cTn>
                                         <p:tgtEl>
-                                          <p:spTgt spid="20"/>
+                                          <p:spTgt spid="14"/>
                                         </p:tgtEl>
                                         <p:attrNameLst>
                                           <p:attrName>style.visibility</p:attrName>
@@ -10603,6 +10710,150 @@
                                     <p:set>
                                       <p:cBhvr>
                                         <p:cTn id="46" dur="1" fill="hold">
+                                          <p:stCondLst>
+                                            <p:cond delay="0"/>
+                                          </p:stCondLst>
+                                        </p:cTn>
+                                        <p:tgtEl>
+                                          <p:spTgt spid="16"/>
+                                        </p:tgtEl>
+                                        <p:attrNameLst>
+                                          <p:attrName>style.visibility</p:attrName>
+                                        </p:attrNameLst>
+                                      </p:cBhvr>
+                                      <p:to>
+                                        <p:strVal val="visible"/>
+                                      </p:to>
+                                    </p:set>
+                                  </p:childTnLst>
+                                </p:cTn>
+                              </p:par>
+                            </p:childTnLst>
+                          </p:cTn>
+                        </p:par>
+                      </p:childTnLst>
+                    </p:cTn>
+                  </p:par>
+                  <p:par>
+                    <p:cTn id="47" fill="hold">
+                      <p:stCondLst>
+                        <p:cond delay="indefinite"/>
+                      </p:stCondLst>
+                      <p:childTnLst>
+                        <p:par>
+                          <p:cTn id="48" fill="hold">
+                            <p:stCondLst>
+                              <p:cond delay="0"/>
+                            </p:stCondLst>
+                            <p:childTnLst>
+                              <p:par>
+                                <p:cTn id="49" presetID="1" presetClass="entr" presetSubtype="0" fill="hold" grpId="0" nodeType="clickEffect">
+                                  <p:stCondLst>
+                                    <p:cond delay="0"/>
+                                  </p:stCondLst>
+                                  <p:childTnLst>
+                                    <p:set>
+                                      <p:cBhvr>
+                                        <p:cTn id="50" dur="1" fill="hold">
+                                          <p:stCondLst>
+                                            <p:cond delay="0"/>
+                                          </p:stCondLst>
+                                        </p:cTn>
+                                        <p:tgtEl>
+                                          <p:spTgt spid="17"/>
+                                        </p:tgtEl>
+                                        <p:attrNameLst>
+                                          <p:attrName>style.visibility</p:attrName>
+                                        </p:attrNameLst>
+                                      </p:cBhvr>
+                                      <p:to>
+                                        <p:strVal val="visible"/>
+                                      </p:to>
+                                    </p:set>
+                                  </p:childTnLst>
+                                </p:cTn>
+                              </p:par>
+                              <p:par>
+                                <p:cTn id="51" presetID="1" presetClass="entr" presetSubtype="0" fill="hold" grpId="0" nodeType="withEffect">
+                                  <p:stCondLst>
+                                    <p:cond delay="0"/>
+                                  </p:stCondLst>
+                                  <p:childTnLst>
+                                    <p:set>
+                                      <p:cBhvr>
+                                        <p:cTn id="52" dur="1" fill="hold">
+                                          <p:stCondLst>
+                                            <p:cond delay="0"/>
+                                          </p:stCondLst>
+                                        </p:cTn>
+                                        <p:tgtEl>
+                                          <p:spTgt spid="22"/>
+                                        </p:tgtEl>
+                                        <p:attrNameLst>
+                                          <p:attrName>style.visibility</p:attrName>
+                                        </p:attrNameLst>
+                                      </p:cBhvr>
+                                      <p:to>
+                                        <p:strVal val="visible"/>
+                                      </p:to>
+                                    </p:set>
+                                  </p:childTnLst>
+                                </p:cTn>
+                              </p:par>
+                            </p:childTnLst>
+                          </p:cTn>
+                        </p:par>
+                      </p:childTnLst>
+                    </p:cTn>
+                  </p:par>
+                  <p:par>
+                    <p:cTn id="53" fill="hold">
+                      <p:stCondLst>
+                        <p:cond delay="indefinite"/>
+                      </p:stCondLst>
+                      <p:childTnLst>
+                        <p:par>
+                          <p:cTn id="54" fill="hold">
+                            <p:stCondLst>
+                              <p:cond delay="0"/>
+                            </p:stCondLst>
+                            <p:childTnLst>
+                              <p:par>
+                                <p:cTn id="55" presetID="1" presetClass="entr" presetSubtype="0" fill="hold" grpId="0" nodeType="clickEffect">
+                                  <p:stCondLst>
+                                    <p:cond delay="0"/>
+                                  </p:stCondLst>
+                                  <p:childTnLst>
+                                    <p:set>
+                                      <p:cBhvr>
+                                        <p:cTn id="56" dur="1" fill="hold">
+                                          <p:stCondLst>
+                                            <p:cond delay="0"/>
+                                          </p:stCondLst>
+                                        </p:cTn>
+                                        <p:tgtEl>
+                                          <p:spTgt spid="20"/>
+                                        </p:tgtEl>
+                                        <p:attrNameLst>
+                                          <p:attrName>style.visibility</p:attrName>
+                                        </p:attrNameLst>
+                                      </p:cBhvr>
+                                      <p:to>
+                                        <p:strVal val="visible"/>
+                                      </p:to>
+                                    </p:set>
+                                  </p:childTnLst>
+                                </p:cTn>
+                              </p:par>
+                              <p:par>
+                                <p:cTn id="57" presetID="1" presetClass="entr" presetSubtype="0" fill="hold" grpId="0" nodeType="withEffect">
+                                  <p:stCondLst>
+                                    <p:cond delay="0"/>
+                                  </p:stCondLst>
+                                  <p:childTnLst>
+                                    <p:set>
+                                      <p:cBhvr>
+                                        <p:cTn id="58" dur="1" fill="hold">
                                           <p:stCondLst>
                                             <p:cond delay="0"/>
                                           </p:stCondLst>
@@ -10663,6 +10914,10 @@
       <p:bldP spid="20" grpId="0"/>
       <p:bldP spid="21" grpId="0"/>
       <p:bldP spid="22" grpId="0"/>
+      <p:bldP spid="19" grpId="0"/>
+      <p:bldP spid="23" grpId="0"/>
+      <p:bldP spid="24" grpId="0"/>
+      <p:bldP spid="25" grpId="0"/>
     </p:bldLst>
   </p:timing>
 </p:sld>
@@ -11275,6 +11530,13 @@
   <p:clrMapOvr>
     <a:masterClrMapping/>
   </p:clrMapOvr>
+  <p:timing>
+    <p:tnLst>
+      <p:par>
+        <p:cTn id="1" dur="indefinite" restart="never" nodeType="tmRoot"/>
+      </p:par>
+    </p:tnLst>
+  </p:timing>
 </p:sld>
 </file>
 
@@ -11404,6 +11666,13 @@
   <p:clrMapOvr>
     <a:masterClrMapping/>
   </p:clrMapOvr>
+  <p:timing>
+    <p:tnLst>
+      <p:par>
+        <p:cTn id="1" dur="indefinite" restart="never" nodeType="tmRoot"/>
+      </p:par>
+    </p:tnLst>
+  </p:timing>
 </p:sld>
 </file>
 
@@ -11599,6 +11868,13 @@
   <p:clrMapOvr>
     <a:masterClrMapping/>
   </p:clrMapOvr>
+  <p:timing>
+    <p:tnLst>
+      <p:par>
+        <p:cTn id="1" dur="indefinite" restart="never" nodeType="tmRoot"/>
+      </p:par>
+    </p:tnLst>
+  </p:timing>
 </p:sld>
 </file>
 
@@ -12073,11 +12349,7 @@
           <a:p>
             <a:r>
               <a:rPr lang="en-US" sz="1600" dirty="0" smtClean="0"/>
-              <a:t>This principle states that you should have to do as little setup as possible to make something  work. Instead there should be a default, which you can customize if you want</a:t>
-            </a:r>
-            <a:r>
-              <a:rPr lang="en-US" sz="1600" dirty="0" smtClean="0"/>
-              <a:t>.</a:t>
+              <a:t>This principle states that you should have to do as little setup as possible to make something  work. Instead there should be a default, which you can customize if you want.</a:t>
             </a:r>
           </a:p>
           <a:p>
@@ -12097,7 +12369,6 @@
               <a:rPr lang="en-US" sz="1600" dirty="0" smtClean="0"/>
               <a:t> does not follow this principal.</a:t>
             </a:r>
-            <a:endParaRPr lang="en-US" sz="1600" dirty="0" smtClean="0"/>
           </a:p>
           <a:p>
             <a:endParaRPr lang="en-US" sz="1600" dirty="0"/>
@@ -12618,29 +12889,8 @@
                   <a:schemeClr val="bg1"/>
                 </a:solidFill>
               </a:rPr>
-              <a:t>10+ </a:t>
-            </a:r>
-            <a:r>
-              <a:rPr lang="en-US" sz="1400" dirty="0" smtClean="0">
-                <a:solidFill>
-                  <a:schemeClr val="bg1"/>
-                </a:solidFill>
-              </a:rPr>
-              <a:t>Mouse Clicks, plus thinking which button to </a:t>
-            </a:r>
-            <a:r>
-              <a:rPr lang="en-US" sz="1400" dirty="0" smtClean="0">
-                <a:solidFill>
-                  <a:schemeClr val="bg1"/>
-                </a:solidFill>
-              </a:rPr>
-              <a:t>press.</a:t>
-            </a:r>
-            <a:endParaRPr lang="en-US" sz="1400" dirty="0" smtClean="0">
-              <a:solidFill>
-                <a:schemeClr val="bg1"/>
-              </a:solidFill>
-            </a:endParaRPr>
+              <a:t>10+ Mouse Clicks, plus thinking which button to press.</a:t>
+            </a:r>
           </a:p>
         </p:txBody>
       </p:sp>
@@ -13212,11 +13462,7 @@
             <a:pPr algn="ctr"/>
             <a:r>
               <a:rPr lang="en-US" dirty="0" smtClean="0"/>
-              <a:t>_</a:t>
-            </a:r>
-            <a:r>
-              <a:rPr lang="en-US" dirty="0" smtClean="0"/>
-              <a:t>MAT.mac, _SAVE.mac</a:t>
+              <a:t>_MAT.mac, _SAVE.mac</a:t>
             </a:r>
             <a:endParaRPr lang="en-US" dirty="0"/>
           </a:p>
@@ -13364,8 +13610,8 @@
         </p:nvSpPr>
         <p:spPr>
           <a:xfrm>
-            <a:off x="258791" y="5322497"/>
-            <a:ext cx="8583283" cy="400110"/>
+            <a:off x="120770" y="5270738"/>
+            <a:ext cx="8902460" cy="369332"/>
           </a:xfrm>
           <a:prstGeom prst="rect">
             <a:avLst/>
@@ -13380,10 +13626,18 @@
           <a:p>
             <a:pPr algn="ctr"/>
             <a:r>
-              <a:rPr lang="en-US" sz="2000" dirty="0" smtClean="0"/>
-              <a:t>Bundles of code only depend on what is below them, not too them selves.</a:t>
-            </a:r>
-            <a:endParaRPr lang="en-US" sz="2000" dirty="0"/>
+              <a:rPr lang="en-US" dirty="0" smtClean="0"/>
+              <a:t>Bundles of </a:t>
+            </a:r>
+            <a:r>
+              <a:rPr lang="en-US" dirty="0" smtClean="0"/>
+              <a:t>code should </a:t>
+            </a:r>
+            <a:r>
+              <a:rPr lang="en-US" dirty="0" smtClean="0"/>
+              <a:t>only depend on what is below them, not too them selves.</a:t>
+            </a:r>
+            <a:endParaRPr lang="en-US" dirty="0"/>
           </a:p>
         </p:txBody>
       </p:sp>
@@ -13395,7 +13649,7 @@
         </p:nvSpPr>
         <p:spPr>
           <a:xfrm>
-            <a:off x="498892" y="5837208"/>
+            <a:off x="498892" y="5742317"/>
             <a:ext cx="8103080" cy="400110"/>
           </a:xfrm>
           <a:prstGeom prst="rect">

</xml_diff>

<commit_message>
Updates to Macro-Mania, fixed small bug in _nummrg.mac
</commit_message>
<xml_diff>
--- a/Macro-Mania.pptx
+++ b/Macro-Mania.pptx
@@ -7,10 +7,10 @@
     <p:sldMasterId id="2147483663" r:id="rId3"/>
   </p:sldMasterIdLst>
   <p:notesMasterIdLst>
-    <p:notesMasterId r:id="rId28"/>
+    <p:notesMasterId r:id="rId37"/>
   </p:notesMasterIdLst>
   <p:handoutMasterIdLst>
-    <p:handoutMasterId r:id="rId29"/>
+    <p:handoutMasterId r:id="rId38"/>
   </p:handoutMasterIdLst>
   <p:sldIdLst>
     <p:sldId id="265" r:id="rId4"/>
@@ -36,7 +36,16 @@
     <p:sldId id="294" r:id="rId24"/>
     <p:sldId id="295" r:id="rId25"/>
     <p:sldId id="296" r:id="rId26"/>
-    <p:sldId id="281" r:id="rId27"/>
+    <p:sldId id="297" r:id="rId27"/>
+    <p:sldId id="298" r:id="rId28"/>
+    <p:sldId id="299" r:id="rId29"/>
+    <p:sldId id="300" r:id="rId30"/>
+    <p:sldId id="301" r:id="rId31"/>
+    <p:sldId id="302" r:id="rId32"/>
+    <p:sldId id="303" r:id="rId33"/>
+    <p:sldId id="305" r:id="rId34"/>
+    <p:sldId id="304" r:id="rId35"/>
+    <p:sldId id="281" r:id="rId36"/>
   </p:sldIdLst>
   <p:sldSz cx="9144000" cy="6858000" type="screen4x3"/>
   <p:notesSz cx="7315200" cy="9601200"/>
@@ -20757,7 +20766,7 @@
       </p:grpSpPr>
       <p:sp>
         <p:nvSpPr>
-          <p:cNvPr id="5" name="Title 4"/>
+          <p:cNvPr id="2" name="Title 1"/>
           <p:cNvSpPr>
             <a:spLocks noGrp="1"/>
           </p:cNvSpPr>
@@ -20772,7 +20781,19 @@
           <a:p>
             <a:r>
               <a:rPr lang="en-US" dirty="0" smtClean="0"/>
-              <a:t>AWESOME, where can I find out more?</a:t>
+              <a:t>_NEXT.mac </a:t>
+            </a:r>
+            <a:r>
+              <a:rPr lang="en-US" dirty="0" smtClean="0">
+                <a:sym typeface="Wingdings" pitchFamily="2" charset="2"/>
+              </a:rPr>
+              <a:t> Next Set of </a:t>
+            </a:r>
+            <a:r>
+              <a:rPr lang="en-US" dirty="0" err="1" smtClean="0">
+                <a:sym typeface="Wingdings" pitchFamily="2" charset="2"/>
+              </a:rPr>
+              <a:t>Resutls</a:t>
             </a:r>
             <a:endParaRPr lang="en-US" dirty="0"/>
           </a:p>
@@ -20780,14 +20801,14 @@
       </p:sp>
       <p:sp>
         <p:nvSpPr>
-          <p:cNvPr id="6" name="TextBox 5"/>
+          <p:cNvPr id="3" name="TextBox 2"/>
           <p:cNvSpPr txBox="1"/>
           <p:nvPr/>
         </p:nvSpPr>
         <p:spPr>
           <a:xfrm>
-            <a:off x="181155" y="983411"/>
-            <a:ext cx="8005313" cy="738664"/>
+            <a:off x="0" y="879895"/>
+            <a:ext cx="9144000" cy="923330"/>
           </a:xfrm>
           <a:prstGeom prst="rect">
             <a:avLst/>
@@ -20801,20 +20822,97 @@
           <a:lstStyle/>
           <a:p>
             <a:r>
-              <a:rPr lang="en-US" sz="2400" dirty="0" smtClean="0"/>
-              <a:t>Header of the macros! </a:t>
-            </a:r>
-            <a:r>
-              <a:rPr lang="en-US" dirty="0" smtClean="0"/>
-              <a:t>They are there too help, if something is confusing, let me know, I’m also a decent writer and I can try to clarify.</a:t>
-            </a:r>
-            <a:endParaRPr lang="en-US" dirty="0"/>
+              <a:rPr lang="en-US" sz="5400" dirty="0" smtClean="0"/>
+              <a:t>_NEXT,</a:t>
+            </a:r>
+            <a:r>
+              <a:rPr lang="en-US" sz="2000" dirty="0" smtClean="0"/>
+              <a:t> &lt;number of steps&gt;</a:t>
+            </a:r>
+            <a:endParaRPr lang="en-US" sz="5400" dirty="0"/>
+          </a:p>
+        </p:txBody>
+      </p:sp>
+      <p:sp>
+        <p:nvSpPr>
+          <p:cNvPr id="4" name="TextBox 3"/>
+          <p:cNvSpPr txBox="1"/>
+          <p:nvPr/>
+        </p:nvSpPr>
+        <p:spPr>
+          <a:xfrm>
+            <a:off x="4226944" y="845389"/>
+            <a:ext cx="4917056" cy="338554"/>
+          </a:xfrm>
+          <a:prstGeom prst="rect">
+            <a:avLst/>
+          </a:prstGeom>
+          <a:noFill/>
+        </p:spPr>
+        <p:txBody>
+          <a:bodyPr wrap="square" rtlCol="0">
+            <a:spAutoFit/>
+          </a:bodyPr>
+          <a:lstStyle/>
+          <a:p>
+            <a:pPr algn="r"/>
+            <a:r>
+              <a:rPr lang="en-US" sz="1600" dirty="0" smtClean="0"/>
+              <a:t>“Think: </a:t>
+            </a:r>
+            <a:r>
+              <a:rPr lang="en-US" sz="1600" dirty="0" smtClean="0">
+                <a:solidFill>
+                  <a:schemeClr val="accent6">
+                    <a:lumMod val="75000"/>
+                  </a:schemeClr>
+                </a:solidFill>
+              </a:rPr>
+              <a:t>_Next </a:t>
+            </a:r>
+            <a:r>
+              <a:rPr lang="en-US" sz="1600" dirty="0" smtClean="0"/>
+              <a:t>set of results”</a:t>
+            </a:r>
+            <a:endParaRPr lang="en-US" sz="1600" dirty="0"/>
+          </a:p>
+        </p:txBody>
+      </p:sp>
+      <p:sp>
+        <p:nvSpPr>
+          <p:cNvPr id="5" name="TextBox 4"/>
+          <p:cNvSpPr txBox="1"/>
+          <p:nvPr/>
+        </p:nvSpPr>
+        <p:spPr>
+          <a:xfrm>
+            <a:off x="308344" y="1850065"/>
+            <a:ext cx="8484782" cy="307777"/>
+          </a:xfrm>
+          <a:prstGeom prst="rect">
+            <a:avLst/>
+          </a:prstGeom>
+          <a:noFill/>
+          <a:ln>
+            <a:noFill/>
+          </a:ln>
+        </p:spPr>
+        <p:txBody>
+          <a:bodyPr wrap="square" rtlCol="0">
+            <a:spAutoFit/>
+          </a:bodyPr>
+          <a:lstStyle/>
+          <a:p>
+            <a:r>
+              <a:rPr lang="en-US" sz="1400" dirty="0" smtClean="0"/>
+              <a:t>Post processing command that sets results to the next set of results</a:t>
+            </a:r>
           </a:p>
         </p:txBody>
       </p:sp>
       <p:pic>
         <p:nvPicPr>
-          <p:cNvPr id="7170" name="Picture 2"/>
+          <p:cNvPr id="1026" name="Picture 2"/>
           <p:cNvPicPr>
             <a:picLocks noChangeAspect="1" noChangeArrowheads="1"/>
           </p:cNvPicPr>
@@ -20829,8 +20927,8 @@
         </p:blipFill>
         <p:spPr bwMode="auto">
           <a:xfrm>
-            <a:off x="231652" y="1945706"/>
-            <a:ext cx="3969411" cy="2336673"/>
+            <a:off x="2640751" y="2259753"/>
+            <a:ext cx="3419807" cy="1204548"/>
           </a:xfrm>
           <a:prstGeom prst="rect">
             <a:avLst/>
@@ -20844,51 +20942,9 @@
           </a:ln>
         </p:spPr>
       </p:pic>
-      <p:sp>
-        <p:nvSpPr>
-          <p:cNvPr id="8" name="TextBox 7"/>
-          <p:cNvSpPr txBox="1"/>
-          <p:nvPr/>
-        </p:nvSpPr>
-        <p:spPr>
-          <a:xfrm>
-            <a:off x="250168" y="4666891"/>
-            <a:ext cx="3985402" cy="1292662"/>
-          </a:xfrm>
-          <a:prstGeom prst="rect">
-            <a:avLst/>
-          </a:prstGeom>
-          <a:noFill/>
-        </p:spPr>
-        <p:txBody>
-          <a:bodyPr wrap="square" rtlCol="0">
-            <a:spAutoFit/>
-          </a:bodyPr>
-          <a:lstStyle/>
-          <a:p>
-            <a:r>
-              <a:rPr lang="en-US" sz="2400" dirty="0" smtClean="0"/>
-              <a:t>__</a:t>
-            </a:r>
-            <a:r>
-              <a:rPr lang="en-US" sz="2400" dirty="0" err="1" smtClean="0"/>
-              <a:t>BensMacros.xls</a:t>
-            </a:r>
-            <a:r>
-              <a:rPr lang="en-US" sz="2400" dirty="0" smtClean="0"/>
-              <a:t> </a:t>
-            </a:r>
-            <a:r>
-              <a:rPr lang="en-US" dirty="0" smtClean="0"/>
-              <a:t>is a kind of up to date listing of all the macros with a brief description. Let me know if something is missing, I’ll fix it.</a:t>
-            </a:r>
-            <a:endParaRPr lang="en-US" dirty="0"/>
-          </a:p>
-        </p:txBody>
-      </p:sp>
       <p:pic>
         <p:nvPicPr>
-          <p:cNvPr id="7171" name="Picture 3"/>
+          <p:cNvPr id="1027" name="Picture 3"/>
           <p:cNvPicPr>
             <a:picLocks noChangeAspect="1" noChangeArrowheads="1"/>
           </p:cNvPicPr>
@@ -20903,8 +20959,8 @@
         </p:blipFill>
         <p:spPr bwMode="auto">
           <a:xfrm>
-            <a:off x="4507818" y="2242867"/>
-            <a:ext cx="4434720" cy="3571965"/>
+            <a:off x="116946" y="3657598"/>
+            <a:ext cx="3965955" cy="2764374"/>
           </a:xfrm>
           <a:prstGeom prst="rect">
             <a:avLst/>
@@ -20918,30 +20974,1994 @@
           </a:ln>
         </p:spPr>
       </p:pic>
+      <p:sp>
+        <p:nvSpPr>
+          <p:cNvPr id="9" name="TextBox 8"/>
+          <p:cNvSpPr txBox="1"/>
+          <p:nvPr/>
+        </p:nvSpPr>
+        <p:spPr>
+          <a:xfrm>
+            <a:off x="4104167" y="4253023"/>
+            <a:ext cx="956930" cy="307777"/>
+          </a:xfrm>
+          <a:prstGeom prst="rect">
+            <a:avLst/>
+          </a:prstGeom>
+          <a:solidFill>
+            <a:schemeClr val="tx1"/>
+          </a:solidFill>
+          <a:ln>
+            <a:noFill/>
+          </a:ln>
+        </p:spPr>
+        <p:txBody>
+          <a:bodyPr wrap="square" rtlCol="0">
+            <a:spAutoFit/>
+          </a:bodyPr>
+          <a:lstStyle/>
+          <a:p>
+            <a:r>
+              <a:rPr lang="en-US" sz="1400" b="1" dirty="0" smtClean="0">
+                <a:solidFill>
+                  <a:schemeClr val="accent6">
+                    <a:lumMod val="75000"/>
+                  </a:schemeClr>
+                </a:solidFill>
+              </a:rPr>
+              <a:t>_NEXT,</a:t>
+            </a:r>
+            <a:r>
+              <a:rPr lang="en-US" sz="1400" b="1" dirty="0" smtClean="0">
+                <a:solidFill>
+                  <a:schemeClr val="bg1"/>
+                </a:solidFill>
+              </a:rPr>
+              <a:t>5</a:t>
+            </a:r>
+          </a:p>
+        </p:txBody>
+      </p:sp>
+      <p:pic>
+        <p:nvPicPr>
+          <p:cNvPr id="1028" name="Picture 4"/>
+          <p:cNvPicPr>
+            <a:picLocks noChangeAspect="1" noChangeArrowheads="1"/>
+          </p:cNvPicPr>
+          <p:nvPr/>
+        </p:nvPicPr>
+        <p:blipFill>
+          <a:blip r:embed="rId4" cstate="print"/>
+          <a:srcRect/>
+          <a:stretch>
+            <a:fillRect/>
+          </a:stretch>
+        </p:blipFill>
+        <p:spPr bwMode="auto">
+          <a:xfrm>
+            <a:off x="5114817" y="3657599"/>
+            <a:ext cx="3912220" cy="2726919"/>
+          </a:xfrm>
+          <a:prstGeom prst="rect">
+            <a:avLst/>
+          </a:prstGeom>
+          <a:noFill/>
+          <a:ln w="9525">
+            <a:noFill/>
+            <a:miter lim="800000"/>
+            <a:headEnd/>
+            <a:tailEnd/>
+          </a:ln>
+        </p:spPr>
+      </p:pic>
+      <p:sp>
+        <p:nvSpPr>
+          <p:cNvPr id="11" name="Rectangle 10"/>
+          <p:cNvSpPr/>
+          <p:nvPr/>
+        </p:nvSpPr>
+        <p:spPr>
+          <a:xfrm>
+            <a:off x="786809" y="4412512"/>
+            <a:ext cx="255182" cy="276445"/>
+          </a:xfrm>
+          <a:prstGeom prst="rect">
+            <a:avLst/>
+          </a:prstGeom>
+          <a:noFill/>
+          <a:ln>
+            <a:solidFill>
+              <a:srgbClr val="C00000"/>
+            </a:solidFill>
+          </a:ln>
+        </p:spPr>
+        <p:style>
+          <a:lnRef idx="2">
+            <a:schemeClr val="accent1">
+              <a:shade val="50000"/>
+            </a:schemeClr>
+          </a:lnRef>
+          <a:fillRef idx="1">
+            <a:schemeClr val="accent1"/>
+          </a:fillRef>
+          <a:effectRef idx="0">
+            <a:schemeClr val="accent1"/>
+          </a:effectRef>
+          <a:fontRef idx="minor">
+            <a:schemeClr val="lt1"/>
+          </a:fontRef>
+        </p:style>
+        <p:txBody>
+          <a:bodyPr rtlCol="0" anchor="ctr"/>
+          <a:lstStyle/>
+          <a:p>
+            <a:pPr algn="ctr"/>
+            <a:endParaRPr lang="en-US"/>
+          </a:p>
+        </p:txBody>
+      </p:sp>
+      <p:sp>
+        <p:nvSpPr>
+          <p:cNvPr id="12" name="Rectangle 11"/>
+          <p:cNvSpPr/>
+          <p:nvPr/>
+        </p:nvSpPr>
+        <p:spPr>
+          <a:xfrm>
+            <a:off x="5777019" y="4394791"/>
+            <a:ext cx="255182" cy="276445"/>
+          </a:xfrm>
+          <a:prstGeom prst="rect">
+            <a:avLst/>
+          </a:prstGeom>
+          <a:noFill/>
+          <a:ln>
+            <a:solidFill>
+              <a:srgbClr val="C00000"/>
+            </a:solidFill>
+          </a:ln>
+        </p:spPr>
+        <p:style>
+          <a:lnRef idx="2">
+            <a:schemeClr val="accent1">
+              <a:shade val="50000"/>
+            </a:schemeClr>
+          </a:lnRef>
+          <a:fillRef idx="1">
+            <a:schemeClr val="accent1"/>
+          </a:fillRef>
+          <a:effectRef idx="0">
+            <a:schemeClr val="accent1"/>
+          </a:effectRef>
+          <a:fontRef idx="minor">
+            <a:schemeClr val="lt1"/>
+          </a:fontRef>
+        </p:style>
+        <p:txBody>
+          <a:bodyPr rtlCol="0" anchor="ctr"/>
+          <a:lstStyle/>
+          <a:p>
+            <a:pPr algn="ctr"/>
+            <a:endParaRPr lang="en-US"/>
+          </a:p>
+        </p:txBody>
+      </p:sp>
+      <p:sp>
+        <p:nvSpPr>
+          <p:cNvPr id="13" name="Right Arrow 12"/>
+          <p:cNvSpPr/>
+          <p:nvPr/>
+        </p:nvSpPr>
+        <p:spPr>
+          <a:xfrm>
+            <a:off x="4338085" y="4848446"/>
+            <a:ext cx="637953" cy="414670"/>
+          </a:xfrm>
+          <a:prstGeom prst="rightArrow">
+            <a:avLst/>
+          </a:prstGeom>
+          <a:solidFill>
+            <a:srgbClr val="FF0000"/>
+          </a:solidFill>
+          <a:ln>
+            <a:solidFill>
+              <a:srgbClr val="C00000"/>
+            </a:solidFill>
+          </a:ln>
+        </p:spPr>
+        <p:style>
+          <a:lnRef idx="2">
+            <a:schemeClr val="accent1">
+              <a:shade val="50000"/>
+            </a:schemeClr>
+          </a:lnRef>
+          <a:fillRef idx="1">
+            <a:schemeClr val="accent1"/>
+          </a:fillRef>
+          <a:effectRef idx="0">
+            <a:schemeClr val="accent1"/>
+          </a:effectRef>
+          <a:fontRef idx="minor">
+            <a:schemeClr val="lt1"/>
+          </a:fontRef>
+        </p:style>
+        <p:txBody>
+          <a:bodyPr rtlCol="0" anchor="ctr"/>
+          <a:lstStyle/>
+          <a:p>
+            <a:pPr algn="ctr"/>
+            <a:endParaRPr lang="en-US"/>
+          </a:p>
+        </p:txBody>
+      </p:sp>
+    </p:spTree>
+  </p:cSld>
+  <p:clrMapOvr>
+    <a:masterClrMapping/>
+  </p:clrMapOvr>
+  <p:timing>
+    <p:tnLst>
+      <p:par>
+        <p:cTn id="1" dur="indefinite" restart="never" nodeType="tmRoot">
+          <p:childTnLst>
+            <p:seq concurrent="1" nextAc="seek">
+              <p:cTn id="2" dur="indefinite" nodeType="mainSeq">
+                <p:childTnLst>
+                  <p:par>
+                    <p:cTn id="3" fill="hold">
+                      <p:stCondLst>
+                        <p:cond delay="indefinite"/>
+                      </p:stCondLst>
+                      <p:childTnLst>
+                        <p:par>
+                          <p:cTn id="4" fill="hold">
+                            <p:stCondLst>
+                              <p:cond delay="0"/>
+                            </p:stCondLst>
+                            <p:childTnLst>
+                              <p:par>
+                                <p:cTn id="5" presetID="1" presetClass="entr" presetSubtype="0" fill="hold" grpId="0" nodeType="clickEffect">
+                                  <p:stCondLst>
+                                    <p:cond delay="0"/>
+                                  </p:stCondLst>
+                                  <p:childTnLst>
+                                    <p:set>
+                                      <p:cBhvr>
+                                        <p:cTn id="6" dur="1" fill="hold">
+                                          <p:stCondLst>
+                                            <p:cond delay="0"/>
+                                          </p:stCondLst>
+                                        </p:cTn>
+                                        <p:tgtEl>
+                                          <p:spTgt spid="4"/>
+                                        </p:tgtEl>
+                                        <p:attrNameLst>
+                                          <p:attrName>style.visibility</p:attrName>
+                                        </p:attrNameLst>
+                                      </p:cBhvr>
+                                      <p:to>
+                                        <p:strVal val="visible"/>
+                                      </p:to>
+                                    </p:set>
+                                  </p:childTnLst>
+                                </p:cTn>
+                              </p:par>
+                            </p:childTnLst>
+                          </p:cTn>
+                        </p:par>
+                      </p:childTnLst>
+                    </p:cTn>
+                  </p:par>
+                </p:childTnLst>
+              </p:cTn>
+              <p:prevCondLst>
+                <p:cond evt="onPrev" delay="0">
+                  <p:tgtEl>
+                    <p:sldTgt/>
+                  </p:tgtEl>
+                </p:cond>
+              </p:prevCondLst>
+              <p:nextCondLst>
+                <p:cond evt="onNext" delay="0">
+                  <p:tgtEl>
+                    <p:sldTgt/>
+                  </p:tgtEl>
+                </p:cond>
+              </p:nextCondLst>
+            </p:seq>
+          </p:childTnLst>
+        </p:cTn>
+      </p:par>
+    </p:tnLst>
+    <p:bldLst>
+      <p:bldP spid="4" grpId="0"/>
+    </p:bldLst>
+  </p:timing>
+</p:sld>
+</file>
+
+<file path=ppt/slides/slide25.xml><?xml version="1.0" encoding="utf-8"?>
+<p:sld xmlns:a="http://schemas.openxmlformats.org/drawingml/2006/main" xmlns:r="http://schemas.openxmlformats.org/officeDocument/2006/relationships" xmlns:p="http://schemas.openxmlformats.org/presentationml/2006/main">
+  <p:cSld>
+    <p:spTree>
+      <p:nvGrpSpPr>
+        <p:cNvPr id="1" name=""/>
+        <p:cNvGrpSpPr/>
+        <p:nvPr/>
+      </p:nvGrpSpPr>
+      <p:grpSpPr>
+        <a:xfrm>
+          <a:off x="0" y="0"/>
+          <a:ext cx="0" cy="0"/>
+          <a:chOff x="0" y="0"/>
+          <a:chExt cx="0" cy="0"/>
+        </a:xfrm>
+      </p:grpSpPr>
+      <p:sp>
+        <p:nvSpPr>
+          <p:cNvPr id="2" name="Title 1"/>
+          <p:cNvSpPr>
+            <a:spLocks noGrp="1"/>
+          </p:cNvSpPr>
+          <p:nvPr>
+            <p:ph type="title"/>
+          </p:nvPr>
+        </p:nvSpPr>
+        <p:spPr/>
+        <p:txBody>
+          <a:bodyPr/>
+          <a:lstStyle/>
+          <a:p>
+            <a:r>
+              <a:rPr lang="en-US" dirty="0" smtClean="0"/>
+              <a:t>_NSEL_LOC.mac </a:t>
+            </a:r>
+            <a:r>
+              <a:rPr lang="en-US" dirty="0" smtClean="0">
+                <a:sym typeface="Wingdings" pitchFamily="2" charset="2"/>
+              </a:rPr>
+              <a:t> Select Node By </a:t>
+            </a:r>
+            <a:r>
+              <a:rPr lang="en-US" dirty="0" err="1" smtClean="0">
+                <a:sym typeface="Wingdings" pitchFamily="2" charset="2"/>
+              </a:rPr>
+              <a:t>Loacation</a:t>
+            </a:r>
+            <a:endParaRPr lang="en-US" dirty="0"/>
+          </a:p>
+        </p:txBody>
+      </p:sp>
+      <p:sp>
+        <p:nvSpPr>
+          <p:cNvPr id="3" name="TextBox 2"/>
+          <p:cNvSpPr txBox="1"/>
+          <p:nvPr/>
+        </p:nvSpPr>
+        <p:spPr>
+          <a:xfrm>
+            <a:off x="0" y="879895"/>
+            <a:ext cx="9144000" cy="923330"/>
+          </a:xfrm>
+          <a:prstGeom prst="rect">
+            <a:avLst/>
+          </a:prstGeom>
+          <a:noFill/>
+        </p:spPr>
+        <p:txBody>
+          <a:bodyPr wrap="square" rtlCol="0">
+            <a:spAutoFit/>
+          </a:bodyPr>
+          <a:lstStyle/>
+          <a:p>
+            <a:r>
+              <a:rPr lang="en-US" sz="5400" dirty="0" smtClean="0"/>
+              <a:t>_</a:t>
+            </a:r>
+            <a:r>
+              <a:rPr lang="en-US" sz="5400" dirty="0" err="1" smtClean="0"/>
+              <a:t>NSEL_LOC</a:t>
+            </a:r>
+            <a:r>
+              <a:rPr lang="en-US" sz="5400" dirty="0" smtClean="0"/>
+              <a:t>,</a:t>
+            </a:r>
+            <a:r>
+              <a:rPr lang="en-US" sz="2000" dirty="0" smtClean="0"/>
+              <a:t> &lt;x&gt;,&lt;y&gt;,&lt;z&gt;,&lt;tolerance&gt;</a:t>
+            </a:r>
+            <a:endParaRPr lang="en-US" sz="5400" dirty="0"/>
+          </a:p>
+        </p:txBody>
+      </p:sp>
+      <p:sp>
+        <p:nvSpPr>
+          <p:cNvPr id="4" name="TextBox 3"/>
+          <p:cNvSpPr txBox="1"/>
+          <p:nvPr/>
+        </p:nvSpPr>
+        <p:spPr>
+          <a:xfrm>
+            <a:off x="4226944" y="845389"/>
+            <a:ext cx="4917056" cy="338554"/>
+          </a:xfrm>
+          <a:prstGeom prst="rect">
+            <a:avLst/>
+          </a:prstGeom>
+          <a:noFill/>
+        </p:spPr>
+        <p:txBody>
+          <a:bodyPr wrap="square" rtlCol="0">
+            <a:spAutoFit/>
+          </a:bodyPr>
+          <a:lstStyle/>
+          <a:p>
+            <a:pPr algn="r"/>
+            <a:r>
+              <a:rPr lang="en-US" sz="1600" dirty="0" smtClean="0"/>
+              <a:t>“Think: </a:t>
+            </a:r>
+            <a:r>
+              <a:rPr lang="en-US" sz="1600" dirty="0" smtClean="0">
+                <a:solidFill>
+                  <a:schemeClr val="accent6">
+                    <a:lumMod val="75000"/>
+                  </a:schemeClr>
+                </a:solidFill>
+              </a:rPr>
+              <a:t>_N</a:t>
+            </a:r>
+            <a:r>
+              <a:rPr lang="en-US" sz="1600" dirty="0" smtClean="0"/>
+              <a:t>ode </a:t>
+            </a:r>
+            <a:r>
+              <a:rPr lang="en-US" sz="1600" dirty="0" smtClean="0">
+                <a:solidFill>
+                  <a:schemeClr val="accent6">
+                    <a:lumMod val="75000"/>
+                  </a:schemeClr>
+                </a:solidFill>
+              </a:rPr>
+              <a:t>Sel</a:t>
+            </a:r>
+            <a:r>
+              <a:rPr lang="en-US" sz="1600" dirty="0" smtClean="0"/>
+              <a:t>ect by </a:t>
+            </a:r>
+            <a:r>
+              <a:rPr lang="en-US" sz="1600" dirty="0" smtClean="0">
+                <a:solidFill>
+                  <a:schemeClr val="accent6">
+                    <a:lumMod val="75000"/>
+                  </a:schemeClr>
+                </a:solidFill>
+              </a:rPr>
+              <a:t>Loc</a:t>
+            </a:r>
+            <a:r>
+              <a:rPr lang="en-US" sz="1600" dirty="0" smtClean="0"/>
+              <a:t>ation”</a:t>
+            </a:r>
+            <a:endParaRPr lang="en-US" sz="1600" dirty="0"/>
+          </a:p>
+        </p:txBody>
+      </p:sp>
+      <p:sp>
+        <p:nvSpPr>
+          <p:cNvPr id="5" name="TextBox 4"/>
+          <p:cNvSpPr txBox="1"/>
+          <p:nvPr/>
+        </p:nvSpPr>
+        <p:spPr>
+          <a:xfrm>
+            <a:off x="308344" y="1850065"/>
+            <a:ext cx="8484782" cy="307777"/>
+          </a:xfrm>
+          <a:prstGeom prst="rect">
+            <a:avLst/>
+          </a:prstGeom>
+          <a:noFill/>
+          <a:ln>
+            <a:noFill/>
+          </a:ln>
+        </p:spPr>
+        <p:txBody>
+          <a:bodyPr wrap="square" rtlCol="0">
+            <a:spAutoFit/>
+          </a:bodyPr>
+          <a:lstStyle/>
+          <a:p>
+            <a:r>
+              <a:rPr lang="en-US" sz="1400" dirty="0" smtClean="0"/>
+              <a:t>Select Node based on location. Useful for macros, </a:t>
+            </a:r>
+          </a:p>
+        </p:txBody>
+      </p:sp>
+    </p:spTree>
+  </p:cSld>
+  <p:clrMapOvr>
+    <a:masterClrMapping/>
+  </p:clrMapOvr>
+  <p:timing>
+    <p:tnLst>
+      <p:par>
+        <p:cTn id="1" dur="indefinite" restart="never" nodeType="tmRoot"/>
+      </p:par>
+    </p:tnLst>
+  </p:timing>
+</p:sld>
+</file>
+
+<file path=ppt/slides/slide26.xml><?xml version="1.0" encoding="utf-8"?>
+<p:sld xmlns:a="http://schemas.openxmlformats.org/drawingml/2006/main" xmlns:r="http://schemas.openxmlformats.org/officeDocument/2006/relationships" xmlns:p="http://schemas.openxmlformats.org/presentationml/2006/main">
+  <p:cSld>
+    <p:spTree>
+      <p:nvGrpSpPr>
+        <p:cNvPr id="1" name=""/>
+        <p:cNvGrpSpPr/>
+        <p:nvPr/>
+      </p:nvGrpSpPr>
+      <p:grpSpPr>
+        <a:xfrm>
+          <a:off x="0" y="0"/>
+          <a:ext cx="0" cy="0"/>
+          <a:chOff x="0" y="0"/>
+          <a:chExt cx="0" cy="0"/>
+        </a:xfrm>
+      </p:grpSpPr>
+      <p:sp>
+        <p:nvSpPr>
+          <p:cNvPr id="2" name="Title 1"/>
+          <p:cNvSpPr>
+            <a:spLocks noGrp="1"/>
+          </p:cNvSpPr>
+          <p:nvPr>
+            <p:ph type="title"/>
+          </p:nvPr>
+        </p:nvSpPr>
+        <p:spPr/>
+        <p:txBody>
+          <a:bodyPr/>
+          <a:lstStyle/>
+          <a:p>
+            <a:r>
+              <a:rPr lang="en-US" dirty="0" smtClean="0"/>
+              <a:t>_NUMCMP.mac</a:t>
+            </a:r>
+            <a:r>
+              <a:rPr lang="en-US" dirty="0" smtClean="0">
+                <a:sym typeface="Wingdings" pitchFamily="2" charset="2"/>
+              </a:rPr>
+              <a:t> like </a:t>
+            </a:r>
+            <a:r>
+              <a:rPr lang="en-US" dirty="0" err="1" smtClean="0">
+                <a:sym typeface="Wingdings" pitchFamily="2" charset="2"/>
+              </a:rPr>
+              <a:t>numcmp</a:t>
+            </a:r>
+            <a:r>
+              <a:rPr lang="en-US" dirty="0" smtClean="0">
+                <a:sym typeface="Wingdings" pitchFamily="2" charset="2"/>
+              </a:rPr>
+              <a:t> but better</a:t>
+            </a:r>
+            <a:endParaRPr lang="en-US" dirty="0"/>
+          </a:p>
+        </p:txBody>
+      </p:sp>
+      <p:sp>
+        <p:nvSpPr>
+          <p:cNvPr id="3" name="TextBox 2"/>
+          <p:cNvSpPr txBox="1"/>
+          <p:nvPr/>
+        </p:nvSpPr>
+        <p:spPr>
+          <a:xfrm>
+            <a:off x="0" y="879895"/>
+            <a:ext cx="9144000" cy="923330"/>
+          </a:xfrm>
+          <a:prstGeom prst="rect">
+            <a:avLst/>
+          </a:prstGeom>
+          <a:noFill/>
+        </p:spPr>
+        <p:txBody>
+          <a:bodyPr wrap="square" rtlCol="0">
+            <a:spAutoFit/>
+          </a:bodyPr>
+          <a:lstStyle/>
+          <a:p>
+            <a:r>
+              <a:rPr lang="en-US" sz="5400" dirty="0" smtClean="0"/>
+              <a:t>_</a:t>
+            </a:r>
+            <a:r>
+              <a:rPr lang="en-US" sz="5400" dirty="0" err="1" smtClean="0"/>
+              <a:t>NUMCMP</a:t>
+            </a:r>
+            <a:r>
+              <a:rPr lang="en-US" sz="5400" dirty="0" smtClean="0"/>
+              <a:t>,</a:t>
+            </a:r>
+            <a:r>
+              <a:rPr lang="en-US" sz="2000" dirty="0" smtClean="0"/>
+              <a:t> &lt;what else?&gt;</a:t>
+            </a:r>
+            <a:endParaRPr lang="en-US" sz="5400" dirty="0"/>
+          </a:p>
+        </p:txBody>
+      </p:sp>
+      <p:sp>
+        <p:nvSpPr>
+          <p:cNvPr id="4" name="TextBox 3"/>
+          <p:cNvSpPr txBox="1"/>
+          <p:nvPr/>
+        </p:nvSpPr>
+        <p:spPr>
+          <a:xfrm>
+            <a:off x="4226944" y="845389"/>
+            <a:ext cx="4917056" cy="338554"/>
+          </a:xfrm>
+          <a:prstGeom prst="rect">
+            <a:avLst/>
+          </a:prstGeom>
+          <a:noFill/>
+        </p:spPr>
+        <p:txBody>
+          <a:bodyPr wrap="square" rtlCol="0">
+            <a:spAutoFit/>
+          </a:bodyPr>
+          <a:lstStyle/>
+          <a:p>
+            <a:pPr algn="r"/>
+            <a:r>
+              <a:rPr lang="en-US" sz="1600" dirty="0" smtClean="0"/>
+              <a:t>“Think: </a:t>
+            </a:r>
+            <a:r>
+              <a:rPr lang="en-US" sz="1600" dirty="0" smtClean="0">
+                <a:solidFill>
+                  <a:schemeClr val="accent6">
+                    <a:lumMod val="75000"/>
+                  </a:schemeClr>
+                </a:solidFill>
+              </a:rPr>
+              <a:t>_Num</a:t>
+            </a:r>
+            <a:r>
+              <a:rPr lang="en-US" sz="1600" dirty="0" smtClean="0"/>
+              <a:t>bers </a:t>
+            </a:r>
+            <a:r>
+              <a:rPr lang="en-US" sz="1600" dirty="0" smtClean="0">
+                <a:solidFill>
+                  <a:schemeClr val="accent6">
+                    <a:lumMod val="75000"/>
+                  </a:schemeClr>
+                </a:solidFill>
+              </a:rPr>
+              <a:t>C</a:t>
+            </a:r>
+            <a:r>
+              <a:rPr lang="en-US" sz="1600" dirty="0" smtClean="0"/>
+              <a:t>o</a:t>
+            </a:r>
+            <a:r>
+              <a:rPr lang="en-US" sz="1600" dirty="0" smtClean="0">
+                <a:solidFill>
+                  <a:schemeClr val="accent6">
+                    <a:lumMod val="75000"/>
+                  </a:schemeClr>
+                </a:solidFill>
+              </a:rPr>
+              <a:t>mp</a:t>
+            </a:r>
+            <a:r>
+              <a:rPr lang="en-US" sz="1600" dirty="0" smtClean="0"/>
+              <a:t>ress”</a:t>
+            </a:r>
+            <a:endParaRPr lang="en-US" sz="1600" dirty="0"/>
+          </a:p>
+        </p:txBody>
+      </p:sp>
+      <p:sp>
+        <p:nvSpPr>
+          <p:cNvPr id="5" name="TextBox 4"/>
+          <p:cNvSpPr txBox="1"/>
+          <p:nvPr/>
+        </p:nvSpPr>
+        <p:spPr>
+          <a:xfrm>
+            <a:off x="308344" y="1850065"/>
+            <a:ext cx="8484782" cy="338554"/>
+          </a:xfrm>
+          <a:prstGeom prst="rect">
+            <a:avLst/>
+          </a:prstGeom>
+          <a:noFill/>
+          <a:ln>
+            <a:noFill/>
+          </a:ln>
+        </p:spPr>
+        <p:txBody>
+          <a:bodyPr wrap="square" rtlCol="0">
+            <a:spAutoFit/>
+          </a:bodyPr>
+          <a:lstStyle/>
+          <a:p>
+            <a:r>
+              <a:rPr lang="en-US" sz="1600" dirty="0" smtClean="0"/>
+              <a:t>Compresses numbers assigned to </a:t>
+            </a:r>
+            <a:r>
+              <a:rPr lang="en-US" sz="1600" dirty="0" err="1" smtClean="0"/>
+              <a:t>keypoints</a:t>
+            </a:r>
+            <a:r>
+              <a:rPr lang="en-US" sz="1600" dirty="0" smtClean="0"/>
+              <a:t>, lines, areas and volumes back to zero </a:t>
+            </a:r>
+          </a:p>
+        </p:txBody>
+      </p:sp>
+      <p:sp>
+        <p:nvSpPr>
+          <p:cNvPr id="6" name="TextBox 5"/>
+          <p:cNvSpPr txBox="1"/>
+          <p:nvPr/>
+        </p:nvSpPr>
+        <p:spPr>
+          <a:xfrm>
+            <a:off x="297711" y="2413585"/>
+            <a:ext cx="8846289" cy="523220"/>
+          </a:xfrm>
+          <a:prstGeom prst="rect">
+            <a:avLst/>
+          </a:prstGeom>
+          <a:noFill/>
+          <a:ln>
+            <a:noFill/>
+          </a:ln>
+        </p:spPr>
+        <p:txBody>
+          <a:bodyPr wrap="square" rtlCol="0">
+            <a:spAutoFit/>
+          </a:bodyPr>
+          <a:lstStyle/>
+          <a:p>
+            <a:r>
+              <a:rPr lang="en-US" sz="1400" dirty="0" smtClean="0"/>
+              <a:t>ARG1 = 1 </a:t>
+            </a:r>
+            <a:r>
+              <a:rPr lang="en-US" sz="1400" dirty="0" smtClean="0">
+                <a:sym typeface="Wingdings" pitchFamily="2" charset="2"/>
+              </a:rPr>
+              <a:t> Nodes and Elements Compressed as well</a:t>
+            </a:r>
+          </a:p>
+          <a:p>
+            <a:r>
+              <a:rPr lang="en-US" sz="1400" dirty="0" smtClean="0">
+                <a:sym typeface="Wingdings" pitchFamily="2" charset="2"/>
+              </a:rPr>
+              <a:t>ARG1 = 2  </a:t>
+            </a:r>
+            <a:r>
+              <a:rPr lang="en-US" sz="1400" dirty="0" err="1" smtClean="0">
+                <a:sym typeface="Wingdings" pitchFamily="2" charset="2"/>
+              </a:rPr>
+              <a:t>Keypoings</a:t>
+            </a:r>
+            <a:r>
+              <a:rPr lang="en-US" sz="1400" dirty="0" smtClean="0">
+                <a:sym typeface="Wingdings" pitchFamily="2" charset="2"/>
+              </a:rPr>
+              <a:t>, lines, areas, nodes, elements, materials, type and </a:t>
+            </a:r>
+            <a:r>
+              <a:rPr lang="en-US" sz="1400" dirty="0" err="1" smtClean="0">
+                <a:sym typeface="Wingdings" pitchFamily="2" charset="2"/>
+              </a:rPr>
+              <a:t>reall</a:t>
+            </a:r>
+            <a:r>
+              <a:rPr lang="en-US" sz="1400" dirty="0" smtClean="0">
+                <a:sym typeface="Wingdings" pitchFamily="2" charset="2"/>
+              </a:rPr>
+              <a:t> all compressed</a:t>
+            </a:r>
+            <a:endParaRPr lang="en-US" sz="1400" dirty="0" smtClean="0"/>
+          </a:p>
+        </p:txBody>
+      </p:sp>
+      <p:sp>
+        <p:nvSpPr>
+          <p:cNvPr id="8" name="TextBox 7"/>
+          <p:cNvSpPr txBox="1"/>
+          <p:nvPr/>
+        </p:nvSpPr>
+        <p:spPr>
+          <a:xfrm>
+            <a:off x="3763926" y="3157864"/>
+            <a:ext cx="1446030" cy="307777"/>
+          </a:xfrm>
+          <a:prstGeom prst="rect">
+            <a:avLst/>
+          </a:prstGeom>
+          <a:solidFill>
+            <a:schemeClr val="tx1"/>
+          </a:solidFill>
+          <a:ln>
+            <a:noFill/>
+          </a:ln>
+        </p:spPr>
+        <p:txBody>
+          <a:bodyPr wrap="square" rtlCol="0">
+            <a:spAutoFit/>
+          </a:bodyPr>
+          <a:lstStyle/>
+          <a:p>
+            <a:pPr algn="ctr"/>
+            <a:r>
+              <a:rPr lang="en-US" sz="1400" b="1" dirty="0" smtClean="0">
+                <a:solidFill>
+                  <a:schemeClr val="accent6">
+                    <a:lumMod val="75000"/>
+                  </a:schemeClr>
+                </a:solidFill>
+              </a:rPr>
+              <a:t>_NUMCMP,</a:t>
+            </a:r>
+            <a:r>
+              <a:rPr lang="en-US" sz="1400" b="1" dirty="0" smtClean="0">
+                <a:solidFill>
+                  <a:schemeClr val="bg1"/>
+                </a:solidFill>
+              </a:rPr>
+              <a:t>1</a:t>
+            </a:r>
+          </a:p>
+        </p:txBody>
+      </p:sp>
+      <p:pic>
+        <p:nvPicPr>
+          <p:cNvPr id="2051" name="Picture 3"/>
+          <p:cNvPicPr>
+            <a:picLocks noChangeAspect="1" noChangeArrowheads="1"/>
+          </p:cNvPicPr>
+          <p:nvPr/>
+        </p:nvPicPr>
+        <p:blipFill>
+          <a:blip r:embed="rId2" cstate="print"/>
+          <a:srcRect/>
+          <a:stretch>
+            <a:fillRect/>
+          </a:stretch>
+        </p:blipFill>
+        <p:spPr bwMode="auto">
+          <a:xfrm>
+            <a:off x="5327910" y="3192198"/>
+            <a:ext cx="3400425" cy="1047750"/>
+          </a:xfrm>
+          <a:prstGeom prst="rect">
+            <a:avLst/>
+          </a:prstGeom>
+          <a:noFill/>
+          <a:ln w="9525">
+            <a:noFill/>
+            <a:miter lim="800000"/>
+            <a:headEnd/>
+            <a:tailEnd/>
+          </a:ln>
+        </p:spPr>
+      </p:pic>
+      <p:pic>
+        <p:nvPicPr>
+          <p:cNvPr id="2052" name="Picture 4"/>
+          <p:cNvPicPr>
+            <a:picLocks noChangeAspect="1" noChangeArrowheads="1"/>
+          </p:cNvPicPr>
+          <p:nvPr/>
+        </p:nvPicPr>
+        <p:blipFill>
+          <a:blip r:embed="rId3" cstate="print"/>
+          <a:srcRect/>
+          <a:stretch>
+            <a:fillRect/>
+          </a:stretch>
+        </p:blipFill>
+        <p:spPr bwMode="auto">
+          <a:xfrm>
+            <a:off x="283314" y="3078568"/>
+            <a:ext cx="3409950" cy="1104900"/>
+          </a:xfrm>
+          <a:prstGeom prst="rect">
+            <a:avLst/>
+          </a:prstGeom>
+          <a:noFill/>
+          <a:ln w="9525">
+            <a:noFill/>
+            <a:miter lim="800000"/>
+            <a:headEnd/>
+            <a:tailEnd/>
+          </a:ln>
+        </p:spPr>
+      </p:pic>
+      <p:sp>
+        <p:nvSpPr>
+          <p:cNvPr id="11" name="Right Arrow 10"/>
+          <p:cNvSpPr/>
+          <p:nvPr/>
+        </p:nvSpPr>
+        <p:spPr>
+          <a:xfrm>
+            <a:off x="4136066" y="3753286"/>
+            <a:ext cx="637953" cy="414670"/>
+          </a:xfrm>
+          <a:prstGeom prst="rightArrow">
+            <a:avLst/>
+          </a:prstGeom>
+          <a:solidFill>
+            <a:srgbClr val="FF0000"/>
+          </a:solidFill>
+          <a:ln>
+            <a:solidFill>
+              <a:srgbClr val="C00000"/>
+            </a:solidFill>
+          </a:ln>
+        </p:spPr>
+        <p:style>
+          <a:lnRef idx="2">
+            <a:schemeClr val="accent1">
+              <a:shade val="50000"/>
+            </a:schemeClr>
+          </a:lnRef>
+          <a:fillRef idx="1">
+            <a:schemeClr val="accent1"/>
+          </a:fillRef>
+          <a:effectRef idx="0">
+            <a:schemeClr val="accent1"/>
+          </a:effectRef>
+          <a:fontRef idx="minor">
+            <a:schemeClr val="lt1"/>
+          </a:fontRef>
+        </p:style>
+        <p:txBody>
+          <a:bodyPr rtlCol="0" anchor="ctr"/>
+          <a:lstStyle/>
+          <a:p>
+            <a:pPr algn="ctr"/>
+            <a:endParaRPr lang="en-US"/>
+          </a:p>
+        </p:txBody>
+      </p:sp>
+    </p:spTree>
+  </p:cSld>
+  <p:clrMapOvr>
+    <a:masterClrMapping/>
+  </p:clrMapOvr>
+  <p:timing>
+    <p:tnLst>
+      <p:par>
+        <p:cTn id="1" dur="indefinite" restart="never" nodeType="tmRoot"/>
+      </p:par>
+    </p:tnLst>
+  </p:timing>
+</p:sld>
+</file>
+
+<file path=ppt/slides/slide27.xml><?xml version="1.0" encoding="utf-8"?>
+<p:sld xmlns:a="http://schemas.openxmlformats.org/drawingml/2006/main" xmlns:r="http://schemas.openxmlformats.org/officeDocument/2006/relationships" xmlns:p="http://schemas.openxmlformats.org/presentationml/2006/main">
+  <p:cSld>
+    <p:spTree>
+      <p:nvGrpSpPr>
+        <p:cNvPr id="1" name=""/>
+        <p:cNvGrpSpPr/>
+        <p:nvPr/>
+      </p:nvGrpSpPr>
+      <p:grpSpPr>
+        <a:xfrm>
+          <a:off x="0" y="0"/>
+          <a:ext cx="0" cy="0"/>
+          <a:chOff x="0" y="0"/>
+          <a:chExt cx="0" cy="0"/>
+        </a:xfrm>
+      </p:grpSpPr>
+      <p:sp>
+        <p:nvSpPr>
+          <p:cNvPr id="2" name="Title 1"/>
+          <p:cNvSpPr>
+            <a:spLocks noGrp="1"/>
+          </p:cNvSpPr>
+          <p:nvPr>
+            <p:ph type="title"/>
+          </p:nvPr>
+        </p:nvSpPr>
+        <p:spPr/>
+        <p:txBody>
+          <a:bodyPr/>
+          <a:lstStyle/>
+          <a:p>
+            <a:r>
+              <a:rPr lang="en-US" dirty="0" smtClean="0"/>
+              <a:t>_NUMMRG.mac </a:t>
+            </a:r>
+            <a:r>
+              <a:rPr lang="en-US" dirty="0" smtClean="0">
+                <a:sym typeface="Wingdings" pitchFamily="2" charset="2"/>
+              </a:rPr>
+              <a:t> Merge Like You Mean It.</a:t>
+            </a:r>
+            <a:endParaRPr lang="en-US" dirty="0"/>
+          </a:p>
+        </p:txBody>
+      </p:sp>
+      <p:sp>
+        <p:nvSpPr>
+          <p:cNvPr id="3" name="TextBox 2"/>
+          <p:cNvSpPr txBox="1"/>
+          <p:nvPr/>
+        </p:nvSpPr>
+        <p:spPr>
+          <a:xfrm>
+            <a:off x="0" y="879895"/>
+            <a:ext cx="9144000" cy="923330"/>
+          </a:xfrm>
+          <a:prstGeom prst="rect">
+            <a:avLst/>
+          </a:prstGeom>
+          <a:noFill/>
+        </p:spPr>
+        <p:txBody>
+          <a:bodyPr wrap="square" rtlCol="0">
+            <a:spAutoFit/>
+          </a:bodyPr>
+          <a:lstStyle/>
+          <a:p>
+            <a:r>
+              <a:rPr lang="en-US" sz="5400" dirty="0" smtClean="0"/>
+              <a:t>_</a:t>
+            </a:r>
+            <a:r>
+              <a:rPr lang="en-US" sz="5400" dirty="0" err="1" smtClean="0"/>
+              <a:t>NUMMRG</a:t>
+            </a:r>
+            <a:r>
+              <a:rPr lang="en-US" sz="5400" dirty="0" smtClean="0"/>
+              <a:t>,</a:t>
+            </a:r>
+            <a:r>
+              <a:rPr lang="en-US" sz="2000" dirty="0" smtClean="0"/>
+              <a:t> &lt;</a:t>
+            </a:r>
+            <a:r>
+              <a:rPr lang="en-US" sz="2000" dirty="0" err="1" smtClean="0"/>
+              <a:t>Tolarance</a:t>
+            </a:r>
+            <a:r>
+              <a:rPr lang="en-US" sz="2000" dirty="0" smtClean="0"/>
+              <a:t>&gt;, &lt;Retain High Number?&gt;</a:t>
+            </a:r>
+            <a:endParaRPr lang="en-US" sz="5400" dirty="0"/>
+          </a:p>
+        </p:txBody>
+      </p:sp>
+      <p:sp>
+        <p:nvSpPr>
+          <p:cNvPr id="4" name="TextBox 3"/>
+          <p:cNvSpPr txBox="1"/>
+          <p:nvPr/>
+        </p:nvSpPr>
+        <p:spPr>
+          <a:xfrm>
+            <a:off x="4226944" y="845389"/>
+            <a:ext cx="4917056" cy="338554"/>
+          </a:xfrm>
+          <a:prstGeom prst="rect">
+            <a:avLst/>
+          </a:prstGeom>
+          <a:noFill/>
+        </p:spPr>
+        <p:txBody>
+          <a:bodyPr wrap="square" rtlCol="0">
+            <a:spAutoFit/>
+          </a:bodyPr>
+          <a:lstStyle/>
+          <a:p>
+            <a:pPr algn="r"/>
+            <a:r>
+              <a:rPr lang="en-US" sz="1600" dirty="0" smtClean="0"/>
+              <a:t>“Think: </a:t>
+            </a:r>
+            <a:r>
+              <a:rPr lang="en-US" sz="1600" dirty="0" smtClean="0">
+                <a:solidFill>
+                  <a:schemeClr val="accent6">
+                    <a:lumMod val="75000"/>
+                  </a:schemeClr>
+                </a:solidFill>
+              </a:rPr>
+              <a:t>_Num</a:t>
+            </a:r>
+            <a:r>
+              <a:rPr lang="en-US" sz="1600" dirty="0" smtClean="0"/>
+              <a:t>bers </a:t>
+            </a:r>
+            <a:r>
+              <a:rPr lang="en-US" sz="1600" dirty="0" smtClean="0">
+                <a:solidFill>
+                  <a:schemeClr val="accent6">
+                    <a:lumMod val="75000"/>
+                  </a:schemeClr>
+                </a:solidFill>
+              </a:rPr>
+              <a:t>C</a:t>
+            </a:r>
+            <a:r>
+              <a:rPr lang="en-US" sz="1600" dirty="0" smtClean="0"/>
+              <a:t>o</a:t>
+            </a:r>
+            <a:r>
+              <a:rPr lang="en-US" sz="1600" dirty="0" smtClean="0">
+                <a:solidFill>
+                  <a:schemeClr val="accent6">
+                    <a:lumMod val="75000"/>
+                  </a:schemeClr>
+                </a:solidFill>
+              </a:rPr>
+              <a:t>mp</a:t>
+            </a:r>
+            <a:r>
+              <a:rPr lang="en-US" sz="1600" dirty="0" smtClean="0"/>
+              <a:t>ress”</a:t>
+            </a:r>
+            <a:endParaRPr lang="en-US" sz="1600" dirty="0"/>
+          </a:p>
+        </p:txBody>
+      </p:sp>
+      <p:sp>
+        <p:nvSpPr>
+          <p:cNvPr id="5" name="TextBox 4"/>
+          <p:cNvSpPr txBox="1"/>
+          <p:nvPr/>
+        </p:nvSpPr>
+        <p:spPr>
+          <a:xfrm>
+            <a:off x="318977" y="1807535"/>
+            <a:ext cx="8463516" cy="307777"/>
+          </a:xfrm>
+          <a:prstGeom prst="rect">
+            <a:avLst/>
+          </a:prstGeom>
+          <a:noFill/>
+          <a:ln>
+            <a:noFill/>
+          </a:ln>
+        </p:spPr>
+        <p:txBody>
+          <a:bodyPr wrap="square" rtlCol="0">
+            <a:spAutoFit/>
+          </a:bodyPr>
+          <a:lstStyle/>
+          <a:p>
+            <a:r>
+              <a:rPr lang="en-US" sz="1400" dirty="0" smtClean="0"/>
+              <a:t>Merges nodes </a:t>
+            </a:r>
+            <a:r>
+              <a:rPr lang="en-US" sz="1400" b="1" dirty="0" smtClean="0"/>
+              <a:t>AND</a:t>
+            </a:r>
+            <a:r>
+              <a:rPr lang="en-US" sz="1400" dirty="0" smtClean="0"/>
+              <a:t> </a:t>
+            </a:r>
+            <a:r>
+              <a:rPr lang="en-US" sz="1400" dirty="0" err="1" smtClean="0"/>
+              <a:t>keypoints</a:t>
+            </a:r>
+            <a:r>
+              <a:rPr lang="en-US" sz="1400" dirty="0" smtClean="0"/>
+              <a:t>. Repeats several times, you will </a:t>
+            </a:r>
+            <a:r>
+              <a:rPr lang="en-US" sz="1400" dirty="0" err="1" smtClean="0"/>
+              <a:t>ushaly</a:t>
+            </a:r>
+            <a:r>
+              <a:rPr lang="en-US" sz="1400" dirty="0" smtClean="0"/>
+              <a:t> see errors.</a:t>
+            </a:r>
+            <a:endParaRPr lang="en-US" sz="1400" dirty="0" smtClean="0"/>
+          </a:p>
+        </p:txBody>
+      </p:sp>
+    </p:spTree>
+  </p:cSld>
+  <p:clrMapOvr>
+    <a:masterClrMapping/>
+  </p:clrMapOvr>
+  <p:timing>
+    <p:tnLst>
+      <p:par>
+        <p:cTn id="1" dur="indefinite" restart="never" nodeType="tmRoot"/>
+      </p:par>
+    </p:tnLst>
+  </p:timing>
+</p:sld>
+</file>
+
+<file path=ppt/slides/slide28.xml><?xml version="1.0" encoding="utf-8"?>
+<p:sld xmlns:a="http://schemas.openxmlformats.org/drawingml/2006/main" xmlns:r="http://schemas.openxmlformats.org/officeDocument/2006/relationships" xmlns:p="http://schemas.openxmlformats.org/presentationml/2006/main">
+  <p:cSld>
+    <p:spTree>
+      <p:nvGrpSpPr>
+        <p:cNvPr id="1" name=""/>
+        <p:cNvGrpSpPr/>
+        <p:nvPr/>
+      </p:nvGrpSpPr>
+      <p:grpSpPr>
+        <a:xfrm>
+          <a:off x="0" y="0"/>
+          <a:ext cx="0" cy="0"/>
+          <a:chOff x="0" y="0"/>
+          <a:chExt cx="0" cy="0"/>
+        </a:xfrm>
+      </p:grpSpPr>
+      <p:sp>
+        <p:nvSpPr>
+          <p:cNvPr id="2" name="Title 1"/>
+          <p:cNvSpPr>
+            <a:spLocks noGrp="1"/>
+          </p:cNvSpPr>
+          <p:nvPr>
+            <p:ph type="title"/>
+          </p:nvPr>
+        </p:nvSpPr>
+        <p:spPr/>
+        <p:txBody>
+          <a:bodyPr/>
+          <a:lstStyle/>
+          <a:p>
+            <a:r>
+              <a:rPr lang="en-US" dirty="0" smtClean="0"/>
+              <a:t>_NUMOFF.mac </a:t>
+            </a:r>
+            <a:r>
+              <a:rPr lang="en-US" dirty="0" smtClean="0">
+                <a:sym typeface="Wingdings" pitchFamily="2" charset="2"/>
+              </a:rPr>
+              <a:t> Offset your world.</a:t>
+            </a:r>
+            <a:endParaRPr lang="en-US" dirty="0"/>
+          </a:p>
+        </p:txBody>
+      </p:sp>
+      <p:sp>
+        <p:nvSpPr>
+          <p:cNvPr id="3" name="TextBox 2"/>
+          <p:cNvSpPr txBox="1"/>
+          <p:nvPr/>
+        </p:nvSpPr>
+        <p:spPr>
+          <a:xfrm>
+            <a:off x="0" y="879895"/>
+            <a:ext cx="9144000" cy="923330"/>
+          </a:xfrm>
+          <a:prstGeom prst="rect">
+            <a:avLst/>
+          </a:prstGeom>
+          <a:noFill/>
+        </p:spPr>
+        <p:txBody>
+          <a:bodyPr wrap="square" rtlCol="0">
+            <a:spAutoFit/>
+          </a:bodyPr>
+          <a:lstStyle/>
+          <a:p>
+            <a:r>
+              <a:rPr lang="en-US" sz="5400" dirty="0" smtClean="0"/>
+              <a:t>_</a:t>
+            </a:r>
+            <a:r>
+              <a:rPr lang="en-US" sz="5400" dirty="0" err="1" smtClean="0"/>
+              <a:t>NUMOFF</a:t>
+            </a:r>
+            <a:r>
+              <a:rPr lang="en-US" sz="5400" dirty="0" smtClean="0"/>
+              <a:t>,</a:t>
+            </a:r>
+            <a:r>
+              <a:rPr lang="en-US" sz="2000" dirty="0" smtClean="0"/>
+              <a:t> &lt;Offset Number&gt;,&lt;What Else?&gt;</a:t>
+            </a:r>
+            <a:endParaRPr lang="en-US" sz="5400" dirty="0"/>
+          </a:p>
+        </p:txBody>
+      </p:sp>
+      <p:sp>
+        <p:nvSpPr>
+          <p:cNvPr id="4" name="TextBox 3"/>
+          <p:cNvSpPr txBox="1"/>
+          <p:nvPr/>
+        </p:nvSpPr>
+        <p:spPr>
+          <a:xfrm>
+            <a:off x="4226944" y="845389"/>
+            <a:ext cx="4917056" cy="338554"/>
+          </a:xfrm>
+          <a:prstGeom prst="rect">
+            <a:avLst/>
+          </a:prstGeom>
+          <a:noFill/>
+        </p:spPr>
+        <p:txBody>
+          <a:bodyPr wrap="square" rtlCol="0">
+            <a:spAutoFit/>
+          </a:bodyPr>
+          <a:lstStyle/>
+          <a:p>
+            <a:pPr algn="r"/>
+            <a:r>
+              <a:rPr lang="en-US" sz="1600" dirty="0" smtClean="0"/>
+              <a:t>“Think: </a:t>
+            </a:r>
+            <a:r>
+              <a:rPr lang="en-US" sz="1600" dirty="0" smtClean="0">
+                <a:solidFill>
+                  <a:schemeClr val="accent6">
+                    <a:lumMod val="75000"/>
+                  </a:schemeClr>
+                </a:solidFill>
+              </a:rPr>
+              <a:t>_Num</a:t>
+            </a:r>
+            <a:r>
+              <a:rPr lang="en-US" sz="1600" dirty="0" smtClean="0"/>
+              <a:t>bers </a:t>
+            </a:r>
+            <a:r>
+              <a:rPr lang="en-US" sz="1600" dirty="0" smtClean="0">
+                <a:solidFill>
+                  <a:schemeClr val="accent6">
+                    <a:lumMod val="75000"/>
+                  </a:schemeClr>
+                </a:solidFill>
+              </a:rPr>
+              <a:t>Off</a:t>
+            </a:r>
+            <a:r>
+              <a:rPr lang="en-US" sz="1600" dirty="0" smtClean="0"/>
+              <a:t>set”</a:t>
+            </a:r>
+            <a:endParaRPr lang="en-US" sz="1600" dirty="0"/>
+          </a:p>
+        </p:txBody>
+      </p:sp>
+      <p:sp>
+        <p:nvSpPr>
+          <p:cNvPr id="5" name="TextBox 4"/>
+          <p:cNvSpPr txBox="1"/>
+          <p:nvPr/>
+        </p:nvSpPr>
+        <p:spPr>
+          <a:xfrm>
+            <a:off x="308344" y="1850065"/>
+            <a:ext cx="8484782" cy="338554"/>
+          </a:xfrm>
+          <a:prstGeom prst="rect">
+            <a:avLst/>
+          </a:prstGeom>
+          <a:noFill/>
+          <a:ln>
+            <a:noFill/>
+          </a:ln>
+        </p:spPr>
+        <p:txBody>
+          <a:bodyPr wrap="square" rtlCol="0">
+            <a:spAutoFit/>
+          </a:bodyPr>
+          <a:lstStyle/>
+          <a:p>
+            <a:r>
+              <a:rPr lang="en-US" sz="1600" dirty="0" smtClean="0"/>
+              <a:t>Offsets numbers </a:t>
+            </a:r>
+            <a:r>
+              <a:rPr lang="en-US" sz="1600" dirty="0" smtClean="0"/>
+              <a:t>assigned to </a:t>
+            </a:r>
+            <a:r>
+              <a:rPr lang="en-US" sz="1600" dirty="0" err="1" smtClean="0"/>
+              <a:t>keypoints</a:t>
+            </a:r>
+            <a:r>
+              <a:rPr lang="en-US" sz="1600" dirty="0" smtClean="0"/>
+              <a:t>, lines, </a:t>
+            </a:r>
+            <a:r>
+              <a:rPr lang="en-US" sz="1600" dirty="0" smtClean="0"/>
+              <a:t>areas and volumes back to zero </a:t>
+            </a:r>
+            <a:endParaRPr lang="en-US" sz="1600" dirty="0" smtClean="0"/>
+          </a:p>
+        </p:txBody>
+      </p:sp>
+      <p:sp>
+        <p:nvSpPr>
+          <p:cNvPr id="6" name="TextBox 5"/>
+          <p:cNvSpPr txBox="1"/>
+          <p:nvPr/>
+        </p:nvSpPr>
+        <p:spPr>
+          <a:xfrm>
+            <a:off x="297711" y="2413585"/>
+            <a:ext cx="8846289" cy="523220"/>
+          </a:xfrm>
+          <a:prstGeom prst="rect">
+            <a:avLst/>
+          </a:prstGeom>
+          <a:noFill/>
+          <a:ln>
+            <a:noFill/>
+          </a:ln>
+        </p:spPr>
+        <p:txBody>
+          <a:bodyPr wrap="square" rtlCol="0">
+            <a:spAutoFit/>
+          </a:bodyPr>
+          <a:lstStyle/>
+          <a:p>
+            <a:r>
+              <a:rPr lang="en-US" sz="1400" dirty="0" smtClean="0"/>
+              <a:t>ARG1 = 1 </a:t>
+            </a:r>
+            <a:r>
+              <a:rPr lang="en-US" sz="1400" dirty="0" smtClean="0">
+                <a:sym typeface="Wingdings" pitchFamily="2" charset="2"/>
+              </a:rPr>
+              <a:t> Nodes and Elements </a:t>
+            </a:r>
+            <a:r>
+              <a:rPr lang="en-US" sz="1400" dirty="0" smtClean="0">
+                <a:sym typeface="Wingdings" pitchFamily="2" charset="2"/>
+              </a:rPr>
+              <a:t>are </a:t>
+            </a:r>
+            <a:r>
+              <a:rPr lang="en-US" sz="1400" dirty="0" smtClean="0">
+                <a:sym typeface="Wingdings" pitchFamily="2" charset="2"/>
+              </a:rPr>
+              <a:t>offset </a:t>
+            </a:r>
+            <a:r>
+              <a:rPr lang="en-US" sz="1400" dirty="0" smtClean="0">
+                <a:sym typeface="Wingdings" pitchFamily="2" charset="2"/>
+              </a:rPr>
+              <a:t>as </a:t>
+            </a:r>
+            <a:r>
+              <a:rPr lang="en-US" sz="1400" dirty="0" smtClean="0">
+                <a:sym typeface="Wingdings" pitchFamily="2" charset="2"/>
+              </a:rPr>
+              <a:t>well</a:t>
+            </a:r>
+          </a:p>
+          <a:p>
+            <a:r>
+              <a:rPr lang="en-US" sz="1400" dirty="0" smtClean="0">
+                <a:sym typeface="Wingdings" pitchFamily="2" charset="2"/>
+              </a:rPr>
+              <a:t>ARG1 = 2  </a:t>
+            </a:r>
+            <a:r>
+              <a:rPr lang="en-US" sz="1400" dirty="0" smtClean="0">
+                <a:sym typeface="Wingdings" pitchFamily="2" charset="2"/>
+              </a:rPr>
+              <a:t>Key points, </a:t>
+            </a:r>
+            <a:r>
+              <a:rPr lang="en-US" sz="1400" dirty="0" smtClean="0">
+                <a:sym typeface="Wingdings" pitchFamily="2" charset="2"/>
+              </a:rPr>
+              <a:t>lines, areas, nodes, elements, materials, </a:t>
+            </a:r>
+            <a:r>
+              <a:rPr lang="en-US" sz="1400" dirty="0" smtClean="0">
+                <a:sym typeface="Wingdings" pitchFamily="2" charset="2"/>
+              </a:rPr>
+              <a:t>type, real and </a:t>
+            </a:r>
+            <a:r>
+              <a:rPr lang="en-US" sz="1400" dirty="0" err="1" smtClean="0">
+                <a:sym typeface="Wingdings" pitchFamily="2" charset="2"/>
+              </a:rPr>
+              <a:t>secn</a:t>
+            </a:r>
+            <a:r>
+              <a:rPr lang="en-US" sz="1400" dirty="0" smtClean="0">
+                <a:sym typeface="Wingdings" pitchFamily="2" charset="2"/>
+              </a:rPr>
+              <a:t> are all offset</a:t>
+            </a:r>
+            <a:endParaRPr lang="en-US" sz="1400" dirty="0" smtClean="0"/>
+          </a:p>
+        </p:txBody>
+      </p:sp>
+      <p:sp>
+        <p:nvSpPr>
+          <p:cNvPr id="7" name="TextBox 6"/>
+          <p:cNvSpPr txBox="1"/>
+          <p:nvPr/>
+        </p:nvSpPr>
+        <p:spPr>
+          <a:xfrm>
+            <a:off x="404037" y="2977117"/>
+            <a:ext cx="8059479" cy="307777"/>
+          </a:xfrm>
+          <a:prstGeom prst="rect">
+            <a:avLst/>
+          </a:prstGeom>
+          <a:noFill/>
+          <a:ln>
+            <a:noFill/>
+          </a:ln>
+        </p:spPr>
+        <p:txBody>
+          <a:bodyPr wrap="square" rtlCol="0">
+            <a:spAutoFit/>
+          </a:bodyPr>
+          <a:lstStyle/>
+          <a:p>
+            <a:r>
+              <a:rPr lang="en-US" sz="1400" dirty="0" smtClean="0"/>
+              <a:t>Nodes and key points (Because there are so many) of them are offset by 10X th</a:t>
+            </a:r>
+            <a:r>
+              <a:rPr lang="en-US" sz="1400" dirty="0" smtClean="0"/>
+              <a:t>e offset number</a:t>
+            </a:r>
+            <a:endParaRPr lang="en-US" sz="1400" dirty="0" smtClean="0"/>
+          </a:p>
+        </p:txBody>
+      </p:sp>
+    </p:spTree>
+  </p:cSld>
+  <p:clrMapOvr>
+    <a:masterClrMapping/>
+  </p:clrMapOvr>
+  <p:timing>
+    <p:tnLst>
+      <p:par>
+        <p:cTn id="1" dur="indefinite" restart="never" nodeType="tmRoot">
+          <p:childTnLst>
+            <p:seq concurrent="1" nextAc="seek">
+              <p:cTn id="2" dur="indefinite" nodeType="mainSeq">
+                <p:childTnLst>
+                  <p:par>
+                    <p:cTn id="3" fill="hold">
+                      <p:stCondLst>
+                        <p:cond delay="indefinite"/>
+                      </p:stCondLst>
+                      <p:childTnLst>
+                        <p:par>
+                          <p:cTn id="4" fill="hold">
+                            <p:stCondLst>
+                              <p:cond delay="0"/>
+                            </p:stCondLst>
+                            <p:childTnLst>
+                              <p:par>
+                                <p:cTn id="5" presetID="1" presetClass="entr" presetSubtype="0" fill="hold" grpId="0" nodeType="clickEffect">
+                                  <p:stCondLst>
+                                    <p:cond delay="0"/>
+                                  </p:stCondLst>
+                                  <p:childTnLst>
+                                    <p:set>
+                                      <p:cBhvr>
+                                        <p:cTn id="6" dur="1" fill="hold">
+                                          <p:stCondLst>
+                                            <p:cond delay="0"/>
+                                          </p:stCondLst>
+                                        </p:cTn>
+                                        <p:tgtEl>
+                                          <p:spTgt spid="4"/>
+                                        </p:tgtEl>
+                                        <p:attrNameLst>
+                                          <p:attrName>style.visibility</p:attrName>
+                                        </p:attrNameLst>
+                                      </p:cBhvr>
+                                      <p:to>
+                                        <p:strVal val="visible"/>
+                                      </p:to>
+                                    </p:set>
+                                  </p:childTnLst>
+                                </p:cTn>
+                              </p:par>
+                            </p:childTnLst>
+                          </p:cTn>
+                        </p:par>
+                      </p:childTnLst>
+                    </p:cTn>
+                  </p:par>
+                </p:childTnLst>
+              </p:cTn>
+              <p:prevCondLst>
+                <p:cond evt="onPrev" delay="0">
+                  <p:tgtEl>
+                    <p:sldTgt/>
+                  </p:tgtEl>
+                </p:cond>
+              </p:prevCondLst>
+              <p:nextCondLst>
+                <p:cond evt="onNext" delay="0">
+                  <p:tgtEl>
+                    <p:sldTgt/>
+                  </p:tgtEl>
+                </p:cond>
+              </p:nextCondLst>
+            </p:seq>
+          </p:childTnLst>
+        </p:cTn>
+      </p:par>
+    </p:tnLst>
+    <p:bldLst>
+      <p:bldP spid="4" grpId="0"/>
+    </p:bldLst>
+  </p:timing>
+</p:sld>
+</file>
+
+<file path=ppt/slides/slide29.xml><?xml version="1.0" encoding="utf-8"?>
+<p:sld xmlns:a="http://schemas.openxmlformats.org/drawingml/2006/main" xmlns:r="http://schemas.openxmlformats.org/officeDocument/2006/relationships" xmlns:p="http://schemas.openxmlformats.org/presentationml/2006/main">
+  <p:cSld>
+    <p:spTree>
+      <p:nvGrpSpPr>
+        <p:cNvPr id="1" name=""/>
+        <p:cNvGrpSpPr/>
+        <p:nvPr/>
+      </p:nvGrpSpPr>
+      <p:grpSpPr>
+        <a:xfrm>
+          <a:off x="0" y="0"/>
+          <a:ext cx="0" cy="0"/>
+          <a:chOff x="0" y="0"/>
+          <a:chExt cx="0" cy="0"/>
+        </a:xfrm>
+      </p:grpSpPr>
+      <p:sp>
+        <p:nvSpPr>
+          <p:cNvPr id="2" name="Title 1"/>
+          <p:cNvSpPr>
+            <a:spLocks noGrp="1"/>
+          </p:cNvSpPr>
+          <p:nvPr>
+            <p:ph type="title"/>
+          </p:nvPr>
+        </p:nvSpPr>
+        <p:spPr/>
+        <p:txBody>
+          <a:bodyPr/>
+          <a:lstStyle/>
+          <a:p>
+            <a:r>
+              <a:rPr lang="en-US" dirty="0" smtClean="0"/>
+              <a:t>How do these all work together?</a:t>
+            </a:r>
+            <a:endParaRPr lang="en-US" dirty="0"/>
+          </a:p>
+        </p:txBody>
+      </p:sp>
+      <p:pic>
+        <p:nvPicPr>
+          <p:cNvPr id="1026" name="Picture 2"/>
+          <p:cNvPicPr>
+            <a:picLocks noChangeAspect="1" noChangeArrowheads="1"/>
+          </p:cNvPicPr>
+          <p:nvPr/>
+        </p:nvPicPr>
+        <p:blipFill>
+          <a:blip r:embed="rId2" cstate="print"/>
+          <a:srcRect/>
+          <a:stretch>
+            <a:fillRect/>
+          </a:stretch>
+        </p:blipFill>
+        <p:spPr bwMode="auto">
+          <a:xfrm>
+            <a:off x="245545" y="1751383"/>
+            <a:ext cx="2572082" cy="3507385"/>
+          </a:xfrm>
+          <a:prstGeom prst="rect">
+            <a:avLst/>
+          </a:prstGeom>
+          <a:noFill/>
+          <a:ln w="9525">
+            <a:noFill/>
+            <a:miter lim="800000"/>
+            <a:headEnd/>
+            <a:tailEnd/>
+          </a:ln>
+        </p:spPr>
+      </p:pic>
+      <p:sp>
+        <p:nvSpPr>
+          <p:cNvPr id="4" name="TextBox 3"/>
+          <p:cNvSpPr txBox="1"/>
+          <p:nvPr/>
+        </p:nvSpPr>
+        <p:spPr>
+          <a:xfrm>
+            <a:off x="180753" y="946297"/>
+            <a:ext cx="2700670" cy="707886"/>
+          </a:xfrm>
+          <a:prstGeom prst="rect">
+            <a:avLst/>
+          </a:prstGeom>
+          <a:noFill/>
+          <a:ln>
+            <a:noFill/>
+          </a:ln>
+        </p:spPr>
+        <p:txBody>
+          <a:bodyPr wrap="square" rtlCol="0">
+            <a:spAutoFit/>
+          </a:bodyPr>
+          <a:lstStyle/>
+          <a:p>
+            <a:r>
+              <a:rPr lang="en-US" sz="2000" dirty="0" smtClean="0"/>
+              <a:t>Typical Parametric Build Directory</a:t>
+            </a:r>
+            <a:endParaRPr lang="en-US" sz="2000" dirty="0" smtClean="0"/>
+          </a:p>
+        </p:txBody>
+      </p:sp>
+      <p:sp>
+        <p:nvSpPr>
+          <p:cNvPr id="5" name="TextBox 4"/>
+          <p:cNvSpPr txBox="1"/>
+          <p:nvPr/>
+        </p:nvSpPr>
+        <p:spPr>
+          <a:xfrm>
+            <a:off x="202019" y="5316279"/>
+            <a:ext cx="2711302" cy="307777"/>
+          </a:xfrm>
+          <a:prstGeom prst="rect">
+            <a:avLst/>
+          </a:prstGeom>
+          <a:ln/>
+        </p:spPr>
+        <p:style>
+          <a:lnRef idx="2">
+            <a:schemeClr val="accent2">
+              <a:shade val="50000"/>
+            </a:schemeClr>
+          </a:lnRef>
+          <a:fillRef idx="1">
+            <a:schemeClr val="accent2"/>
+          </a:fillRef>
+          <a:effectRef idx="0">
+            <a:schemeClr val="accent2"/>
+          </a:effectRef>
+          <a:fontRef idx="minor">
+            <a:schemeClr val="lt1"/>
+          </a:fontRef>
+        </p:style>
+        <p:txBody>
+          <a:bodyPr wrap="square" rtlCol="0">
+            <a:spAutoFit/>
+          </a:bodyPr>
+          <a:lstStyle/>
+          <a:p>
+            <a:r>
+              <a:rPr lang="en-US" sz="1400" dirty="0" smtClean="0"/>
+              <a:t>Modular, Modular, Modular….</a:t>
+            </a:r>
+            <a:endParaRPr lang="en-US" sz="1400" dirty="0" smtClean="0"/>
+          </a:p>
+        </p:txBody>
+      </p:sp>
+      <p:sp>
+        <p:nvSpPr>
+          <p:cNvPr id="6" name="Rectangle 5"/>
+          <p:cNvSpPr/>
+          <p:nvPr/>
+        </p:nvSpPr>
+        <p:spPr>
+          <a:xfrm>
+            <a:off x="244549" y="2254102"/>
+            <a:ext cx="1796902" cy="297712"/>
+          </a:xfrm>
+          <a:prstGeom prst="rect">
+            <a:avLst/>
+          </a:prstGeom>
+          <a:noFill/>
+          <a:ln>
+            <a:solidFill>
+              <a:srgbClr val="FF0000"/>
+            </a:solidFill>
+          </a:ln>
+        </p:spPr>
+        <p:style>
+          <a:lnRef idx="2">
+            <a:schemeClr val="accent1">
+              <a:shade val="50000"/>
+            </a:schemeClr>
+          </a:lnRef>
+          <a:fillRef idx="1">
+            <a:schemeClr val="accent1"/>
+          </a:fillRef>
+          <a:effectRef idx="0">
+            <a:schemeClr val="accent1"/>
+          </a:effectRef>
+          <a:fontRef idx="minor">
+            <a:schemeClr val="lt1"/>
+          </a:fontRef>
+        </p:style>
+        <p:txBody>
+          <a:bodyPr rtlCol="0" anchor="ctr"/>
+          <a:lstStyle/>
+          <a:p>
+            <a:pPr algn="ctr"/>
+            <a:endParaRPr lang="en-US"/>
+          </a:p>
+        </p:txBody>
+      </p:sp>
+      <p:sp>
+        <p:nvSpPr>
+          <p:cNvPr id="7" name="Rectangle 6"/>
+          <p:cNvSpPr/>
+          <p:nvPr/>
+        </p:nvSpPr>
+        <p:spPr>
+          <a:xfrm>
+            <a:off x="233916" y="2743200"/>
+            <a:ext cx="1828800" cy="308344"/>
+          </a:xfrm>
+          <a:prstGeom prst="rect">
+            <a:avLst/>
+          </a:prstGeom>
+          <a:noFill/>
+          <a:ln>
+            <a:solidFill>
+              <a:srgbClr val="FF0000"/>
+            </a:solidFill>
+          </a:ln>
+        </p:spPr>
+        <p:style>
+          <a:lnRef idx="2">
+            <a:schemeClr val="accent1">
+              <a:shade val="50000"/>
+            </a:schemeClr>
+          </a:lnRef>
+          <a:fillRef idx="1">
+            <a:schemeClr val="accent1"/>
+          </a:fillRef>
+          <a:effectRef idx="0">
+            <a:schemeClr val="accent1"/>
+          </a:effectRef>
+          <a:fontRef idx="minor">
+            <a:schemeClr val="lt1"/>
+          </a:fontRef>
+        </p:style>
+        <p:txBody>
+          <a:bodyPr rtlCol="0" anchor="ctr"/>
+          <a:lstStyle/>
+          <a:p>
+            <a:pPr algn="ctr"/>
+            <a:endParaRPr lang="en-US"/>
+          </a:p>
+        </p:txBody>
+      </p:sp>
+      <p:sp>
+        <p:nvSpPr>
+          <p:cNvPr id="8" name="Rectangle 7"/>
+          <p:cNvSpPr/>
+          <p:nvPr/>
+        </p:nvSpPr>
+        <p:spPr>
+          <a:xfrm>
+            <a:off x="276447" y="4731488"/>
+            <a:ext cx="1956390" cy="308345"/>
+          </a:xfrm>
+          <a:prstGeom prst="rect">
+            <a:avLst/>
+          </a:prstGeom>
+          <a:noFill/>
+          <a:ln>
+            <a:solidFill>
+              <a:schemeClr val="accent3">
+                <a:lumMod val="75000"/>
+              </a:schemeClr>
+            </a:solidFill>
+          </a:ln>
+        </p:spPr>
+        <p:style>
+          <a:lnRef idx="2">
+            <a:schemeClr val="accent1">
+              <a:shade val="50000"/>
+            </a:schemeClr>
+          </a:lnRef>
+          <a:fillRef idx="1">
+            <a:schemeClr val="accent1"/>
+          </a:fillRef>
+          <a:effectRef idx="0">
+            <a:schemeClr val="accent1"/>
+          </a:effectRef>
+          <a:fontRef idx="minor">
+            <a:schemeClr val="lt1"/>
+          </a:fontRef>
+        </p:style>
+        <p:txBody>
+          <a:bodyPr rtlCol="0" anchor="ctr"/>
+          <a:lstStyle/>
+          <a:p>
+            <a:pPr algn="ctr"/>
+            <a:endParaRPr lang="en-US"/>
+          </a:p>
+        </p:txBody>
+      </p:sp>
+      <p:pic>
+        <p:nvPicPr>
+          <p:cNvPr id="1027" name="Picture 3"/>
+          <p:cNvPicPr>
+            <a:picLocks noChangeAspect="1" noChangeArrowheads="1"/>
+          </p:cNvPicPr>
+          <p:nvPr/>
+        </p:nvPicPr>
+        <p:blipFill>
+          <a:blip r:embed="rId3" cstate="print"/>
+          <a:srcRect/>
+          <a:stretch>
+            <a:fillRect/>
+          </a:stretch>
+        </p:blipFill>
+        <p:spPr bwMode="auto">
+          <a:xfrm>
+            <a:off x="4482399" y="1007325"/>
+            <a:ext cx="4219575" cy="5438775"/>
+          </a:xfrm>
+          <a:prstGeom prst="rect">
+            <a:avLst/>
+          </a:prstGeom>
+          <a:noFill/>
+          <a:ln w="9525">
+            <a:noFill/>
+            <a:miter lim="800000"/>
+            <a:headEnd/>
+            <a:tailEnd/>
+          </a:ln>
+        </p:spPr>
+      </p:pic>
       <p:cxnSp>
         <p:nvCxnSpPr>
-          <p:cNvPr id="15" name="Elbow Connector 14"/>
+          <p:cNvPr id="11" name="Straight Arrow Connector 10"/>
           <p:cNvCxnSpPr>
-            <a:stCxn id="6" idx="2"/>
-            <a:endCxn id="7170" idx="0"/>
+            <a:stCxn id="8" idx="3"/>
+            <a:endCxn id="1027" idx="1"/>
           </p:cNvCxnSpPr>
           <p:nvPr/>
         </p:nvCxnSpPr>
         <p:spPr>
-          <a:xfrm rot="5400000">
-            <a:off x="3088270" y="850163"/>
-            <a:ext cx="223631" cy="1967454"/>
-          </a:xfrm>
-          <a:prstGeom prst="bentConnector3">
-            <a:avLst>
-              <a:gd name="adj1" fmla="val 50000"/>
-            </a:avLst>
-          </a:prstGeom>
-          <a:ln w="25400">
+          <a:xfrm flipV="1">
+            <a:off x="2232837" y="3726713"/>
+            <a:ext cx="2249562" cy="1158948"/>
+          </a:xfrm>
+          <a:prstGeom prst="straightConnector1">
+            <a:avLst/>
+          </a:prstGeom>
+          <a:ln w="41275">
             <a:solidFill>
-              <a:schemeClr val="tx1"/>
+              <a:schemeClr val="accent3">
+                <a:lumMod val="75000"/>
+              </a:schemeClr>
             </a:solidFill>
-            <a:tailEnd type="triangle"/>
+            <a:tailEnd type="arrow"/>
           </a:ln>
         </p:spPr>
         <p:style>
@@ -20959,30 +22979,865 @@
           </a:fontRef>
         </p:style>
       </p:cxnSp>
+      <p:sp>
+        <p:nvSpPr>
+          <p:cNvPr id="12" name="Rectangle 11"/>
+          <p:cNvSpPr/>
+          <p:nvPr/>
+        </p:nvSpPr>
+        <p:spPr>
+          <a:xfrm>
+            <a:off x="4774020" y="2041451"/>
+            <a:ext cx="1701208" cy="212650"/>
+          </a:xfrm>
+          <a:prstGeom prst="rect">
+            <a:avLst/>
+          </a:prstGeom>
+          <a:noFill/>
+          <a:ln>
+            <a:solidFill>
+              <a:srgbClr val="FF0000"/>
+            </a:solidFill>
+          </a:ln>
+        </p:spPr>
+        <p:style>
+          <a:lnRef idx="2">
+            <a:schemeClr val="accent1">
+              <a:shade val="50000"/>
+            </a:schemeClr>
+          </a:lnRef>
+          <a:fillRef idx="1">
+            <a:schemeClr val="accent1"/>
+          </a:fillRef>
+          <a:effectRef idx="0">
+            <a:schemeClr val="accent1"/>
+          </a:effectRef>
+          <a:fontRef idx="minor">
+            <a:schemeClr val="lt1"/>
+          </a:fontRef>
+        </p:style>
+        <p:txBody>
+          <a:bodyPr rtlCol="0" anchor="ctr"/>
+          <a:lstStyle/>
+          <a:p>
+            <a:pPr algn="ctr"/>
+            <a:endParaRPr lang="en-US"/>
+          </a:p>
+        </p:txBody>
+      </p:sp>
+      <p:sp>
+        <p:nvSpPr>
+          <p:cNvPr id="13" name="Rectangle 12"/>
+          <p:cNvSpPr/>
+          <p:nvPr/>
+        </p:nvSpPr>
+        <p:spPr>
+          <a:xfrm>
+            <a:off x="4784650" y="5851451"/>
+            <a:ext cx="1672855" cy="198475"/>
+          </a:xfrm>
+          <a:prstGeom prst="rect">
+            <a:avLst/>
+          </a:prstGeom>
+          <a:noFill/>
+          <a:ln>
+            <a:solidFill>
+              <a:srgbClr val="FF0000"/>
+            </a:solidFill>
+          </a:ln>
+        </p:spPr>
+        <p:style>
+          <a:lnRef idx="2">
+            <a:schemeClr val="accent1">
+              <a:shade val="50000"/>
+            </a:schemeClr>
+          </a:lnRef>
+          <a:fillRef idx="1">
+            <a:schemeClr val="accent1"/>
+          </a:fillRef>
+          <a:effectRef idx="0">
+            <a:schemeClr val="accent1"/>
+          </a:effectRef>
+          <a:fontRef idx="minor">
+            <a:schemeClr val="lt1"/>
+          </a:fontRef>
+        </p:style>
+        <p:txBody>
+          <a:bodyPr rtlCol="0" anchor="ctr"/>
+          <a:lstStyle/>
+          <a:p>
+            <a:pPr algn="ctr"/>
+            <a:endParaRPr lang="en-US"/>
+          </a:p>
+        </p:txBody>
+      </p:sp>
+    </p:spTree>
+  </p:cSld>
+  <p:clrMapOvr>
+    <a:masterClrMapping/>
+  </p:clrMapOvr>
+  <p:timing>
+    <p:tnLst>
+      <p:par>
+        <p:cTn id="1" dur="indefinite" restart="never" nodeType="tmRoot">
+          <p:childTnLst>
+            <p:seq concurrent="1" nextAc="seek">
+              <p:cTn id="2" dur="indefinite" nodeType="mainSeq">
+                <p:childTnLst>
+                  <p:par>
+                    <p:cTn id="3" fill="hold">
+                      <p:stCondLst>
+                        <p:cond delay="indefinite"/>
+                      </p:stCondLst>
+                      <p:childTnLst>
+                        <p:par>
+                          <p:cTn id="4" fill="hold">
+                            <p:stCondLst>
+                              <p:cond delay="0"/>
+                            </p:stCondLst>
+                            <p:childTnLst>
+                              <p:par>
+                                <p:cTn id="5" presetID="1" presetClass="entr" presetSubtype="0" fill="hold" grpId="0" nodeType="clickEffect">
+                                  <p:stCondLst>
+                                    <p:cond delay="0"/>
+                                  </p:stCondLst>
+                                  <p:childTnLst>
+                                    <p:set>
+                                      <p:cBhvr>
+                                        <p:cTn id="6" dur="1" fill="hold">
+                                          <p:stCondLst>
+                                            <p:cond delay="0"/>
+                                          </p:stCondLst>
+                                        </p:cTn>
+                                        <p:tgtEl>
+                                          <p:spTgt spid="5"/>
+                                        </p:tgtEl>
+                                        <p:attrNameLst>
+                                          <p:attrName>style.visibility</p:attrName>
+                                        </p:attrNameLst>
+                                      </p:cBhvr>
+                                      <p:to>
+                                        <p:strVal val="visible"/>
+                                      </p:to>
+                                    </p:set>
+                                  </p:childTnLst>
+                                </p:cTn>
+                              </p:par>
+                            </p:childTnLst>
+                          </p:cTn>
+                        </p:par>
+                      </p:childTnLst>
+                    </p:cTn>
+                  </p:par>
+                  <p:par>
+                    <p:cTn id="7" fill="hold">
+                      <p:stCondLst>
+                        <p:cond delay="indefinite"/>
+                      </p:stCondLst>
+                      <p:childTnLst>
+                        <p:par>
+                          <p:cTn id="8" fill="hold">
+                            <p:stCondLst>
+                              <p:cond delay="0"/>
+                            </p:stCondLst>
+                            <p:childTnLst>
+                              <p:par>
+                                <p:cTn id="9" presetID="1" presetClass="entr" presetSubtype="0" fill="hold" grpId="0" nodeType="clickEffect">
+                                  <p:stCondLst>
+                                    <p:cond delay="0"/>
+                                  </p:stCondLst>
+                                  <p:childTnLst>
+                                    <p:set>
+                                      <p:cBhvr>
+                                        <p:cTn id="10" dur="1" fill="hold">
+                                          <p:stCondLst>
+                                            <p:cond delay="0"/>
+                                          </p:stCondLst>
+                                        </p:cTn>
+                                        <p:tgtEl>
+                                          <p:spTgt spid="7"/>
+                                        </p:tgtEl>
+                                        <p:attrNameLst>
+                                          <p:attrName>style.visibility</p:attrName>
+                                        </p:attrNameLst>
+                                      </p:cBhvr>
+                                      <p:to>
+                                        <p:strVal val="visible"/>
+                                      </p:to>
+                                    </p:set>
+                                  </p:childTnLst>
+                                </p:cTn>
+                              </p:par>
+                              <p:par>
+                                <p:cTn id="11" presetID="1" presetClass="entr" presetSubtype="0" fill="hold" grpId="0" nodeType="withEffect">
+                                  <p:stCondLst>
+                                    <p:cond delay="0"/>
+                                  </p:stCondLst>
+                                  <p:childTnLst>
+                                    <p:set>
+                                      <p:cBhvr>
+                                        <p:cTn id="12" dur="1" fill="hold">
+                                          <p:stCondLst>
+                                            <p:cond delay="0"/>
+                                          </p:stCondLst>
+                                        </p:cTn>
+                                        <p:tgtEl>
+                                          <p:spTgt spid="6"/>
+                                        </p:tgtEl>
+                                        <p:attrNameLst>
+                                          <p:attrName>style.visibility</p:attrName>
+                                        </p:attrNameLst>
+                                      </p:cBhvr>
+                                      <p:to>
+                                        <p:strVal val="visible"/>
+                                      </p:to>
+                                    </p:set>
+                                  </p:childTnLst>
+                                </p:cTn>
+                              </p:par>
+                            </p:childTnLst>
+                          </p:cTn>
+                        </p:par>
+                      </p:childTnLst>
+                    </p:cTn>
+                  </p:par>
+                  <p:par>
+                    <p:cTn id="13" fill="hold">
+                      <p:stCondLst>
+                        <p:cond delay="indefinite"/>
+                      </p:stCondLst>
+                      <p:childTnLst>
+                        <p:par>
+                          <p:cTn id="14" fill="hold">
+                            <p:stCondLst>
+                              <p:cond delay="0"/>
+                            </p:stCondLst>
+                            <p:childTnLst>
+                              <p:par>
+                                <p:cTn id="15" presetID="1" presetClass="entr" presetSubtype="0" fill="hold" grpId="0" nodeType="clickEffect">
+                                  <p:stCondLst>
+                                    <p:cond delay="0"/>
+                                  </p:stCondLst>
+                                  <p:childTnLst>
+                                    <p:set>
+                                      <p:cBhvr>
+                                        <p:cTn id="16" dur="1" fill="hold">
+                                          <p:stCondLst>
+                                            <p:cond delay="0"/>
+                                          </p:stCondLst>
+                                        </p:cTn>
+                                        <p:tgtEl>
+                                          <p:spTgt spid="8"/>
+                                        </p:tgtEl>
+                                        <p:attrNameLst>
+                                          <p:attrName>style.visibility</p:attrName>
+                                        </p:attrNameLst>
+                                      </p:cBhvr>
+                                      <p:to>
+                                        <p:strVal val="visible"/>
+                                      </p:to>
+                                    </p:set>
+                                  </p:childTnLst>
+                                </p:cTn>
+                              </p:par>
+                              <p:par>
+                                <p:cTn id="17" presetID="1" presetClass="entr" presetSubtype="0" fill="hold" nodeType="withEffect">
+                                  <p:stCondLst>
+                                    <p:cond delay="0"/>
+                                  </p:stCondLst>
+                                  <p:childTnLst>
+                                    <p:set>
+                                      <p:cBhvr>
+                                        <p:cTn id="18" dur="1" fill="hold">
+                                          <p:stCondLst>
+                                            <p:cond delay="0"/>
+                                          </p:stCondLst>
+                                        </p:cTn>
+                                        <p:tgtEl>
+                                          <p:spTgt spid="11"/>
+                                        </p:tgtEl>
+                                        <p:attrNameLst>
+                                          <p:attrName>style.visibility</p:attrName>
+                                        </p:attrNameLst>
+                                      </p:cBhvr>
+                                      <p:to>
+                                        <p:strVal val="visible"/>
+                                      </p:to>
+                                    </p:set>
+                                  </p:childTnLst>
+                                </p:cTn>
+                              </p:par>
+                              <p:par>
+                                <p:cTn id="19" presetID="1" presetClass="entr" presetSubtype="0" fill="hold" nodeType="withEffect">
+                                  <p:stCondLst>
+                                    <p:cond delay="0"/>
+                                  </p:stCondLst>
+                                  <p:childTnLst>
+                                    <p:set>
+                                      <p:cBhvr>
+                                        <p:cTn id="20" dur="1" fill="hold">
+                                          <p:stCondLst>
+                                            <p:cond delay="0"/>
+                                          </p:stCondLst>
+                                        </p:cTn>
+                                        <p:tgtEl>
+                                          <p:spTgt spid="1027"/>
+                                        </p:tgtEl>
+                                        <p:attrNameLst>
+                                          <p:attrName>style.visibility</p:attrName>
+                                        </p:attrNameLst>
+                                      </p:cBhvr>
+                                      <p:to>
+                                        <p:strVal val="visible"/>
+                                      </p:to>
+                                    </p:set>
+                                  </p:childTnLst>
+                                </p:cTn>
+                              </p:par>
+                            </p:childTnLst>
+                          </p:cTn>
+                        </p:par>
+                      </p:childTnLst>
+                    </p:cTn>
+                  </p:par>
+                  <p:par>
+                    <p:cTn id="21" fill="hold">
+                      <p:stCondLst>
+                        <p:cond delay="indefinite"/>
+                      </p:stCondLst>
+                      <p:childTnLst>
+                        <p:par>
+                          <p:cTn id="22" fill="hold">
+                            <p:stCondLst>
+                              <p:cond delay="0"/>
+                            </p:stCondLst>
+                            <p:childTnLst>
+                              <p:par>
+                                <p:cTn id="23" presetID="1" presetClass="entr" presetSubtype="0" fill="hold" grpId="0" nodeType="clickEffect">
+                                  <p:stCondLst>
+                                    <p:cond delay="0"/>
+                                  </p:stCondLst>
+                                  <p:childTnLst>
+                                    <p:set>
+                                      <p:cBhvr>
+                                        <p:cTn id="24" dur="1" fill="hold">
+                                          <p:stCondLst>
+                                            <p:cond delay="0"/>
+                                          </p:stCondLst>
+                                        </p:cTn>
+                                        <p:tgtEl>
+                                          <p:spTgt spid="12"/>
+                                        </p:tgtEl>
+                                        <p:attrNameLst>
+                                          <p:attrName>style.visibility</p:attrName>
+                                        </p:attrNameLst>
+                                      </p:cBhvr>
+                                      <p:to>
+                                        <p:strVal val="visible"/>
+                                      </p:to>
+                                    </p:set>
+                                  </p:childTnLst>
+                                </p:cTn>
+                              </p:par>
+                              <p:par>
+                                <p:cTn id="25" presetID="1" presetClass="entr" presetSubtype="0" fill="hold" grpId="0" nodeType="withEffect">
+                                  <p:stCondLst>
+                                    <p:cond delay="0"/>
+                                  </p:stCondLst>
+                                  <p:childTnLst>
+                                    <p:set>
+                                      <p:cBhvr>
+                                        <p:cTn id="26" dur="1" fill="hold">
+                                          <p:stCondLst>
+                                            <p:cond delay="0"/>
+                                          </p:stCondLst>
+                                        </p:cTn>
+                                        <p:tgtEl>
+                                          <p:spTgt spid="13"/>
+                                        </p:tgtEl>
+                                        <p:attrNameLst>
+                                          <p:attrName>style.visibility</p:attrName>
+                                        </p:attrNameLst>
+                                      </p:cBhvr>
+                                      <p:to>
+                                        <p:strVal val="visible"/>
+                                      </p:to>
+                                    </p:set>
+                                  </p:childTnLst>
+                                </p:cTn>
+                              </p:par>
+                            </p:childTnLst>
+                          </p:cTn>
+                        </p:par>
+                      </p:childTnLst>
+                    </p:cTn>
+                  </p:par>
+                </p:childTnLst>
+              </p:cTn>
+              <p:prevCondLst>
+                <p:cond evt="onPrev" delay="0">
+                  <p:tgtEl>
+                    <p:sldTgt/>
+                  </p:tgtEl>
+                </p:cond>
+              </p:prevCondLst>
+              <p:nextCondLst>
+                <p:cond evt="onNext" delay="0">
+                  <p:tgtEl>
+                    <p:sldTgt/>
+                  </p:tgtEl>
+                </p:cond>
+              </p:nextCondLst>
+            </p:seq>
+          </p:childTnLst>
+        </p:cTn>
+      </p:par>
+    </p:tnLst>
+    <p:bldLst>
+      <p:bldP spid="5" grpId="0" animBg="1"/>
+      <p:bldP spid="6" grpId="0" animBg="1"/>
+      <p:bldP spid="7" grpId="0" animBg="1"/>
+      <p:bldP spid="8" grpId="0" animBg="1"/>
+      <p:bldP spid="12" grpId="0" animBg="1"/>
+      <p:bldP spid="13" grpId="0" animBg="1"/>
+    </p:bldLst>
+  </p:timing>
+</p:sld>
+</file>
+
+<file path=ppt/slides/slide3.xml><?xml version="1.0" encoding="utf-8"?>
+<p:sld xmlns:a="http://schemas.openxmlformats.org/drawingml/2006/main" xmlns:r="http://schemas.openxmlformats.org/officeDocument/2006/relationships" xmlns:p="http://schemas.openxmlformats.org/presentationml/2006/main">
+  <p:cSld>
+    <p:spTree>
+      <p:nvGrpSpPr>
+        <p:cNvPr id="1" name=""/>
+        <p:cNvGrpSpPr/>
+        <p:nvPr/>
+      </p:nvGrpSpPr>
+      <p:grpSpPr>
+        <a:xfrm>
+          <a:off x="0" y="0"/>
+          <a:ext cx="0" cy="0"/>
+          <a:chOff x="0" y="0"/>
+          <a:chExt cx="0" cy="0"/>
+        </a:xfrm>
+      </p:grpSpPr>
+      <p:sp>
+        <p:nvSpPr>
+          <p:cNvPr id="5122" name="Rectangle 2"/>
+          <p:cNvSpPr>
+            <a:spLocks noGrp="1" noChangeArrowheads="1"/>
+          </p:cNvSpPr>
+          <p:nvPr>
+            <p:ph type="title"/>
+          </p:nvPr>
+        </p:nvSpPr>
+        <p:spPr/>
+        <p:txBody>
+          <a:bodyPr/>
+          <a:lstStyle/>
+          <a:p>
+            <a:pPr eaLnBrk="1" hangingPunct="1"/>
+            <a:r>
+              <a:rPr lang="en-US" smtClean="0"/>
+              <a:t>What Are ANSYS Macros</a:t>
+            </a:r>
+          </a:p>
+        </p:txBody>
+      </p:sp>
+      <p:sp>
+        <p:nvSpPr>
+          <p:cNvPr id="5123" name="Rectangle 3"/>
+          <p:cNvSpPr>
+            <a:spLocks noGrp="1" noChangeArrowheads="1"/>
+          </p:cNvSpPr>
+          <p:nvPr>
+            <p:ph type="body" idx="1"/>
+          </p:nvPr>
+        </p:nvSpPr>
+        <p:spPr>
+          <a:xfrm>
+            <a:off x="457200" y="1600200"/>
+            <a:ext cx="8229600" cy="2590800"/>
+          </a:xfrm>
+        </p:spPr>
+        <p:txBody>
+          <a:bodyPr/>
+          <a:lstStyle/>
+          <a:p>
+            <a:pPr eaLnBrk="1" hangingPunct="1"/>
+            <a:r>
+              <a:rPr lang="en-US" smtClean="0"/>
+              <a:t>Macros can include arguments to add functionality to the macro</a:t>
+            </a:r>
+          </a:p>
+          <a:p>
+            <a:pPr lvl="1" eaLnBrk="1" hangingPunct="1"/>
+            <a:r>
+              <a:rPr lang="en-US" smtClean="0"/>
+              <a:t>For Example: in the BOLT macro below</a:t>
+            </a:r>
+          </a:p>
+          <a:p>
+            <a:pPr lvl="2" eaLnBrk="1" hangingPunct="1"/>
+            <a:r>
+              <a:rPr lang="en-US" smtClean="0"/>
+              <a:t>Argument 1 specifies a .25” bolt diameter</a:t>
+            </a:r>
+          </a:p>
+          <a:p>
+            <a:pPr lvl="2" eaLnBrk="1" hangingPunct="1"/>
+            <a:r>
+              <a:rPr lang="en-US" smtClean="0"/>
+              <a:t>Argument 2 specifies a bolt preload of 2000 lbf</a:t>
+            </a:r>
+          </a:p>
+        </p:txBody>
+      </p:sp>
+      <p:pic>
+        <p:nvPicPr>
+          <p:cNvPr id="5124" name="Picture 5"/>
+          <p:cNvPicPr>
+            <a:picLocks noChangeAspect="1" noChangeArrowheads="1"/>
+          </p:cNvPicPr>
+          <p:nvPr/>
+        </p:nvPicPr>
+        <p:blipFill>
+          <a:blip r:embed="rId2" cstate="print"/>
+          <a:srcRect/>
+          <a:stretch>
+            <a:fillRect/>
+          </a:stretch>
+        </p:blipFill>
+        <p:spPr bwMode="auto">
+          <a:xfrm>
+            <a:off x="1219200" y="4267200"/>
+            <a:ext cx="6934200" cy="1997075"/>
+          </a:xfrm>
+          <a:prstGeom prst="rect">
+            <a:avLst/>
+          </a:prstGeom>
+          <a:noFill/>
+          <a:ln w="9525">
+            <a:noFill/>
+            <a:miter lim="800000"/>
+            <a:headEnd/>
+            <a:tailEnd/>
+          </a:ln>
+        </p:spPr>
+      </p:pic>
+    </p:spTree>
+  </p:cSld>
+  <p:clrMapOvr>
+    <a:masterClrMapping/>
+  </p:clrMapOvr>
+  <p:timing>
+    <p:tnLst>
+      <p:par>
+        <p:cTn id="1" dur="indefinite" restart="never" nodeType="tmRoot"/>
+      </p:par>
+    </p:tnLst>
+  </p:timing>
+</p:sld>
+</file>
+
+<file path=ppt/slides/slide30.xml><?xml version="1.0" encoding="utf-8"?>
+<p:sld xmlns:a="http://schemas.openxmlformats.org/drawingml/2006/main" xmlns:r="http://schemas.openxmlformats.org/officeDocument/2006/relationships" xmlns:p="http://schemas.openxmlformats.org/presentationml/2006/main">
+  <p:cSld>
+    <p:spTree>
+      <p:nvGrpSpPr>
+        <p:cNvPr id="1" name=""/>
+        <p:cNvGrpSpPr/>
+        <p:nvPr/>
+      </p:nvGrpSpPr>
+      <p:grpSpPr>
+        <a:xfrm>
+          <a:off x="0" y="0"/>
+          <a:ext cx="0" cy="0"/>
+          <a:chOff x="0" y="0"/>
+          <a:chExt cx="0" cy="0"/>
+        </a:xfrm>
+      </p:grpSpPr>
+      <p:sp>
+        <p:nvSpPr>
+          <p:cNvPr id="2" name="Title 1"/>
+          <p:cNvSpPr>
+            <a:spLocks noGrp="1"/>
+          </p:cNvSpPr>
+          <p:nvPr>
+            <p:ph type="title"/>
+          </p:nvPr>
+        </p:nvSpPr>
+        <p:spPr/>
+        <p:txBody>
+          <a:bodyPr/>
+          <a:lstStyle/>
+          <a:p>
+            <a:r>
+              <a:rPr lang="en-US" dirty="0" smtClean="0"/>
+              <a:t>How do these all work together?</a:t>
+            </a:r>
+            <a:endParaRPr lang="en-US" dirty="0"/>
+          </a:p>
+        </p:txBody>
+      </p:sp>
+      <p:pic>
+        <p:nvPicPr>
+          <p:cNvPr id="1026" name="Picture 2"/>
+          <p:cNvPicPr>
+            <a:picLocks noChangeAspect="1" noChangeArrowheads="1"/>
+          </p:cNvPicPr>
+          <p:nvPr/>
+        </p:nvPicPr>
+        <p:blipFill>
+          <a:blip r:embed="rId2" cstate="print"/>
+          <a:srcRect/>
+          <a:stretch>
+            <a:fillRect/>
+          </a:stretch>
+        </p:blipFill>
+        <p:spPr bwMode="auto">
+          <a:xfrm>
+            <a:off x="245545" y="1751383"/>
+            <a:ext cx="2572082" cy="3507385"/>
+          </a:xfrm>
+          <a:prstGeom prst="rect">
+            <a:avLst/>
+          </a:prstGeom>
+          <a:noFill/>
+          <a:ln w="9525">
+            <a:noFill/>
+            <a:miter lim="800000"/>
+            <a:headEnd/>
+            <a:tailEnd/>
+          </a:ln>
+        </p:spPr>
+      </p:pic>
+      <p:sp>
+        <p:nvSpPr>
+          <p:cNvPr id="4" name="TextBox 3"/>
+          <p:cNvSpPr txBox="1"/>
+          <p:nvPr/>
+        </p:nvSpPr>
+        <p:spPr>
+          <a:xfrm>
+            <a:off x="180753" y="946297"/>
+            <a:ext cx="2700670" cy="707886"/>
+          </a:xfrm>
+          <a:prstGeom prst="rect">
+            <a:avLst/>
+          </a:prstGeom>
+          <a:noFill/>
+          <a:ln>
+            <a:noFill/>
+          </a:ln>
+        </p:spPr>
+        <p:txBody>
+          <a:bodyPr wrap="square" rtlCol="0">
+            <a:spAutoFit/>
+          </a:bodyPr>
+          <a:lstStyle/>
+          <a:p>
+            <a:r>
+              <a:rPr lang="en-US" sz="2000" dirty="0" smtClean="0"/>
+              <a:t>Typical Parametric Build Directory</a:t>
+            </a:r>
+            <a:endParaRPr lang="en-US" sz="2000" dirty="0" smtClean="0"/>
+          </a:p>
+        </p:txBody>
+      </p:sp>
+      <p:sp>
+        <p:nvSpPr>
+          <p:cNvPr id="5" name="TextBox 4"/>
+          <p:cNvSpPr txBox="1"/>
+          <p:nvPr/>
+        </p:nvSpPr>
+        <p:spPr>
+          <a:xfrm>
+            <a:off x="202019" y="5316279"/>
+            <a:ext cx="2711302" cy="307777"/>
+          </a:xfrm>
+          <a:prstGeom prst="rect">
+            <a:avLst/>
+          </a:prstGeom>
+          <a:ln/>
+        </p:spPr>
+        <p:style>
+          <a:lnRef idx="2">
+            <a:schemeClr val="accent2">
+              <a:shade val="50000"/>
+            </a:schemeClr>
+          </a:lnRef>
+          <a:fillRef idx="1">
+            <a:schemeClr val="accent2"/>
+          </a:fillRef>
+          <a:effectRef idx="0">
+            <a:schemeClr val="accent2"/>
+          </a:effectRef>
+          <a:fontRef idx="minor">
+            <a:schemeClr val="lt1"/>
+          </a:fontRef>
+        </p:style>
+        <p:txBody>
+          <a:bodyPr wrap="square" rtlCol="0">
+            <a:spAutoFit/>
+          </a:bodyPr>
+          <a:lstStyle/>
+          <a:p>
+            <a:r>
+              <a:rPr lang="en-US" sz="1400" dirty="0" smtClean="0"/>
+              <a:t>Modular, Modular, Modular….</a:t>
+            </a:r>
+            <a:endParaRPr lang="en-US" sz="1400" dirty="0" smtClean="0"/>
+          </a:p>
+        </p:txBody>
+      </p:sp>
+      <p:sp>
+        <p:nvSpPr>
+          <p:cNvPr id="6" name="Rectangle 5"/>
+          <p:cNvSpPr/>
+          <p:nvPr/>
+        </p:nvSpPr>
+        <p:spPr>
+          <a:xfrm>
+            <a:off x="244549" y="2254102"/>
+            <a:ext cx="1796902" cy="297712"/>
+          </a:xfrm>
+          <a:prstGeom prst="rect">
+            <a:avLst/>
+          </a:prstGeom>
+          <a:noFill/>
+          <a:ln>
+            <a:solidFill>
+              <a:srgbClr val="FF0000"/>
+            </a:solidFill>
+          </a:ln>
+        </p:spPr>
+        <p:style>
+          <a:lnRef idx="2">
+            <a:schemeClr val="accent1">
+              <a:shade val="50000"/>
+            </a:schemeClr>
+          </a:lnRef>
+          <a:fillRef idx="1">
+            <a:schemeClr val="accent1"/>
+          </a:fillRef>
+          <a:effectRef idx="0">
+            <a:schemeClr val="accent1"/>
+          </a:effectRef>
+          <a:fontRef idx="minor">
+            <a:schemeClr val="lt1"/>
+          </a:fontRef>
+        </p:style>
+        <p:txBody>
+          <a:bodyPr rtlCol="0" anchor="ctr"/>
+          <a:lstStyle/>
+          <a:p>
+            <a:pPr algn="ctr"/>
+            <a:endParaRPr lang="en-US"/>
+          </a:p>
+        </p:txBody>
+      </p:sp>
+      <p:sp>
+        <p:nvSpPr>
+          <p:cNvPr id="7" name="Rectangle 6"/>
+          <p:cNvSpPr/>
+          <p:nvPr/>
+        </p:nvSpPr>
+        <p:spPr>
+          <a:xfrm>
+            <a:off x="233916" y="2743200"/>
+            <a:ext cx="1828800" cy="308344"/>
+          </a:xfrm>
+          <a:prstGeom prst="rect">
+            <a:avLst/>
+          </a:prstGeom>
+          <a:noFill/>
+          <a:ln>
+            <a:solidFill>
+              <a:srgbClr val="FF0000"/>
+            </a:solidFill>
+          </a:ln>
+        </p:spPr>
+        <p:style>
+          <a:lnRef idx="2">
+            <a:schemeClr val="accent1">
+              <a:shade val="50000"/>
+            </a:schemeClr>
+          </a:lnRef>
+          <a:fillRef idx="1">
+            <a:schemeClr val="accent1"/>
+          </a:fillRef>
+          <a:effectRef idx="0">
+            <a:schemeClr val="accent1"/>
+          </a:effectRef>
+          <a:fontRef idx="minor">
+            <a:schemeClr val="lt1"/>
+          </a:fontRef>
+        </p:style>
+        <p:txBody>
+          <a:bodyPr rtlCol="0" anchor="ctr"/>
+          <a:lstStyle/>
+          <a:p>
+            <a:pPr algn="ctr"/>
+            <a:endParaRPr lang="en-US"/>
+          </a:p>
+        </p:txBody>
+      </p:sp>
+      <p:pic>
+        <p:nvPicPr>
+          <p:cNvPr id="2051" name="Picture 3"/>
+          <p:cNvPicPr>
+            <a:picLocks noChangeAspect="1" noChangeArrowheads="1"/>
+          </p:cNvPicPr>
+          <p:nvPr/>
+        </p:nvPicPr>
+        <p:blipFill>
+          <a:blip r:embed="rId3" cstate="print"/>
+          <a:srcRect/>
+          <a:stretch>
+            <a:fillRect/>
+          </a:stretch>
+        </p:blipFill>
+        <p:spPr bwMode="auto">
+          <a:xfrm>
+            <a:off x="3985547" y="935081"/>
+            <a:ext cx="4424805" cy="5837855"/>
+          </a:xfrm>
+          <a:prstGeom prst="rect">
+            <a:avLst/>
+          </a:prstGeom>
+          <a:noFill/>
+          <a:ln w="9525">
+            <a:noFill/>
+            <a:miter lim="800000"/>
+            <a:headEnd/>
+            <a:tailEnd/>
+          </a:ln>
+        </p:spPr>
+      </p:pic>
       <p:cxnSp>
         <p:nvCxnSpPr>
-          <p:cNvPr id="17" name="Elbow Connector 16"/>
+          <p:cNvPr id="16" name="Straight Arrow Connector 15"/>
           <p:cNvCxnSpPr>
-            <a:stCxn id="8" idx="3"/>
-            <a:endCxn id="7171" idx="1"/>
+            <a:stCxn id="7" idx="3"/>
+            <a:endCxn id="2051" idx="1"/>
           </p:cNvCxnSpPr>
           <p:nvPr/>
         </p:nvCxnSpPr>
         <p:spPr>
-          <a:xfrm flipV="1">
-            <a:off x="4235570" y="4028850"/>
-            <a:ext cx="272248" cy="1284372"/>
-          </a:xfrm>
-          <a:prstGeom prst="bentConnector3">
-            <a:avLst>
-              <a:gd name="adj1" fmla="val 50000"/>
-            </a:avLst>
-          </a:prstGeom>
-          <a:ln w="25400">
+          <a:xfrm>
+            <a:off x="2062716" y="2897372"/>
+            <a:ext cx="1922831" cy="956637"/>
+          </a:xfrm>
+          <a:prstGeom prst="straightConnector1">
+            <a:avLst/>
+          </a:prstGeom>
+          <a:ln w="41275">
             <a:solidFill>
-              <a:schemeClr val="tx1"/>
+              <a:srgbClr val="FF0000"/>
             </a:solidFill>
-            <a:tailEnd type="triangle"/>
+            <a:tailEnd type="arrow"/>
           </a:ln>
         </p:spPr>
         <p:style>
@@ -21015,7 +23870,7 @@
 </p:sld>
 </file>
 
-<file path=ppt/slides/slide3.xml><?xml version="1.0" encoding="utf-8"?>
+<file path=ppt/slides/slide31.xml><?xml version="1.0" encoding="utf-8"?>
 <p:sld xmlns:a="http://schemas.openxmlformats.org/drawingml/2006/main" xmlns:r="http://schemas.openxmlformats.org/officeDocument/2006/relationships" xmlns:p="http://schemas.openxmlformats.org/presentationml/2006/main">
   <p:cSld>
     <p:spTree>
@@ -21034,9 +23889,9 @@
       </p:grpSpPr>
       <p:sp>
         <p:nvSpPr>
-          <p:cNvPr id="5122" name="Rectangle 2"/>
+          <p:cNvPr id="2" name="Title 1"/>
           <p:cNvSpPr>
-            <a:spLocks noGrp="1" noChangeArrowheads="1"/>
+            <a:spLocks noGrp="1"/>
           </p:cNvSpPr>
           <p:nvPr>
             <p:ph type="title"/>
@@ -21047,66 +23902,17 @@
           <a:bodyPr/>
           <a:lstStyle/>
           <a:p>
-            <a:pPr eaLnBrk="1" hangingPunct="1"/>
-            <a:r>
-              <a:rPr lang="en-US" smtClean="0"/>
-              <a:t>What Are ANSYS Macros</a:t>
-            </a:r>
-          </a:p>
-        </p:txBody>
-      </p:sp>
-      <p:sp>
-        <p:nvSpPr>
-          <p:cNvPr id="5123" name="Rectangle 3"/>
-          <p:cNvSpPr>
-            <a:spLocks noGrp="1" noChangeArrowheads="1"/>
-          </p:cNvSpPr>
-          <p:nvPr>
-            <p:ph type="body" idx="1"/>
-          </p:nvPr>
-        </p:nvSpPr>
-        <p:spPr>
-          <a:xfrm>
-            <a:off x="457200" y="1600200"/>
-            <a:ext cx="8229600" cy="2590800"/>
-          </a:xfrm>
-        </p:spPr>
-        <p:txBody>
-          <a:bodyPr/>
-          <a:lstStyle/>
-          <a:p>
-            <a:pPr eaLnBrk="1" hangingPunct="1"/>
-            <a:r>
-              <a:rPr lang="en-US" smtClean="0"/>
-              <a:t>Macros can include arguments to add functionality to the macro</a:t>
-            </a:r>
-          </a:p>
-          <a:p>
-            <a:pPr lvl="1" eaLnBrk="1" hangingPunct="1"/>
-            <a:r>
-              <a:rPr lang="en-US" smtClean="0"/>
-              <a:t>For Example: in the BOLT macro below</a:t>
-            </a:r>
-          </a:p>
-          <a:p>
-            <a:pPr lvl="2" eaLnBrk="1" hangingPunct="1"/>
-            <a:r>
-              <a:rPr lang="en-US" smtClean="0"/>
-              <a:t>Argument 1 specifies a .25” bolt diameter</a:t>
-            </a:r>
-          </a:p>
-          <a:p>
-            <a:pPr lvl="2" eaLnBrk="1" hangingPunct="1"/>
-            <a:r>
-              <a:rPr lang="en-US" smtClean="0"/>
-              <a:t>Argument 2 specifies a bolt preload of 2000 lbf</a:t>
-            </a:r>
+            <a:r>
+              <a:rPr lang="en-US" dirty="0" smtClean="0"/>
+              <a:t>How do these all work together?</a:t>
+            </a:r>
+            <a:endParaRPr lang="en-US" dirty="0"/>
           </a:p>
         </p:txBody>
       </p:sp>
       <p:pic>
         <p:nvPicPr>
-          <p:cNvPr id="5124" name="Picture 5"/>
+          <p:cNvPr id="1026" name="Picture 2"/>
           <p:cNvPicPr>
             <a:picLocks noChangeAspect="1" noChangeArrowheads="1"/>
           </p:cNvPicPr>
@@ -21121,8 +23927,8 @@
         </p:blipFill>
         <p:spPr bwMode="auto">
           <a:xfrm>
-            <a:off x="1219200" y="4267200"/>
-            <a:ext cx="6934200" cy="1997075"/>
+            <a:off x="245545" y="1751383"/>
+            <a:ext cx="2572082" cy="3507385"/>
           </a:xfrm>
           <a:prstGeom prst="rect">
             <a:avLst/>
@@ -21136,6 +23942,808 @@
           </a:ln>
         </p:spPr>
       </p:pic>
+      <p:sp>
+        <p:nvSpPr>
+          <p:cNvPr id="4" name="TextBox 3"/>
+          <p:cNvSpPr txBox="1"/>
+          <p:nvPr/>
+        </p:nvSpPr>
+        <p:spPr>
+          <a:xfrm>
+            <a:off x="180753" y="946297"/>
+            <a:ext cx="2700670" cy="707886"/>
+          </a:xfrm>
+          <a:prstGeom prst="rect">
+            <a:avLst/>
+          </a:prstGeom>
+          <a:noFill/>
+          <a:ln>
+            <a:noFill/>
+          </a:ln>
+        </p:spPr>
+        <p:txBody>
+          <a:bodyPr wrap="square" rtlCol="0">
+            <a:spAutoFit/>
+          </a:bodyPr>
+          <a:lstStyle/>
+          <a:p>
+            <a:r>
+              <a:rPr lang="en-US" sz="2000" dirty="0" smtClean="0"/>
+              <a:t>Typical Parametric Build Directory</a:t>
+            </a:r>
+            <a:endParaRPr lang="en-US" sz="2000" dirty="0" smtClean="0"/>
+          </a:p>
+        </p:txBody>
+      </p:sp>
+      <p:sp>
+        <p:nvSpPr>
+          <p:cNvPr id="5" name="TextBox 4"/>
+          <p:cNvSpPr txBox="1"/>
+          <p:nvPr/>
+        </p:nvSpPr>
+        <p:spPr>
+          <a:xfrm>
+            <a:off x="202019" y="5316279"/>
+            <a:ext cx="2711302" cy="307777"/>
+          </a:xfrm>
+          <a:prstGeom prst="rect">
+            <a:avLst/>
+          </a:prstGeom>
+          <a:ln/>
+        </p:spPr>
+        <p:style>
+          <a:lnRef idx="2">
+            <a:schemeClr val="accent2">
+              <a:shade val="50000"/>
+            </a:schemeClr>
+          </a:lnRef>
+          <a:fillRef idx="1">
+            <a:schemeClr val="accent2"/>
+          </a:fillRef>
+          <a:effectRef idx="0">
+            <a:schemeClr val="accent2"/>
+          </a:effectRef>
+          <a:fontRef idx="minor">
+            <a:schemeClr val="lt1"/>
+          </a:fontRef>
+        </p:style>
+        <p:txBody>
+          <a:bodyPr wrap="square" rtlCol="0">
+            <a:spAutoFit/>
+          </a:bodyPr>
+          <a:lstStyle/>
+          <a:p>
+            <a:r>
+              <a:rPr lang="en-US" sz="1400" dirty="0" smtClean="0"/>
+              <a:t>Modular, Modular, Modular….</a:t>
+            </a:r>
+            <a:endParaRPr lang="en-US" sz="1400" dirty="0" smtClean="0"/>
+          </a:p>
+        </p:txBody>
+      </p:sp>
+      <p:pic>
+        <p:nvPicPr>
+          <p:cNvPr id="4098" name="Picture 2"/>
+          <p:cNvPicPr>
+            <a:picLocks noChangeAspect="1" noChangeArrowheads="1"/>
+          </p:cNvPicPr>
+          <p:nvPr/>
+        </p:nvPicPr>
+        <p:blipFill>
+          <a:blip r:embed="rId3" cstate="print"/>
+          <a:srcRect/>
+          <a:stretch>
+            <a:fillRect/>
+          </a:stretch>
+        </p:blipFill>
+        <p:spPr bwMode="auto">
+          <a:xfrm>
+            <a:off x="4204844" y="960475"/>
+            <a:ext cx="4200525" cy="5638800"/>
+          </a:xfrm>
+          <a:prstGeom prst="rect">
+            <a:avLst/>
+          </a:prstGeom>
+          <a:noFill/>
+          <a:ln w="9525">
+            <a:noFill/>
+            <a:miter lim="800000"/>
+            <a:headEnd/>
+            <a:tailEnd/>
+          </a:ln>
+        </p:spPr>
+      </p:pic>
+      <p:sp>
+        <p:nvSpPr>
+          <p:cNvPr id="11" name="Rectangle 10"/>
+          <p:cNvSpPr/>
+          <p:nvPr/>
+        </p:nvSpPr>
+        <p:spPr>
+          <a:xfrm>
+            <a:off x="414669" y="3487479"/>
+            <a:ext cx="1828800" cy="308344"/>
+          </a:xfrm>
+          <a:prstGeom prst="rect">
+            <a:avLst/>
+          </a:prstGeom>
+          <a:noFill/>
+          <a:ln>
+            <a:solidFill>
+              <a:srgbClr val="FF0000"/>
+            </a:solidFill>
+          </a:ln>
+        </p:spPr>
+        <p:style>
+          <a:lnRef idx="2">
+            <a:schemeClr val="accent1">
+              <a:shade val="50000"/>
+            </a:schemeClr>
+          </a:lnRef>
+          <a:fillRef idx="1">
+            <a:schemeClr val="accent1"/>
+          </a:fillRef>
+          <a:effectRef idx="0">
+            <a:schemeClr val="accent1"/>
+          </a:effectRef>
+          <a:fontRef idx="minor">
+            <a:schemeClr val="lt1"/>
+          </a:fontRef>
+        </p:style>
+        <p:txBody>
+          <a:bodyPr rtlCol="0" anchor="ctr"/>
+          <a:lstStyle/>
+          <a:p>
+            <a:pPr algn="ctr"/>
+            <a:endParaRPr lang="en-US"/>
+          </a:p>
+        </p:txBody>
+      </p:sp>
+      <p:cxnSp>
+        <p:nvCxnSpPr>
+          <p:cNvPr id="12" name="Straight Arrow Connector 11"/>
+          <p:cNvCxnSpPr>
+            <a:stCxn id="11" idx="3"/>
+            <a:endCxn id="4098" idx="1"/>
+          </p:cNvCxnSpPr>
+          <p:nvPr/>
+        </p:nvCxnSpPr>
+        <p:spPr>
+          <a:xfrm>
+            <a:off x="2243469" y="3641651"/>
+            <a:ext cx="1961375" cy="138224"/>
+          </a:xfrm>
+          <a:prstGeom prst="straightConnector1">
+            <a:avLst/>
+          </a:prstGeom>
+          <a:ln w="41275">
+            <a:solidFill>
+              <a:srgbClr val="FF0000"/>
+            </a:solidFill>
+            <a:tailEnd type="arrow"/>
+          </a:ln>
+        </p:spPr>
+        <p:style>
+          <a:lnRef idx="1">
+            <a:schemeClr val="accent1"/>
+          </a:lnRef>
+          <a:fillRef idx="0">
+            <a:schemeClr val="accent1"/>
+          </a:fillRef>
+          <a:effectRef idx="0">
+            <a:schemeClr val="accent1"/>
+          </a:effectRef>
+          <a:fontRef idx="minor">
+            <a:schemeClr val="tx1"/>
+          </a:fontRef>
+        </p:style>
+      </p:cxnSp>
+    </p:spTree>
+  </p:cSld>
+  <p:clrMapOvr>
+    <a:masterClrMapping/>
+  </p:clrMapOvr>
+  <p:timing>
+    <p:tnLst>
+      <p:par>
+        <p:cTn id="1" dur="indefinite" restart="never" nodeType="tmRoot"/>
+      </p:par>
+    </p:tnLst>
+  </p:timing>
+</p:sld>
+</file>
+
+<file path=ppt/slides/slide32.xml><?xml version="1.0" encoding="utf-8"?>
+<p:sld xmlns:a="http://schemas.openxmlformats.org/drawingml/2006/main" xmlns:r="http://schemas.openxmlformats.org/officeDocument/2006/relationships" xmlns:p="http://schemas.openxmlformats.org/presentationml/2006/main">
+  <p:cSld>
+    <p:spTree>
+      <p:nvGrpSpPr>
+        <p:cNvPr id="1" name=""/>
+        <p:cNvGrpSpPr/>
+        <p:nvPr/>
+      </p:nvGrpSpPr>
+      <p:grpSpPr>
+        <a:xfrm>
+          <a:off x="0" y="0"/>
+          <a:ext cx="0" cy="0"/>
+          <a:chOff x="0" y="0"/>
+          <a:chExt cx="0" cy="0"/>
+        </a:xfrm>
+      </p:grpSpPr>
+      <p:sp>
+        <p:nvSpPr>
+          <p:cNvPr id="2" name="Title 1"/>
+          <p:cNvSpPr>
+            <a:spLocks noGrp="1"/>
+          </p:cNvSpPr>
+          <p:nvPr>
+            <p:ph type="title"/>
+          </p:nvPr>
+        </p:nvSpPr>
+        <p:spPr/>
+        <p:txBody>
+          <a:bodyPr/>
+          <a:lstStyle/>
+          <a:p>
+            <a:r>
+              <a:rPr lang="en-US" dirty="0" smtClean="0"/>
+              <a:t>How do these all work together?</a:t>
+            </a:r>
+            <a:endParaRPr lang="en-US" dirty="0"/>
+          </a:p>
+        </p:txBody>
+      </p:sp>
+      <p:pic>
+        <p:nvPicPr>
+          <p:cNvPr id="1026" name="Picture 2"/>
+          <p:cNvPicPr>
+            <a:picLocks noChangeAspect="1" noChangeArrowheads="1"/>
+          </p:cNvPicPr>
+          <p:nvPr/>
+        </p:nvPicPr>
+        <p:blipFill>
+          <a:blip r:embed="rId2" cstate="print"/>
+          <a:srcRect/>
+          <a:stretch>
+            <a:fillRect/>
+          </a:stretch>
+        </p:blipFill>
+        <p:spPr bwMode="auto">
+          <a:xfrm>
+            <a:off x="245545" y="1751383"/>
+            <a:ext cx="2572082" cy="3507385"/>
+          </a:xfrm>
+          <a:prstGeom prst="rect">
+            <a:avLst/>
+          </a:prstGeom>
+          <a:noFill/>
+          <a:ln w="9525">
+            <a:noFill/>
+            <a:miter lim="800000"/>
+            <a:headEnd/>
+            <a:tailEnd/>
+          </a:ln>
+        </p:spPr>
+      </p:pic>
+      <p:sp>
+        <p:nvSpPr>
+          <p:cNvPr id="4" name="TextBox 3"/>
+          <p:cNvSpPr txBox="1"/>
+          <p:nvPr/>
+        </p:nvSpPr>
+        <p:spPr>
+          <a:xfrm>
+            <a:off x="180753" y="946297"/>
+            <a:ext cx="2700670" cy="707886"/>
+          </a:xfrm>
+          <a:prstGeom prst="rect">
+            <a:avLst/>
+          </a:prstGeom>
+          <a:noFill/>
+          <a:ln>
+            <a:noFill/>
+          </a:ln>
+        </p:spPr>
+        <p:txBody>
+          <a:bodyPr wrap="square" rtlCol="0">
+            <a:spAutoFit/>
+          </a:bodyPr>
+          <a:lstStyle/>
+          <a:p>
+            <a:r>
+              <a:rPr lang="en-US" sz="2000" dirty="0" smtClean="0"/>
+              <a:t>Typical Parametric Build Directory</a:t>
+            </a:r>
+            <a:endParaRPr lang="en-US" sz="2000" dirty="0" smtClean="0"/>
+          </a:p>
+        </p:txBody>
+      </p:sp>
+      <p:sp>
+        <p:nvSpPr>
+          <p:cNvPr id="5" name="TextBox 4"/>
+          <p:cNvSpPr txBox="1"/>
+          <p:nvPr/>
+        </p:nvSpPr>
+        <p:spPr>
+          <a:xfrm>
+            <a:off x="202019" y="5316279"/>
+            <a:ext cx="2711302" cy="307777"/>
+          </a:xfrm>
+          <a:prstGeom prst="rect">
+            <a:avLst/>
+          </a:prstGeom>
+          <a:ln/>
+        </p:spPr>
+        <p:style>
+          <a:lnRef idx="2">
+            <a:schemeClr val="accent2">
+              <a:shade val="50000"/>
+            </a:schemeClr>
+          </a:lnRef>
+          <a:fillRef idx="1">
+            <a:schemeClr val="accent2"/>
+          </a:fillRef>
+          <a:effectRef idx="0">
+            <a:schemeClr val="accent2"/>
+          </a:effectRef>
+          <a:fontRef idx="minor">
+            <a:schemeClr val="lt1"/>
+          </a:fontRef>
+        </p:style>
+        <p:txBody>
+          <a:bodyPr wrap="square" rtlCol="0">
+            <a:spAutoFit/>
+          </a:bodyPr>
+          <a:lstStyle/>
+          <a:p>
+            <a:r>
+              <a:rPr lang="en-US" sz="1400" dirty="0" smtClean="0"/>
+              <a:t>Modular, Modular, Modular….</a:t>
+            </a:r>
+            <a:endParaRPr lang="en-US" sz="1400" dirty="0" smtClean="0"/>
+          </a:p>
+        </p:txBody>
+      </p:sp>
+      <p:sp>
+        <p:nvSpPr>
+          <p:cNvPr id="6" name="Rectangle 5"/>
+          <p:cNvSpPr/>
+          <p:nvPr/>
+        </p:nvSpPr>
+        <p:spPr>
+          <a:xfrm>
+            <a:off x="244549" y="2254102"/>
+            <a:ext cx="1796902" cy="297712"/>
+          </a:xfrm>
+          <a:prstGeom prst="rect">
+            <a:avLst/>
+          </a:prstGeom>
+          <a:noFill/>
+          <a:ln>
+            <a:solidFill>
+              <a:srgbClr val="FF0000"/>
+            </a:solidFill>
+          </a:ln>
+        </p:spPr>
+        <p:style>
+          <a:lnRef idx="2">
+            <a:schemeClr val="accent1">
+              <a:shade val="50000"/>
+            </a:schemeClr>
+          </a:lnRef>
+          <a:fillRef idx="1">
+            <a:schemeClr val="accent1"/>
+          </a:fillRef>
+          <a:effectRef idx="0">
+            <a:schemeClr val="accent1"/>
+          </a:effectRef>
+          <a:fontRef idx="minor">
+            <a:schemeClr val="lt1"/>
+          </a:fontRef>
+        </p:style>
+        <p:txBody>
+          <a:bodyPr rtlCol="0" anchor="ctr"/>
+          <a:lstStyle/>
+          <a:p>
+            <a:pPr algn="ctr"/>
+            <a:endParaRPr lang="en-US"/>
+          </a:p>
+        </p:txBody>
+      </p:sp>
+      <p:sp>
+        <p:nvSpPr>
+          <p:cNvPr id="7" name="Rectangle 6"/>
+          <p:cNvSpPr/>
+          <p:nvPr/>
+        </p:nvSpPr>
+        <p:spPr>
+          <a:xfrm>
+            <a:off x="233916" y="2743200"/>
+            <a:ext cx="1828800" cy="308344"/>
+          </a:xfrm>
+          <a:prstGeom prst="rect">
+            <a:avLst/>
+          </a:prstGeom>
+          <a:noFill/>
+          <a:ln>
+            <a:solidFill>
+              <a:srgbClr val="FF0000"/>
+            </a:solidFill>
+          </a:ln>
+        </p:spPr>
+        <p:style>
+          <a:lnRef idx="2">
+            <a:schemeClr val="accent1">
+              <a:shade val="50000"/>
+            </a:schemeClr>
+          </a:lnRef>
+          <a:fillRef idx="1">
+            <a:schemeClr val="accent1"/>
+          </a:fillRef>
+          <a:effectRef idx="0">
+            <a:schemeClr val="accent1"/>
+          </a:effectRef>
+          <a:fontRef idx="minor">
+            <a:schemeClr val="lt1"/>
+          </a:fontRef>
+        </p:style>
+        <p:txBody>
+          <a:bodyPr rtlCol="0" anchor="ctr"/>
+          <a:lstStyle/>
+          <a:p>
+            <a:pPr algn="ctr"/>
+            <a:endParaRPr lang="en-US"/>
+          </a:p>
+        </p:txBody>
+      </p:sp>
+      <p:pic>
+        <p:nvPicPr>
+          <p:cNvPr id="3074" name="Picture 2"/>
+          <p:cNvPicPr>
+            <a:picLocks noChangeAspect="1" noChangeArrowheads="1"/>
+          </p:cNvPicPr>
+          <p:nvPr/>
+        </p:nvPicPr>
+        <p:blipFill>
+          <a:blip r:embed="rId3" cstate="print"/>
+          <a:srcRect/>
+          <a:stretch>
+            <a:fillRect/>
+          </a:stretch>
+        </p:blipFill>
+        <p:spPr bwMode="auto">
+          <a:xfrm>
+            <a:off x="3328211" y="1271696"/>
+            <a:ext cx="5288815" cy="4618739"/>
+          </a:xfrm>
+          <a:prstGeom prst="rect">
+            <a:avLst/>
+          </a:prstGeom>
+          <a:noFill/>
+          <a:ln w="9525">
+            <a:noFill/>
+            <a:miter lim="800000"/>
+            <a:headEnd/>
+            <a:tailEnd/>
+          </a:ln>
+        </p:spPr>
+      </p:pic>
+      <p:cxnSp>
+        <p:nvCxnSpPr>
+          <p:cNvPr id="12" name="Straight Arrow Connector 11"/>
+          <p:cNvCxnSpPr>
+            <a:stCxn id="6" idx="3"/>
+            <a:endCxn id="3074" idx="1"/>
+          </p:cNvCxnSpPr>
+          <p:nvPr/>
+        </p:nvCxnSpPr>
+        <p:spPr>
+          <a:xfrm>
+            <a:off x="2041451" y="2402958"/>
+            <a:ext cx="1286760" cy="1178108"/>
+          </a:xfrm>
+          <a:prstGeom prst="straightConnector1">
+            <a:avLst/>
+          </a:prstGeom>
+          <a:ln w="41275">
+            <a:solidFill>
+              <a:srgbClr val="FF0000"/>
+            </a:solidFill>
+            <a:tailEnd type="arrow"/>
+          </a:ln>
+        </p:spPr>
+        <p:style>
+          <a:lnRef idx="1">
+            <a:schemeClr val="accent1"/>
+          </a:lnRef>
+          <a:fillRef idx="0">
+            <a:schemeClr val="accent1"/>
+          </a:fillRef>
+          <a:effectRef idx="0">
+            <a:schemeClr val="accent1"/>
+          </a:effectRef>
+          <a:fontRef idx="minor">
+            <a:schemeClr val="tx1"/>
+          </a:fontRef>
+        </p:style>
+      </p:cxnSp>
+    </p:spTree>
+  </p:cSld>
+  <p:clrMapOvr>
+    <a:masterClrMapping/>
+  </p:clrMapOvr>
+  <p:timing>
+    <p:tnLst>
+      <p:par>
+        <p:cTn id="1" dur="indefinite" restart="never" nodeType="tmRoot"/>
+      </p:par>
+    </p:tnLst>
+  </p:timing>
+</p:sld>
+</file>
+
+<file path=ppt/slides/slide33.xml><?xml version="1.0" encoding="utf-8"?>
+<p:sld xmlns:a="http://schemas.openxmlformats.org/drawingml/2006/main" xmlns:r="http://schemas.openxmlformats.org/officeDocument/2006/relationships" xmlns:p="http://schemas.openxmlformats.org/presentationml/2006/main">
+  <p:cSld>
+    <p:spTree>
+      <p:nvGrpSpPr>
+        <p:cNvPr id="1" name=""/>
+        <p:cNvGrpSpPr/>
+        <p:nvPr/>
+      </p:nvGrpSpPr>
+      <p:grpSpPr>
+        <a:xfrm>
+          <a:off x="0" y="0"/>
+          <a:ext cx="0" cy="0"/>
+          <a:chOff x="0" y="0"/>
+          <a:chExt cx="0" cy="0"/>
+        </a:xfrm>
+      </p:grpSpPr>
+      <p:sp>
+        <p:nvSpPr>
+          <p:cNvPr id="5" name="Title 4"/>
+          <p:cNvSpPr>
+            <a:spLocks noGrp="1"/>
+          </p:cNvSpPr>
+          <p:nvPr>
+            <p:ph type="title"/>
+          </p:nvPr>
+        </p:nvSpPr>
+        <p:spPr/>
+        <p:txBody>
+          <a:bodyPr/>
+          <a:lstStyle/>
+          <a:p>
+            <a:r>
+              <a:rPr lang="en-US" dirty="0" smtClean="0"/>
+              <a:t>AWESOME, where can I find out more?</a:t>
+            </a:r>
+            <a:endParaRPr lang="en-US" dirty="0"/>
+          </a:p>
+        </p:txBody>
+      </p:sp>
+      <p:sp>
+        <p:nvSpPr>
+          <p:cNvPr id="6" name="TextBox 5"/>
+          <p:cNvSpPr txBox="1"/>
+          <p:nvPr/>
+        </p:nvSpPr>
+        <p:spPr>
+          <a:xfrm>
+            <a:off x="181155" y="983411"/>
+            <a:ext cx="8005313" cy="738664"/>
+          </a:xfrm>
+          <a:prstGeom prst="rect">
+            <a:avLst/>
+          </a:prstGeom>
+          <a:noFill/>
+        </p:spPr>
+        <p:txBody>
+          <a:bodyPr wrap="square" rtlCol="0">
+            <a:spAutoFit/>
+          </a:bodyPr>
+          <a:lstStyle/>
+          <a:p>
+            <a:r>
+              <a:rPr lang="en-US" sz="2400" dirty="0" smtClean="0"/>
+              <a:t>Header of the macros! </a:t>
+            </a:r>
+            <a:r>
+              <a:rPr lang="en-US" dirty="0" smtClean="0"/>
+              <a:t>They are there too help, if something is confusing, let me know, I’m also a decent writer and I can try to clarify.</a:t>
+            </a:r>
+            <a:endParaRPr lang="en-US" dirty="0"/>
+          </a:p>
+        </p:txBody>
+      </p:sp>
+      <p:pic>
+        <p:nvPicPr>
+          <p:cNvPr id="7170" name="Picture 2"/>
+          <p:cNvPicPr>
+            <a:picLocks noChangeAspect="1" noChangeArrowheads="1"/>
+          </p:cNvPicPr>
+          <p:nvPr/>
+        </p:nvPicPr>
+        <p:blipFill>
+          <a:blip r:embed="rId2" cstate="print"/>
+          <a:srcRect/>
+          <a:stretch>
+            <a:fillRect/>
+          </a:stretch>
+        </p:blipFill>
+        <p:spPr bwMode="auto">
+          <a:xfrm>
+            <a:off x="231652" y="1945706"/>
+            <a:ext cx="3969411" cy="2336673"/>
+          </a:xfrm>
+          <a:prstGeom prst="rect">
+            <a:avLst/>
+          </a:prstGeom>
+          <a:noFill/>
+          <a:ln w="9525">
+            <a:noFill/>
+            <a:miter lim="800000"/>
+            <a:headEnd/>
+            <a:tailEnd/>
+          </a:ln>
+        </p:spPr>
+      </p:pic>
+      <p:sp>
+        <p:nvSpPr>
+          <p:cNvPr id="8" name="TextBox 7"/>
+          <p:cNvSpPr txBox="1"/>
+          <p:nvPr/>
+        </p:nvSpPr>
+        <p:spPr>
+          <a:xfrm>
+            <a:off x="250168" y="4666891"/>
+            <a:ext cx="3985402" cy="1292662"/>
+          </a:xfrm>
+          <a:prstGeom prst="rect">
+            <a:avLst/>
+          </a:prstGeom>
+          <a:noFill/>
+        </p:spPr>
+        <p:txBody>
+          <a:bodyPr wrap="square" rtlCol="0">
+            <a:spAutoFit/>
+          </a:bodyPr>
+          <a:lstStyle/>
+          <a:p>
+            <a:r>
+              <a:rPr lang="en-US" sz="2400" dirty="0" smtClean="0"/>
+              <a:t>__</a:t>
+            </a:r>
+            <a:r>
+              <a:rPr lang="en-US" sz="2400" dirty="0" err="1" smtClean="0"/>
+              <a:t>BensMacros.xls</a:t>
+            </a:r>
+            <a:r>
+              <a:rPr lang="en-US" sz="2400" dirty="0" smtClean="0"/>
+              <a:t> </a:t>
+            </a:r>
+            <a:r>
+              <a:rPr lang="en-US" dirty="0" smtClean="0"/>
+              <a:t>is a kind of up to date listing of all the macros with a brief description. Let me know if something is missing, I’ll fix it.</a:t>
+            </a:r>
+            <a:endParaRPr lang="en-US" dirty="0"/>
+          </a:p>
+        </p:txBody>
+      </p:sp>
+      <p:pic>
+        <p:nvPicPr>
+          <p:cNvPr id="7171" name="Picture 3"/>
+          <p:cNvPicPr>
+            <a:picLocks noChangeAspect="1" noChangeArrowheads="1"/>
+          </p:cNvPicPr>
+          <p:nvPr/>
+        </p:nvPicPr>
+        <p:blipFill>
+          <a:blip r:embed="rId3" cstate="print"/>
+          <a:srcRect/>
+          <a:stretch>
+            <a:fillRect/>
+          </a:stretch>
+        </p:blipFill>
+        <p:spPr bwMode="auto">
+          <a:xfrm>
+            <a:off x="4507818" y="2242867"/>
+            <a:ext cx="4434720" cy="3571965"/>
+          </a:xfrm>
+          <a:prstGeom prst="rect">
+            <a:avLst/>
+          </a:prstGeom>
+          <a:noFill/>
+          <a:ln w="9525">
+            <a:noFill/>
+            <a:miter lim="800000"/>
+            <a:headEnd/>
+            <a:tailEnd/>
+          </a:ln>
+        </p:spPr>
+      </p:pic>
+      <p:cxnSp>
+        <p:nvCxnSpPr>
+          <p:cNvPr id="15" name="Elbow Connector 14"/>
+          <p:cNvCxnSpPr>
+            <a:stCxn id="6" idx="2"/>
+            <a:endCxn id="7170" idx="0"/>
+          </p:cNvCxnSpPr>
+          <p:nvPr/>
+        </p:nvCxnSpPr>
+        <p:spPr>
+          <a:xfrm rot="5400000">
+            <a:off x="3088270" y="850163"/>
+            <a:ext cx="223631" cy="1967454"/>
+          </a:xfrm>
+          <a:prstGeom prst="bentConnector3">
+            <a:avLst>
+              <a:gd name="adj1" fmla="val 50000"/>
+            </a:avLst>
+          </a:prstGeom>
+          <a:ln w="25400">
+            <a:solidFill>
+              <a:schemeClr val="tx1"/>
+            </a:solidFill>
+            <a:tailEnd type="triangle"/>
+          </a:ln>
+        </p:spPr>
+        <p:style>
+          <a:lnRef idx="1">
+            <a:schemeClr val="accent1"/>
+          </a:lnRef>
+          <a:fillRef idx="0">
+            <a:schemeClr val="accent1"/>
+          </a:fillRef>
+          <a:effectRef idx="0">
+            <a:schemeClr val="accent1"/>
+          </a:effectRef>
+          <a:fontRef idx="minor">
+            <a:schemeClr val="tx1"/>
+          </a:fontRef>
+        </p:style>
+      </p:cxnSp>
+      <p:cxnSp>
+        <p:nvCxnSpPr>
+          <p:cNvPr id="17" name="Elbow Connector 16"/>
+          <p:cNvCxnSpPr>
+            <a:stCxn id="8" idx="3"/>
+            <a:endCxn id="7171" idx="1"/>
+          </p:cNvCxnSpPr>
+          <p:nvPr/>
+        </p:nvCxnSpPr>
+        <p:spPr>
+          <a:xfrm flipV="1">
+            <a:off x="4235570" y="4028850"/>
+            <a:ext cx="272248" cy="1284372"/>
+          </a:xfrm>
+          <a:prstGeom prst="bentConnector3">
+            <a:avLst>
+              <a:gd name="adj1" fmla="val 50000"/>
+            </a:avLst>
+          </a:prstGeom>
+          <a:ln w="25400">
+            <a:solidFill>
+              <a:schemeClr val="tx1"/>
+            </a:solidFill>
+            <a:tailEnd type="triangle"/>
+          </a:ln>
+        </p:spPr>
+        <p:style>
+          <a:lnRef idx="1">
+            <a:schemeClr val="accent1"/>
+          </a:lnRef>
+          <a:fillRef idx="0">
+            <a:schemeClr val="accent1"/>
+          </a:fillRef>
+          <a:effectRef idx="0">
+            <a:schemeClr val="accent1"/>
+          </a:effectRef>
+          <a:fontRef idx="minor">
+            <a:schemeClr val="tx1"/>
+          </a:fontRef>
+        </p:style>
+      </p:cxnSp>
     </p:spTree>
   </p:cSld>
   <p:clrMapOvr>
@@ -26262,6 +29870,38 @@
     </a:fmtScheme>
   </a:themeElements>
   <a:objectDefaults>
+    <a:spDef>
+      <a:spPr>
+        <a:noFill/>
+        <a:ln>
+          <a:solidFill>
+            <a:srgbClr val="FF0000"/>
+          </a:solidFill>
+        </a:ln>
+      </a:spPr>
+      <a:bodyPr rtlCol="0" anchor="ctr"/>
+      <a:lstStyle>
+        <a:defPPr algn="ctr">
+          <a:defRPr/>
+        </a:defPPr>
+      </a:lstStyle>
+      <a:style>
+        <a:lnRef idx="2">
+          <a:schemeClr val="accent1">
+            <a:shade val="50000"/>
+          </a:schemeClr>
+        </a:lnRef>
+        <a:fillRef idx="1">
+          <a:schemeClr val="accent1"/>
+        </a:fillRef>
+        <a:effectRef idx="0">
+          <a:schemeClr val="accent1"/>
+        </a:effectRef>
+        <a:fontRef idx="minor">
+          <a:schemeClr val="lt1"/>
+        </a:fontRef>
+      </a:style>
+    </a:spDef>
     <a:lnDef>
       <a:spPr>
         <a:ln w="41275">

</xml_diff>

<commit_message>
Modifications and additions to Macro-Mania
</commit_message>
<xml_diff>
--- a/Macro-Mania.pptx
+++ b/Macro-Mania.pptx
@@ -7,10 +7,10 @@
     <p:sldMasterId id="2147483663" r:id="rId3"/>
   </p:sldMasterIdLst>
   <p:notesMasterIdLst>
-    <p:notesMasterId r:id="rId47"/>
+    <p:notesMasterId r:id="rId52"/>
   </p:notesMasterIdLst>
   <p:handoutMasterIdLst>
-    <p:handoutMasterId r:id="rId48"/>
+    <p:handoutMasterId r:id="rId53"/>
   </p:handoutMasterIdLst>
   <p:sldIdLst>
     <p:sldId id="265" r:id="rId4"/>
@@ -55,7 +55,12 @@
     <p:sldId id="313" r:id="rId43"/>
     <p:sldId id="314" r:id="rId44"/>
     <p:sldId id="315" r:id="rId45"/>
-    <p:sldId id="281" r:id="rId46"/>
+    <p:sldId id="316" r:id="rId46"/>
+    <p:sldId id="318" r:id="rId47"/>
+    <p:sldId id="317" r:id="rId48"/>
+    <p:sldId id="319" r:id="rId49"/>
+    <p:sldId id="320" r:id="rId50"/>
+    <p:sldId id="281" r:id="rId51"/>
   </p:sldIdLst>
   <p:sldSz cx="9144000" cy="6858000" type="screen4x3"/>
   <p:notesSz cx="7315200" cy="9601200"/>
@@ -31023,11 +31028,7 @@
             </a:r>
             <a:r>
               <a:rPr lang="en-US" sz="1600" dirty="0" smtClean="0"/>
-              <a:t>View</a:t>
-            </a:r>
-            <a:r>
-              <a:rPr lang="en-US" sz="1600" dirty="0" smtClean="0"/>
-              <a:t>”</a:t>
+              <a:t>View”</a:t>
             </a:r>
             <a:endParaRPr lang="en-US" sz="1600" dirty="0"/>
           </a:p>
@@ -31145,15 +31146,7 @@
           <a:p>
             <a:r>
               <a:rPr lang="en-US" sz="1600" dirty="0" smtClean="0"/>
-              <a:t>Switches to a </a:t>
-            </a:r>
-            <a:r>
-              <a:rPr lang="en-US" sz="1600" dirty="0" smtClean="0"/>
-              <a:t>top view</a:t>
-            </a:r>
-            <a:r>
-              <a:rPr lang="en-US" sz="1600" dirty="0" smtClean="0"/>
-              <a:t>.</a:t>
+              <a:t>Switches to a top view.</a:t>
             </a:r>
           </a:p>
         </p:txBody>
@@ -33009,15 +33002,7 @@
           <a:p>
             <a:r>
               <a:rPr lang="en-US" dirty="0" smtClean="0"/>
-              <a:t>Same as Preprocessor &gt;&gt; Modeling &gt;&gt; Delete &gt;&gt; </a:t>
-            </a:r>
-            <a:r>
-              <a:rPr lang="en-US" dirty="0" smtClean="0"/>
-              <a:t>Volumes and </a:t>
-            </a:r>
-            <a:r>
-              <a:rPr lang="en-US" dirty="0" smtClean="0"/>
-              <a:t>Below</a:t>
+              <a:t>Same as Preprocessor &gt;&gt; Modeling &gt;&gt; Delete &gt;&gt; Volumes and Below</a:t>
             </a:r>
           </a:p>
           <a:p>
@@ -33052,23 +33037,7 @@
           <a:p>
             <a:r>
               <a:rPr lang="en-US" sz="2000" dirty="0" smtClean="0"/>
-              <a:t>, &lt;first </a:t>
-            </a:r>
-            <a:r>
-              <a:rPr lang="en-US" sz="2000" dirty="0" smtClean="0"/>
-              <a:t>volume&gt;, </a:t>
-            </a:r>
-            <a:r>
-              <a:rPr lang="en-US" sz="2000" dirty="0" smtClean="0"/>
-              <a:t>&lt;last </a:t>
-            </a:r>
-            <a:r>
-              <a:rPr lang="en-US" sz="2000" dirty="0" smtClean="0"/>
-              <a:t>volume&gt; </a:t>
-            </a:r>
-            <a:r>
-              <a:rPr lang="en-US" sz="2000" dirty="0" smtClean="0"/>
-              <a:t>, &lt; increment &gt;</a:t>
+              <a:t>, &lt;first volume&gt;, &lt;last volume&gt; , &lt; increment &gt;</a:t>
             </a:r>
             <a:endParaRPr lang="en-US" sz="2000" dirty="0"/>
           </a:p>
@@ -33145,15 +33114,7 @@
                   <a:schemeClr val="tx1"/>
                 </a:solidFill>
               </a:rPr>
-              <a:t>_VDELE</a:t>
-            </a:r>
-            <a:r>
-              <a:rPr lang="en-US" dirty="0" smtClean="0">
-                <a:solidFill>
-                  <a:schemeClr val="tx1"/>
-                </a:solidFill>
-              </a:rPr>
-              <a:t>,-1 </a:t>
+              <a:t>_VDELE,-1 </a:t>
             </a:r>
             <a:r>
               <a:rPr lang="en-US" dirty="0" smtClean="0">
@@ -33170,15 +33131,7 @@
                   <a:schemeClr val="tx1"/>
                 </a:solidFill>
               </a:rPr>
-              <a:t> deletes all selected </a:t>
-            </a:r>
-            <a:r>
-              <a:rPr lang="en-US" dirty="0" smtClean="0">
-                <a:solidFill>
-                  <a:schemeClr val="tx1"/>
-                </a:solidFill>
-              </a:rPr>
-              <a:t>volumes</a:t>
+              <a:t> deletes all selected volumes</a:t>
             </a:r>
             <a:endParaRPr lang="en-US" dirty="0">
               <a:solidFill>
@@ -33212,11 +33165,7 @@
           <a:p>
             <a:r>
               <a:rPr lang="en-US" dirty="0" smtClean="0"/>
-              <a:t>Now you see </a:t>
-            </a:r>
-            <a:r>
-              <a:rPr lang="en-US" dirty="0" smtClean="0"/>
-              <a:t>it</a:t>
+              <a:t>Now you see it</a:t>
             </a:r>
             <a:endParaRPr lang="en-US" dirty="0"/>
           </a:p>
@@ -33393,11 +33342,7 @@
             </a:r>
             <a:r>
               <a:rPr lang="en-US" sz="1600" dirty="0" smtClean="0"/>
-              <a:t>te</a:t>
-            </a:r>
-            <a:r>
-              <a:rPr lang="en-US" sz="1600" dirty="0" smtClean="0"/>
-              <a:t>”</a:t>
+              <a:t>te”</a:t>
             </a:r>
             <a:endParaRPr lang="en-US" sz="1600" dirty="0"/>
           </a:p>
@@ -33817,23 +33762,11 @@
           <a:p>
             <a:r>
               <a:rPr lang="en-US" sz="4800" dirty="0" smtClean="0"/>
-              <a:t>_VGEN_KTK</a:t>
-            </a:r>
-            <a:r>
-              <a:rPr lang="en-US" sz="4800" dirty="0" smtClean="0"/>
-              <a:t>,</a:t>
+              <a:t>_VGEN_KTK,</a:t>
             </a:r>
             <a:r>
               <a:rPr lang="en-US" sz="2000" dirty="0" smtClean="0"/>
-              <a:t> </a:t>
-            </a:r>
-            <a:r>
-              <a:rPr lang="en-US" sz="2000" dirty="0" smtClean="0"/>
-              <a:t>&lt;volume&gt;, </a:t>
-            </a:r>
-            <a:r>
-              <a:rPr lang="en-US" sz="2000" dirty="0" smtClean="0"/>
-              <a:t>&lt;from </a:t>
+              <a:t> &lt;volume&gt;, &lt;from </a:t>
             </a:r>
             <a:r>
               <a:rPr lang="en-US" sz="2000" dirty="0" err="1" smtClean="0"/>
@@ -33936,11 +33869,7 @@
             </a:r>
             <a:r>
               <a:rPr lang="en-US" sz="1600" dirty="0" smtClean="0"/>
-              <a:t>olume</a:t>
-            </a:r>
-            <a:r>
-              <a:rPr lang="en-US" sz="1600" dirty="0" smtClean="0"/>
-              <a:t> </a:t>
+              <a:t>olume </a:t>
             </a:r>
             <a:r>
               <a:rPr lang="en-US" sz="1600" dirty="0" smtClean="0">
@@ -35064,11 +34993,7 @@
             </a:r>
             <a:r>
               <a:rPr lang="en-US" dirty="0" smtClean="0"/>
-              <a:t>olume</a:t>
-            </a:r>
-            <a:r>
-              <a:rPr lang="en-US" dirty="0" smtClean="0"/>
-              <a:t> </a:t>
+              <a:t>olume </a:t>
             </a:r>
             <a:r>
               <a:rPr lang="en-US" dirty="0" smtClean="0">
@@ -35146,7 +35071,6 @@
               <a:rPr lang="en-US" sz="1400" dirty="0" smtClean="0"/>
               <a:t>Material Number assigned to material, can be one of the _MAT materials</a:t>
             </a:r>
-            <a:endParaRPr lang="en-US" sz="1400" dirty="0" smtClean="0"/>
           </a:p>
         </p:txBody>
       </p:sp>
@@ -35208,7 +35132,6 @@
               <a:rPr lang="en-US" sz="1400" dirty="0" smtClean="0"/>
               <a:t>Element Size</a:t>
             </a:r>
-            <a:endParaRPr lang="en-US" sz="1400" dirty="0" smtClean="0"/>
           </a:p>
         </p:txBody>
       </p:sp>
@@ -35270,7 +35193,6 @@
               <a:rPr lang="en-US" sz="1400" dirty="0" smtClean="0"/>
               <a:t>Volume to be meshed (-1 for all). If omitted, user is asked to select volumes</a:t>
             </a:r>
-            <a:endParaRPr lang="en-US" sz="1400" dirty="0" smtClean="0"/>
           </a:p>
         </p:txBody>
       </p:sp>
@@ -35332,7 +35254,6 @@
               <a:rPr lang="en-US" sz="1400" dirty="0" smtClean="0"/>
               <a:t>See SMRT Command</a:t>
             </a:r>
-            <a:endParaRPr lang="en-US" sz="1400" dirty="0" smtClean="0"/>
           </a:p>
         </p:txBody>
       </p:sp>
@@ -35445,11 +35366,6 @@
               </a:rPr>
               <a:t>,802,0.25,-1</a:t>
             </a:r>
-            <a:endParaRPr lang="en-US" sz="1400" b="1" dirty="0" smtClean="0">
-              <a:solidFill>
-                <a:schemeClr val="bg1"/>
-              </a:solidFill>
-            </a:endParaRPr>
           </a:p>
         </p:txBody>
       </p:sp>
@@ -35913,6 +35829,33 @@
                                   </p:childTnLst>
                                 </p:cTn>
                               </p:par>
+                              <p:par>
+                                <p:cTn id="37" presetID="1" presetClass="entr" presetSubtype="0" fill="hold" nodeType="withEffect">
+                                  <p:stCondLst>
+                                    <p:cond delay="0"/>
+                                  </p:stCondLst>
+                                  <p:childTnLst>
+                                    <p:set>
+                                      <p:cBhvr>
+                                        <p:cTn id="38" dur="1" fill="hold">
+                                          <p:stCondLst>
+                                            <p:cond delay="0"/>
+                                          </p:stCondLst>
+                                        </p:cTn>
+                                        <p:tgtEl>
+                                          <p:spTgt spid="4099"/>
+                                        </p:tgtEl>
+                                        <p:attrNameLst>
+                                          <p:attrName>style.visibility</p:attrName>
+                                        </p:attrNameLst>
+                                      </p:cBhvr>
+                                      <p:to>
+                                        <p:strVal val="visible"/>
+                                      </p:to>
+                                    </p:set>
+                                  </p:childTnLst>
+                                </p:cTn>
+                              </p:par>
                             </p:childTnLst>
                           </p:cTn>
                         </p:par>
@@ -35958,6 +35901,4564 @@
 </file>
 
 <file path=ppt/slides/slide43.xml><?xml version="1.0" encoding="utf-8"?>
+<p:sld xmlns:a="http://schemas.openxmlformats.org/drawingml/2006/main" xmlns:r="http://schemas.openxmlformats.org/officeDocument/2006/relationships" xmlns:p="http://schemas.openxmlformats.org/presentationml/2006/main">
+  <p:cSld>
+    <p:spTree>
+      <p:nvGrpSpPr>
+        <p:cNvPr id="1" name=""/>
+        <p:cNvGrpSpPr/>
+        <p:nvPr/>
+      </p:nvGrpSpPr>
+      <p:grpSpPr>
+        <a:xfrm>
+          <a:off x="0" y="0"/>
+          <a:ext cx="0" cy="0"/>
+          <a:chOff x="0" y="0"/>
+          <a:chExt cx="0" cy="0"/>
+        </a:xfrm>
+      </p:grpSpPr>
+      <p:sp>
+        <p:nvSpPr>
+          <p:cNvPr id="2" name="Title 1"/>
+          <p:cNvSpPr>
+            <a:spLocks noGrp="1"/>
+          </p:cNvSpPr>
+          <p:nvPr>
+            <p:ph type="title"/>
+          </p:nvPr>
+        </p:nvSpPr>
+        <p:spPr/>
+        <p:txBody>
+          <a:bodyPr/>
+          <a:lstStyle/>
+          <a:p>
+            <a:r>
+              <a:rPr lang="en-US" dirty="0" smtClean="0"/>
+              <a:t>_VSWEEP.mac</a:t>
+            </a:r>
+            <a:r>
+              <a:rPr lang="en-US" dirty="0" smtClean="0">
+                <a:sym typeface="Wingdings" pitchFamily="2" charset="2"/>
+              </a:rPr>
+              <a:t> Sweep That Volume.</a:t>
+            </a:r>
+            <a:endParaRPr lang="en-US" dirty="0"/>
+          </a:p>
+        </p:txBody>
+      </p:sp>
+      <p:sp>
+        <p:nvSpPr>
+          <p:cNvPr id="3" name="TextBox 2"/>
+          <p:cNvSpPr txBox="1"/>
+          <p:nvPr/>
+        </p:nvSpPr>
+        <p:spPr>
+          <a:xfrm>
+            <a:off x="0" y="879895"/>
+            <a:ext cx="8888819" cy="923330"/>
+          </a:xfrm>
+          <a:prstGeom prst="rect">
+            <a:avLst/>
+          </a:prstGeom>
+          <a:noFill/>
+        </p:spPr>
+        <p:txBody>
+          <a:bodyPr wrap="square" rtlCol="0">
+            <a:spAutoFit/>
+          </a:bodyPr>
+          <a:lstStyle/>
+          <a:p>
+            <a:r>
+              <a:rPr lang="en-US" sz="5400" dirty="0" smtClean="0"/>
+              <a:t>_VSWEEP,</a:t>
+            </a:r>
+            <a:r>
+              <a:rPr lang="en-US" sz="2400" dirty="0" smtClean="0"/>
+              <a:t> </a:t>
+            </a:r>
+            <a:r>
+              <a:rPr lang="en-US" sz="1600" dirty="0" smtClean="0"/>
+              <a:t>&lt;Material Number&gt;,&lt;</a:t>
+            </a:r>
+            <a:r>
+              <a:rPr lang="en-US" sz="1600" dirty="0" err="1" smtClean="0"/>
+              <a:t>ESize</a:t>
+            </a:r>
+            <a:r>
+              <a:rPr lang="en-US" sz="1600" dirty="0" smtClean="0"/>
+              <a:t>&gt;,&lt;Volume Number&gt;</a:t>
+            </a:r>
+            <a:endParaRPr lang="en-US" sz="5400" dirty="0"/>
+          </a:p>
+        </p:txBody>
+      </p:sp>
+      <p:sp>
+        <p:nvSpPr>
+          <p:cNvPr id="4" name="TextBox 3"/>
+          <p:cNvSpPr txBox="1"/>
+          <p:nvPr/>
+        </p:nvSpPr>
+        <p:spPr>
+          <a:xfrm>
+            <a:off x="4226944" y="845389"/>
+            <a:ext cx="4917056" cy="369332"/>
+          </a:xfrm>
+          <a:prstGeom prst="rect">
+            <a:avLst/>
+          </a:prstGeom>
+          <a:noFill/>
+        </p:spPr>
+        <p:txBody>
+          <a:bodyPr wrap="square" rtlCol="0">
+            <a:spAutoFit/>
+          </a:bodyPr>
+          <a:lstStyle/>
+          <a:p>
+            <a:pPr algn="r"/>
+            <a:r>
+              <a:rPr lang="en-US" dirty="0" smtClean="0"/>
+              <a:t>“Think: </a:t>
+            </a:r>
+            <a:r>
+              <a:rPr lang="en-US" dirty="0" smtClean="0">
+                <a:solidFill>
+                  <a:schemeClr val="accent6">
+                    <a:lumMod val="75000"/>
+                  </a:schemeClr>
+                </a:solidFill>
+              </a:rPr>
+              <a:t>V</a:t>
+            </a:r>
+            <a:r>
+              <a:rPr lang="en-US" dirty="0" smtClean="0"/>
+              <a:t>olume </a:t>
+            </a:r>
+            <a:r>
+              <a:rPr lang="en-US" dirty="0" smtClean="0">
+                <a:solidFill>
+                  <a:schemeClr val="accent6">
+                    <a:lumMod val="75000"/>
+                  </a:schemeClr>
+                </a:solidFill>
+              </a:rPr>
+              <a:t>Sweep</a:t>
+            </a:r>
+            <a:r>
+              <a:rPr lang="en-US" dirty="0" smtClean="0"/>
+              <a:t>”</a:t>
+            </a:r>
+            <a:endParaRPr lang="en-US" dirty="0"/>
+          </a:p>
+        </p:txBody>
+      </p:sp>
+      <p:sp>
+        <p:nvSpPr>
+          <p:cNvPr id="5" name="TextBox 4"/>
+          <p:cNvSpPr txBox="1"/>
+          <p:nvPr/>
+        </p:nvSpPr>
+        <p:spPr>
+          <a:xfrm>
+            <a:off x="106322" y="1765005"/>
+            <a:ext cx="1892595" cy="307777"/>
+          </a:xfrm>
+          <a:prstGeom prst="rect">
+            <a:avLst/>
+          </a:prstGeom>
+          <a:noFill/>
+          <a:ln>
+            <a:noFill/>
+          </a:ln>
+        </p:spPr>
+        <p:txBody>
+          <a:bodyPr wrap="square" rtlCol="0">
+            <a:spAutoFit/>
+          </a:bodyPr>
+          <a:lstStyle/>
+          <a:p>
+            <a:r>
+              <a:rPr lang="en-US" sz="1400" b="1" dirty="0" smtClean="0"/>
+              <a:t>Material Number</a:t>
+            </a:r>
+            <a:endParaRPr lang="en-US" sz="1400" dirty="0" smtClean="0"/>
+          </a:p>
+        </p:txBody>
+      </p:sp>
+      <p:sp>
+        <p:nvSpPr>
+          <p:cNvPr id="6" name="Rectangle 5"/>
+          <p:cNvSpPr/>
+          <p:nvPr/>
+        </p:nvSpPr>
+        <p:spPr>
+          <a:xfrm>
+            <a:off x="1775606" y="1741325"/>
+            <a:ext cx="6025117" cy="307777"/>
+          </a:xfrm>
+          <a:prstGeom prst="rect">
+            <a:avLst/>
+          </a:prstGeom>
+        </p:spPr>
+        <p:txBody>
+          <a:bodyPr wrap="square">
+            <a:spAutoFit/>
+          </a:bodyPr>
+          <a:lstStyle/>
+          <a:p>
+            <a:r>
+              <a:rPr lang="en-US" sz="1400" dirty="0" smtClean="0"/>
+              <a:t>Material Number assigned to material, can be one of the _MAT materials</a:t>
+            </a:r>
+          </a:p>
+        </p:txBody>
+      </p:sp>
+      <p:sp>
+        <p:nvSpPr>
+          <p:cNvPr id="7" name="TextBox 6"/>
+          <p:cNvSpPr txBox="1"/>
+          <p:nvPr/>
+        </p:nvSpPr>
+        <p:spPr>
+          <a:xfrm>
+            <a:off x="109864" y="2031949"/>
+            <a:ext cx="1892595" cy="307777"/>
+          </a:xfrm>
+          <a:prstGeom prst="rect">
+            <a:avLst/>
+          </a:prstGeom>
+          <a:noFill/>
+          <a:ln>
+            <a:noFill/>
+          </a:ln>
+        </p:spPr>
+        <p:txBody>
+          <a:bodyPr wrap="square" rtlCol="0">
+            <a:spAutoFit/>
+          </a:bodyPr>
+          <a:lstStyle/>
+          <a:p>
+            <a:r>
+              <a:rPr lang="en-US" sz="1400" b="1" dirty="0" err="1" smtClean="0"/>
+              <a:t>ESize</a:t>
+            </a:r>
+            <a:endParaRPr lang="en-US" sz="1400" dirty="0" smtClean="0"/>
+          </a:p>
+        </p:txBody>
+      </p:sp>
+      <p:sp>
+        <p:nvSpPr>
+          <p:cNvPr id="8" name="Rectangle 7"/>
+          <p:cNvSpPr/>
+          <p:nvPr/>
+        </p:nvSpPr>
+        <p:spPr>
+          <a:xfrm>
+            <a:off x="1779149" y="2031949"/>
+            <a:ext cx="1410582" cy="307777"/>
+          </a:xfrm>
+          <a:prstGeom prst="rect">
+            <a:avLst/>
+          </a:prstGeom>
+        </p:spPr>
+        <p:txBody>
+          <a:bodyPr wrap="square">
+            <a:spAutoFit/>
+          </a:bodyPr>
+          <a:lstStyle/>
+          <a:p>
+            <a:r>
+              <a:rPr lang="en-US" sz="1400" dirty="0" smtClean="0"/>
+              <a:t>Element Size</a:t>
+            </a:r>
+          </a:p>
+        </p:txBody>
+      </p:sp>
+      <p:sp>
+        <p:nvSpPr>
+          <p:cNvPr id="9" name="TextBox 8"/>
+          <p:cNvSpPr txBox="1"/>
+          <p:nvPr/>
+        </p:nvSpPr>
+        <p:spPr>
+          <a:xfrm>
+            <a:off x="124041" y="2280042"/>
+            <a:ext cx="1892595" cy="307777"/>
+          </a:xfrm>
+          <a:prstGeom prst="rect">
+            <a:avLst/>
+          </a:prstGeom>
+          <a:noFill/>
+          <a:ln>
+            <a:noFill/>
+          </a:ln>
+        </p:spPr>
+        <p:txBody>
+          <a:bodyPr wrap="square" rtlCol="0">
+            <a:spAutoFit/>
+          </a:bodyPr>
+          <a:lstStyle/>
+          <a:p>
+            <a:r>
+              <a:rPr lang="en-US" sz="1400" b="1" dirty="0" smtClean="0"/>
+              <a:t>Volume Number</a:t>
+            </a:r>
+            <a:endParaRPr lang="en-US" sz="1400" dirty="0" smtClean="0"/>
+          </a:p>
+        </p:txBody>
+      </p:sp>
+      <p:sp>
+        <p:nvSpPr>
+          <p:cNvPr id="10" name="Rectangle 9"/>
+          <p:cNvSpPr/>
+          <p:nvPr/>
+        </p:nvSpPr>
+        <p:spPr>
+          <a:xfrm>
+            <a:off x="1793326" y="2280042"/>
+            <a:ext cx="6383076" cy="307777"/>
+          </a:xfrm>
+          <a:prstGeom prst="rect">
+            <a:avLst/>
+          </a:prstGeom>
+        </p:spPr>
+        <p:txBody>
+          <a:bodyPr wrap="square">
+            <a:spAutoFit/>
+          </a:bodyPr>
+          <a:lstStyle/>
+          <a:p>
+            <a:r>
+              <a:rPr lang="en-US" sz="1400" dirty="0" smtClean="0"/>
+              <a:t>Volume to be meshed (-1 for all). If omitted, user is asked to select volumes</a:t>
+            </a:r>
+          </a:p>
+        </p:txBody>
+      </p:sp>
+      <p:sp>
+        <p:nvSpPr>
+          <p:cNvPr id="16" name="TextBox 15"/>
+          <p:cNvSpPr txBox="1"/>
+          <p:nvPr/>
+        </p:nvSpPr>
+        <p:spPr>
+          <a:xfrm>
+            <a:off x="3498110" y="3976577"/>
+            <a:ext cx="2052086" cy="307777"/>
+          </a:xfrm>
+          <a:prstGeom prst="rect">
+            <a:avLst/>
+          </a:prstGeom>
+          <a:solidFill>
+            <a:schemeClr val="tx1"/>
+          </a:solidFill>
+          <a:ln>
+            <a:noFill/>
+          </a:ln>
+        </p:spPr>
+        <p:txBody>
+          <a:bodyPr wrap="square" rtlCol="0">
+            <a:spAutoFit/>
+          </a:bodyPr>
+          <a:lstStyle/>
+          <a:p>
+            <a:r>
+              <a:rPr lang="en-US" sz="1400" b="1" dirty="0" smtClean="0">
+                <a:solidFill>
+                  <a:schemeClr val="accent6">
+                    <a:lumMod val="75000"/>
+                  </a:schemeClr>
+                </a:solidFill>
+              </a:rPr>
+              <a:t>_VSWEEP</a:t>
+            </a:r>
+            <a:r>
+              <a:rPr lang="en-US" sz="1400" b="1" dirty="0" smtClean="0">
+                <a:solidFill>
+                  <a:schemeClr val="bg1"/>
+                </a:solidFill>
+              </a:rPr>
+              <a:t>,802,0.05,-1</a:t>
+            </a:r>
+          </a:p>
+        </p:txBody>
+      </p:sp>
+      <p:sp>
+        <p:nvSpPr>
+          <p:cNvPr id="17" name="Right Arrow 16"/>
+          <p:cNvSpPr/>
+          <p:nvPr/>
+        </p:nvSpPr>
+        <p:spPr>
+          <a:xfrm>
+            <a:off x="4242391" y="4465681"/>
+            <a:ext cx="637953" cy="414670"/>
+          </a:xfrm>
+          <a:prstGeom prst="rightArrow">
+            <a:avLst/>
+          </a:prstGeom>
+          <a:solidFill>
+            <a:srgbClr val="FF0000"/>
+          </a:solidFill>
+          <a:ln>
+            <a:solidFill>
+              <a:srgbClr val="C00000"/>
+            </a:solidFill>
+          </a:ln>
+        </p:spPr>
+        <p:style>
+          <a:lnRef idx="2">
+            <a:schemeClr val="accent1">
+              <a:shade val="50000"/>
+            </a:schemeClr>
+          </a:lnRef>
+          <a:fillRef idx="1">
+            <a:schemeClr val="accent1"/>
+          </a:fillRef>
+          <a:effectRef idx="0">
+            <a:schemeClr val="accent1"/>
+          </a:effectRef>
+          <a:fontRef idx="minor">
+            <a:schemeClr val="lt1"/>
+          </a:fontRef>
+        </p:style>
+        <p:txBody>
+          <a:bodyPr rtlCol="0" anchor="ctr"/>
+          <a:lstStyle/>
+          <a:p>
+            <a:pPr algn="ctr"/>
+            <a:endParaRPr lang="en-US"/>
+          </a:p>
+        </p:txBody>
+      </p:sp>
+      <p:pic>
+        <p:nvPicPr>
+          <p:cNvPr id="1026" name="Picture 2"/>
+          <p:cNvPicPr>
+            <a:picLocks noChangeAspect="1" noChangeArrowheads="1"/>
+          </p:cNvPicPr>
+          <p:nvPr/>
+        </p:nvPicPr>
+        <p:blipFill>
+          <a:blip r:embed="rId2" cstate="print"/>
+          <a:srcRect/>
+          <a:stretch>
+            <a:fillRect/>
+          </a:stretch>
+        </p:blipFill>
+        <p:spPr bwMode="auto">
+          <a:xfrm>
+            <a:off x="375464" y="3369516"/>
+            <a:ext cx="3026956" cy="2285788"/>
+          </a:xfrm>
+          <a:prstGeom prst="rect">
+            <a:avLst/>
+          </a:prstGeom>
+          <a:noFill/>
+          <a:ln w="9525">
+            <a:noFill/>
+            <a:miter lim="800000"/>
+            <a:headEnd/>
+            <a:tailEnd/>
+          </a:ln>
+        </p:spPr>
+      </p:pic>
+      <p:pic>
+        <p:nvPicPr>
+          <p:cNvPr id="1027" name="Picture 3"/>
+          <p:cNvPicPr>
+            <a:picLocks noChangeAspect="1" noChangeArrowheads="1"/>
+          </p:cNvPicPr>
+          <p:nvPr/>
+        </p:nvPicPr>
+        <p:blipFill>
+          <a:blip r:embed="rId3" cstate="print"/>
+          <a:srcRect/>
+          <a:stretch>
+            <a:fillRect/>
+          </a:stretch>
+        </p:blipFill>
+        <p:spPr bwMode="auto">
+          <a:xfrm>
+            <a:off x="5608921" y="3264196"/>
+            <a:ext cx="3302602" cy="2482037"/>
+          </a:xfrm>
+          <a:prstGeom prst="rect">
+            <a:avLst/>
+          </a:prstGeom>
+          <a:noFill/>
+          <a:ln w="9525">
+            <a:noFill/>
+            <a:miter lim="800000"/>
+            <a:headEnd/>
+            <a:tailEnd/>
+          </a:ln>
+        </p:spPr>
+      </p:pic>
+      <p:sp>
+        <p:nvSpPr>
+          <p:cNvPr id="15" name="TextBox 14"/>
+          <p:cNvSpPr txBox="1"/>
+          <p:nvPr/>
+        </p:nvSpPr>
+        <p:spPr>
+          <a:xfrm>
+            <a:off x="3157870" y="5837276"/>
+            <a:ext cx="2668772" cy="461665"/>
+          </a:xfrm>
+          <a:prstGeom prst="rect">
+            <a:avLst/>
+          </a:prstGeom>
+          <a:ln/>
+        </p:spPr>
+        <p:style>
+          <a:lnRef idx="1">
+            <a:schemeClr val="accent3"/>
+          </a:lnRef>
+          <a:fillRef idx="2">
+            <a:schemeClr val="accent3"/>
+          </a:fillRef>
+          <a:effectRef idx="1">
+            <a:schemeClr val="accent3"/>
+          </a:effectRef>
+          <a:fontRef idx="minor">
+            <a:schemeClr val="dk1"/>
+          </a:fontRef>
+        </p:style>
+        <p:txBody>
+          <a:bodyPr wrap="square" rtlCol="0">
+            <a:spAutoFit/>
+          </a:bodyPr>
+          <a:lstStyle/>
+          <a:p>
+            <a:pPr algn="ctr"/>
+            <a:r>
+              <a:rPr lang="en-US" sz="2400" dirty="0" smtClean="0"/>
+              <a:t>Works with _UNDO</a:t>
+            </a:r>
+          </a:p>
+        </p:txBody>
+      </p:sp>
+    </p:spTree>
+  </p:cSld>
+  <p:clrMapOvr>
+    <a:masterClrMapping/>
+  </p:clrMapOvr>
+  <p:timing>
+    <p:tnLst>
+      <p:par>
+        <p:cTn id="1" dur="indefinite" restart="never" nodeType="tmRoot">
+          <p:childTnLst>
+            <p:seq concurrent="1" nextAc="seek">
+              <p:cTn id="2" dur="indefinite" nodeType="mainSeq">
+                <p:childTnLst>
+                  <p:par>
+                    <p:cTn id="3" fill="hold">
+                      <p:stCondLst>
+                        <p:cond delay="indefinite"/>
+                      </p:stCondLst>
+                      <p:childTnLst>
+                        <p:par>
+                          <p:cTn id="4" fill="hold">
+                            <p:stCondLst>
+                              <p:cond delay="0"/>
+                            </p:stCondLst>
+                            <p:childTnLst>
+                              <p:par>
+                                <p:cTn id="5" presetID="1" presetClass="entr" presetSubtype="0" fill="hold" grpId="0" nodeType="clickEffect">
+                                  <p:stCondLst>
+                                    <p:cond delay="0"/>
+                                  </p:stCondLst>
+                                  <p:childTnLst>
+                                    <p:set>
+                                      <p:cBhvr>
+                                        <p:cTn id="6" dur="1" fill="hold">
+                                          <p:stCondLst>
+                                            <p:cond delay="0"/>
+                                          </p:stCondLst>
+                                        </p:cTn>
+                                        <p:tgtEl>
+                                          <p:spTgt spid="6"/>
+                                        </p:tgtEl>
+                                        <p:attrNameLst>
+                                          <p:attrName>style.visibility</p:attrName>
+                                        </p:attrNameLst>
+                                      </p:cBhvr>
+                                      <p:to>
+                                        <p:strVal val="visible"/>
+                                      </p:to>
+                                    </p:set>
+                                  </p:childTnLst>
+                                </p:cTn>
+                              </p:par>
+                              <p:par>
+                                <p:cTn id="7" presetID="1" presetClass="entr" presetSubtype="0" fill="hold" grpId="0" nodeType="withEffect">
+                                  <p:stCondLst>
+                                    <p:cond delay="0"/>
+                                  </p:stCondLst>
+                                  <p:childTnLst>
+                                    <p:set>
+                                      <p:cBhvr>
+                                        <p:cTn id="8" dur="1" fill="hold">
+                                          <p:stCondLst>
+                                            <p:cond delay="0"/>
+                                          </p:stCondLst>
+                                        </p:cTn>
+                                        <p:tgtEl>
+                                          <p:spTgt spid="5"/>
+                                        </p:tgtEl>
+                                        <p:attrNameLst>
+                                          <p:attrName>style.visibility</p:attrName>
+                                        </p:attrNameLst>
+                                      </p:cBhvr>
+                                      <p:to>
+                                        <p:strVal val="visible"/>
+                                      </p:to>
+                                    </p:set>
+                                  </p:childTnLst>
+                                </p:cTn>
+                              </p:par>
+                            </p:childTnLst>
+                          </p:cTn>
+                        </p:par>
+                      </p:childTnLst>
+                    </p:cTn>
+                  </p:par>
+                  <p:par>
+                    <p:cTn id="9" fill="hold">
+                      <p:stCondLst>
+                        <p:cond delay="indefinite"/>
+                      </p:stCondLst>
+                      <p:childTnLst>
+                        <p:par>
+                          <p:cTn id="10" fill="hold">
+                            <p:stCondLst>
+                              <p:cond delay="0"/>
+                            </p:stCondLst>
+                            <p:childTnLst>
+                              <p:par>
+                                <p:cTn id="11" presetID="1" presetClass="entr" presetSubtype="0" fill="hold" grpId="0" nodeType="clickEffect">
+                                  <p:stCondLst>
+                                    <p:cond delay="0"/>
+                                  </p:stCondLst>
+                                  <p:childTnLst>
+                                    <p:set>
+                                      <p:cBhvr>
+                                        <p:cTn id="12" dur="1" fill="hold">
+                                          <p:stCondLst>
+                                            <p:cond delay="0"/>
+                                          </p:stCondLst>
+                                        </p:cTn>
+                                        <p:tgtEl>
+                                          <p:spTgt spid="7"/>
+                                        </p:tgtEl>
+                                        <p:attrNameLst>
+                                          <p:attrName>style.visibility</p:attrName>
+                                        </p:attrNameLst>
+                                      </p:cBhvr>
+                                      <p:to>
+                                        <p:strVal val="visible"/>
+                                      </p:to>
+                                    </p:set>
+                                  </p:childTnLst>
+                                </p:cTn>
+                              </p:par>
+                              <p:par>
+                                <p:cTn id="13" presetID="1" presetClass="entr" presetSubtype="0" fill="hold" grpId="0" nodeType="withEffect">
+                                  <p:stCondLst>
+                                    <p:cond delay="0"/>
+                                  </p:stCondLst>
+                                  <p:childTnLst>
+                                    <p:set>
+                                      <p:cBhvr>
+                                        <p:cTn id="14" dur="1" fill="hold">
+                                          <p:stCondLst>
+                                            <p:cond delay="0"/>
+                                          </p:stCondLst>
+                                        </p:cTn>
+                                        <p:tgtEl>
+                                          <p:spTgt spid="8"/>
+                                        </p:tgtEl>
+                                        <p:attrNameLst>
+                                          <p:attrName>style.visibility</p:attrName>
+                                        </p:attrNameLst>
+                                      </p:cBhvr>
+                                      <p:to>
+                                        <p:strVal val="visible"/>
+                                      </p:to>
+                                    </p:set>
+                                  </p:childTnLst>
+                                </p:cTn>
+                              </p:par>
+                            </p:childTnLst>
+                          </p:cTn>
+                        </p:par>
+                      </p:childTnLst>
+                    </p:cTn>
+                  </p:par>
+                  <p:par>
+                    <p:cTn id="15" fill="hold">
+                      <p:stCondLst>
+                        <p:cond delay="indefinite"/>
+                      </p:stCondLst>
+                      <p:childTnLst>
+                        <p:par>
+                          <p:cTn id="16" fill="hold">
+                            <p:stCondLst>
+                              <p:cond delay="0"/>
+                            </p:stCondLst>
+                            <p:childTnLst>
+                              <p:par>
+                                <p:cTn id="17" presetID="1" presetClass="entr" presetSubtype="0" fill="hold" grpId="0" nodeType="clickEffect">
+                                  <p:stCondLst>
+                                    <p:cond delay="0"/>
+                                  </p:stCondLst>
+                                  <p:childTnLst>
+                                    <p:set>
+                                      <p:cBhvr>
+                                        <p:cTn id="18" dur="1" fill="hold">
+                                          <p:stCondLst>
+                                            <p:cond delay="0"/>
+                                          </p:stCondLst>
+                                        </p:cTn>
+                                        <p:tgtEl>
+                                          <p:spTgt spid="9"/>
+                                        </p:tgtEl>
+                                        <p:attrNameLst>
+                                          <p:attrName>style.visibility</p:attrName>
+                                        </p:attrNameLst>
+                                      </p:cBhvr>
+                                      <p:to>
+                                        <p:strVal val="visible"/>
+                                      </p:to>
+                                    </p:set>
+                                  </p:childTnLst>
+                                </p:cTn>
+                              </p:par>
+                              <p:par>
+                                <p:cTn id="19" presetID="1" presetClass="entr" presetSubtype="0" fill="hold" grpId="0" nodeType="withEffect">
+                                  <p:stCondLst>
+                                    <p:cond delay="0"/>
+                                  </p:stCondLst>
+                                  <p:childTnLst>
+                                    <p:set>
+                                      <p:cBhvr>
+                                        <p:cTn id="20" dur="1" fill="hold">
+                                          <p:stCondLst>
+                                            <p:cond delay="0"/>
+                                          </p:stCondLst>
+                                        </p:cTn>
+                                        <p:tgtEl>
+                                          <p:spTgt spid="10"/>
+                                        </p:tgtEl>
+                                        <p:attrNameLst>
+                                          <p:attrName>style.visibility</p:attrName>
+                                        </p:attrNameLst>
+                                      </p:cBhvr>
+                                      <p:to>
+                                        <p:strVal val="visible"/>
+                                      </p:to>
+                                    </p:set>
+                                  </p:childTnLst>
+                                </p:cTn>
+                              </p:par>
+                            </p:childTnLst>
+                          </p:cTn>
+                        </p:par>
+                      </p:childTnLst>
+                    </p:cTn>
+                  </p:par>
+                  <p:par>
+                    <p:cTn id="21" fill="hold">
+                      <p:stCondLst>
+                        <p:cond delay="indefinite"/>
+                      </p:stCondLst>
+                      <p:childTnLst>
+                        <p:par>
+                          <p:cTn id="22" fill="hold">
+                            <p:stCondLst>
+                              <p:cond delay="0"/>
+                            </p:stCondLst>
+                            <p:childTnLst>
+                              <p:par>
+                                <p:cTn id="23" presetID="1" presetClass="entr" presetSubtype="0" fill="hold" nodeType="clickEffect">
+                                  <p:stCondLst>
+                                    <p:cond delay="0"/>
+                                  </p:stCondLst>
+                                  <p:childTnLst>
+                                    <p:set>
+                                      <p:cBhvr>
+                                        <p:cTn id="24" dur="1" fill="hold">
+                                          <p:stCondLst>
+                                            <p:cond delay="0"/>
+                                          </p:stCondLst>
+                                        </p:cTn>
+                                        <p:tgtEl>
+                                          <p:spTgt spid="1026"/>
+                                        </p:tgtEl>
+                                        <p:attrNameLst>
+                                          <p:attrName>style.visibility</p:attrName>
+                                        </p:attrNameLst>
+                                      </p:cBhvr>
+                                      <p:to>
+                                        <p:strVal val="visible"/>
+                                      </p:to>
+                                    </p:set>
+                                  </p:childTnLst>
+                                </p:cTn>
+                              </p:par>
+                            </p:childTnLst>
+                          </p:cTn>
+                        </p:par>
+                      </p:childTnLst>
+                    </p:cTn>
+                  </p:par>
+                  <p:par>
+                    <p:cTn id="25" fill="hold">
+                      <p:stCondLst>
+                        <p:cond delay="indefinite"/>
+                      </p:stCondLst>
+                      <p:childTnLst>
+                        <p:par>
+                          <p:cTn id="26" fill="hold">
+                            <p:stCondLst>
+                              <p:cond delay="0"/>
+                            </p:stCondLst>
+                            <p:childTnLst>
+                              <p:par>
+                                <p:cTn id="27" presetID="1" presetClass="entr" presetSubtype="0" fill="hold" grpId="0" nodeType="clickEffect">
+                                  <p:stCondLst>
+                                    <p:cond delay="0"/>
+                                  </p:stCondLst>
+                                  <p:childTnLst>
+                                    <p:set>
+                                      <p:cBhvr>
+                                        <p:cTn id="28" dur="1" fill="hold">
+                                          <p:stCondLst>
+                                            <p:cond delay="0"/>
+                                          </p:stCondLst>
+                                        </p:cTn>
+                                        <p:tgtEl>
+                                          <p:spTgt spid="16"/>
+                                        </p:tgtEl>
+                                        <p:attrNameLst>
+                                          <p:attrName>style.visibility</p:attrName>
+                                        </p:attrNameLst>
+                                      </p:cBhvr>
+                                      <p:to>
+                                        <p:strVal val="visible"/>
+                                      </p:to>
+                                    </p:set>
+                                  </p:childTnLst>
+                                </p:cTn>
+                              </p:par>
+                            </p:childTnLst>
+                          </p:cTn>
+                        </p:par>
+                      </p:childTnLst>
+                    </p:cTn>
+                  </p:par>
+                  <p:par>
+                    <p:cTn id="29" fill="hold">
+                      <p:stCondLst>
+                        <p:cond delay="indefinite"/>
+                      </p:stCondLst>
+                      <p:childTnLst>
+                        <p:par>
+                          <p:cTn id="30" fill="hold">
+                            <p:stCondLst>
+                              <p:cond delay="0"/>
+                            </p:stCondLst>
+                            <p:childTnLst>
+                              <p:par>
+                                <p:cTn id="31" presetID="1" presetClass="entr" presetSubtype="0" fill="hold" grpId="0" nodeType="clickEffect">
+                                  <p:stCondLst>
+                                    <p:cond delay="0"/>
+                                  </p:stCondLst>
+                                  <p:childTnLst>
+                                    <p:set>
+                                      <p:cBhvr>
+                                        <p:cTn id="32" dur="1" fill="hold">
+                                          <p:stCondLst>
+                                            <p:cond delay="0"/>
+                                          </p:stCondLst>
+                                        </p:cTn>
+                                        <p:tgtEl>
+                                          <p:spTgt spid="17"/>
+                                        </p:tgtEl>
+                                        <p:attrNameLst>
+                                          <p:attrName>style.visibility</p:attrName>
+                                        </p:attrNameLst>
+                                      </p:cBhvr>
+                                      <p:to>
+                                        <p:strVal val="visible"/>
+                                      </p:to>
+                                    </p:set>
+                                  </p:childTnLst>
+                                </p:cTn>
+                              </p:par>
+                              <p:par>
+                                <p:cTn id="33" presetID="1" presetClass="entr" presetSubtype="0" fill="hold" nodeType="withEffect">
+                                  <p:stCondLst>
+                                    <p:cond delay="0"/>
+                                  </p:stCondLst>
+                                  <p:childTnLst>
+                                    <p:set>
+                                      <p:cBhvr>
+                                        <p:cTn id="34" dur="1" fill="hold">
+                                          <p:stCondLst>
+                                            <p:cond delay="0"/>
+                                          </p:stCondLst>
+                                        </p:cTn>
+                                        <p:tgtEl>
+                                          <p:spTgt spid="1027"/>
+                                        </p:tgtEl>
+                                        <p:attrNameLst>
+                                          <p:attrName>style.visibility</p:attrName>
+                                        </p:attrNameLst>
+                                      </p:cBhvr>
+                                      <p:to>
+                                        <p:strVal val="visible"/>
+                                      </p:to>
+                                    </p:set>
+                                  </p:childTnLst>
+                                </p:cTn>
+                              </p:par>
+                            </p:childTnLst>
+                          </p:cTn>
+                        </p:par>
+                      </p:childTnLst>
+                    </p:cTn>
+                  </p:par>
+                  <p:par>
+                    <p:cTn id="35" fill="hold">
+                      <p:stCondLst>
+                        <p:cond delay="indefinite"/>
+                      </p:stCondLst>
+                      <p:childTnLst>
+                        <p:par>
+                          <p:cTn id="36" fill="hold">
+                            <p:stCondLst>
+                              <p:cond delay="0"/>
+                            </p:stCondLst>
+                            <p:childTnLst>
+                              <p:par>
+                                <p:cTn id="37" presetID="1" presetClass="entr" presetSubtype="0" fill="hold" grpId="0" nodeType="clickEffect">
+                                  <p:stCondLst>
+                                    <p:cond delay="0"/>
+                                  </p:stCondLst>
+                                  <p:childTnLst>
+                                    <p:set>
+                                      <p:cBhvr>
+                                        <p:cTn id="38" dur="1" fill="hold">
+                                          <p:stCondLst>
+                                            <p:cond delay="0"/>
+                                          </p:stCondLst>
+                                        </p:cTn>
+                                        <p:tgtEl>
+                                          <p:spTgt spid="15"/>
+                                        </p:tgtEl>
+                                        <p:attrNameLst>
+                                          <p:attrName>style.visibility</p:attrName>
+                                        </p:attrNameLst>
+                                      </p:cBhvr>
+                                      <p:to>
+                                        <p:strVal val="visible"/>
+                                      </p:to>
+                                    </p:set>
+                                  </p:childTnLst>
+                                </p:cTn>
+                              </p:par>
+                            </p:childTnLst>
+                          </p:cTn>
+                        </p:par>
+                      </p:childTnLst>
+                    </p:cTn>
+                  </p:par>
+                </p:childTnLst>
+              </p:cTn>
+              <p:prevCondLst>
+                <p:cond evt="onPrev" delay="0">
+                  <p:tgtEl>
+                    <p:sldTgt/>
+                  </p:tgtEl>
+                </p:cond>
+              </p:prevCondLst>
+              <p:nextCondLst>
+                <p:cond evt="onNext" delay="0">
+                  <p:tgtEl>
+                    <p:sldTgt/>
+                  </p:tgtEl>
+                </p:cond>
+              </p:nextCondLst>
+            </p:seq>
+          </p:childTnLst>
+        </p:cTn>
+      </p:par>
+    </p:tnLst>
+    <p:bldLst>
+      <p:bldP spid="5" grpId="0"/>
+      <p:bldP spid="6" grpId="0"/>
+      <p:bldP spid="7" grpId="0"/>
+      <p:bldP spid="8" grpId="0"/>
+      <p:bldP spid="9" grpId="0"/>
+      <p:bldP spid="10" grpId="0"/>
+      <p:bldP spid="16" grpId="0" animBg="1"/>
+      <p:bldP spid="17" grpId="0" animBg="1"/>
+      <p:bldP spid="15" grpId="0" animBg="1"/>
+    </p:bldLst>
+  </p:timing>
+</p:sld>
+</file>
+
+<file path=ppt/slides/slide44.xml><?xml version="1.0" encoding="utf-8"?>
+<p:sld xmlns:a="http://schemas.openxmlformats.org/drawingml/2006/main" xmlns:r="http://schemas.openxmlformats.org/officeDocument/2006/relationships" xmlns:p="http://schemas.openxmlformats.org/presentationml/2006/main">
+  <p:cSld>
+    <p:spTree>
+      <p:nvGrpSpPr>
+        <p:cNvPr id="1" name=""/>
+        <p:cNvGrpSpPr/>
+        <p:nvPr/>
+      </p:nvGrpSpPr>
+      <p:grpSpPr>
+        <a:xfrm>
+          <a:off x="0" y="0"/>
+          <a:ext cx="0" cy="0"/>
+          <a:chOff x="0" y="0"/>
+          <a:chExt cx="0" cy="0"/>
+        </a:xfrm>
+      </p:grpSpPr>
+      <p:pic>
+        <p:nvPicPr>
+          <p:cNvPr id="2051" name="Picture 3"/>
+          <p:cNvPicPr>
+            <a:picLocks noChangeAspect="1" noChangeArrowheads="1"/>
+          </p:cNvPicPr>
+          <p:nvPr/>
+        </p:nvPicPr>
+        <p:blipFill>
+          <a:blip r:embed="rId2" cstate="print"/>
+          <a:srcRect/>
+          <a:stretch>
+            <a:fillRect/>
+          </a:stretch>
+        </p:blipFill>
+        <p:spPr bwMode="auto">
+          <a:xfrm>
+            <a:off x="4206174" y="3873242"/>
+            <a:ext cx="4772025" cy="2428875"/>
+          </a:xfrm>
+          <a:prstGeom prst="rect">
+            <a:avLst/>
+          </a:prstGeom>
+          <a:noFill/>
+          <a:ln w="9525">
+            <a:noFill/>
+            <a:miter lim="800000"/>
+            <a:headEnd/>
+            <a:tailEnd/>
+          </a:ln>
+        </p:spPr>
+      </p:pic>
+      <p:sp>
+        <p:nvSpPr>
+          <p:cNvPr id="2" name="Title 1"/>
+          <p:cNvSpPr>
+            <a:spLocks noGrp="1"/>
+          </p:cNvSpPr>
+          <p:nvPr>
+            <p:ph type="title"/>
+          </p:nvPr>
+        </p:nvSpPr>
+        <p:spPr/>
+        <p:txBody>
+          <a:bodyPr/>
+          <a:lstStyle/>
+          <a:p>
+            <a:r>
+              <a:rPr lang="en-US" dirty="0" smtClean="0">
+                <a:sym typeface="Wingdings" pitchFamily="2" charset="2"/>
+              </a:rPr>
+              <a:t>AKMPC.mac  The Spider Web Maker</a:t>
+            </a:r>
+            <a:endParaRPr lang="en-US" dirty="0"/>
+          </a:p>
+        </p:txBody>
+      </p:sp>
+      <p:sp>
+        <p:nvSpPr>
+          <p:cNvPr id="3" name="TextBox 2"/>
+          <p:cNvSpPr txBox="1"/>
+          <p:nvPr/>
+        </p:nvSpPr>
+        <p:spPr>
+          <a:xfrm>
+            <a:off x="0" y="879895"/>
+            <a:ext cx="8888819" cy="923330"/>
+          </a:xfrm>
+          <a:prstGeom prst="rect">
+            <a:avLst/>
+          </a:prstGeom>
+          <a:noFill/>
+        </p:spPr>
+        <p:txBody>
+          <a:bodyPr wrap="square" rtlCol="0">
+            <a:spAutoFit/>
+          </a:bodyPr>
+          <a:lstStyle/>
+          <a:p>
+            <a:r>
+              <a:rPr lang="en-US" sz="5400" dirty="0" smtClean="0"/>
+              <a:t>AKMPC,</a:t>
+            </a:r>
+            <a:r>
+              <a:rPr lang="en-US" sz="2400" dirty="0" smtClean="0"/>
+              <a:t> </a:t>
+            </a:r>
+            <a:r>
+              <a:rPr lang="en-US" sz="1600" dirty="0" smtClean="0"/>
+              <a:t>&lt;</a:t>
+            </a:r>
+            <a:r>
+              <a:rPr lang="en-US" sz="1600" dirty="0" err="1" smtClean="0"/>
+              <a:t>Keypoint</a:t>
+            </a:r>
+            <a:r>
+              <a:rPr lang="en-US" sz="1600" dirty="0" smtClean="0"/>
+              <a:t>&gt;,&lt;Area&gt;,&lt;Link?&gt;,&lt;Lagrange?&gt;</a:t>
+            </a:r>
+            <a:endParaRPr lang="en-US" sz="5400" dirty="0"/>
+          </a:p>
+        </p:txBody>
+      </p:sp>
+      <p:sp>
+        <p:nvSpPr>
+          <p:cNvPr id="4" name="TextBox 3"/>
+          <p:cNvSpPr txBox="1"/>
+          <p:nvPr/>
+        </p:nvSpPr>
+        <p:spPr>
+          <a:xfrm>
+            <a:off x="3062177" y="845389"/>
+            <a:ext cx="6081823" cy="369332"/>
+          </a:xfrm>
+          <a:prstGeom prst="rect">
+            <a:avLst/>
+          </a:prstGeom>
+          <a:noFill/>
+        </p:spPr>
+        <p:txBody>
+          <a:bodyPr wrap="square" rtlCol="0">
+            <a:spAutoFit/>
+          </a:bodyPr>
+          <a:lstStyle/>
+          <a:p>
+            <a:pPr algn="r"/>
+            <a:r>
+              <a:rPr lang="en-US" dirty="0" smtClean="0"/>
+              <a:t>“Think: </a:t>
+            </a:r>
+            <a:r>
+              <a:rPr lang="en-US" dirty="0" smtClean="0">
+                <a:solidFill>
+                  <a:schemeClr val="accent6">
+                    <a:lumMod val="75000"/>
+                  </a:schemeClr>
+                </a:solidFill>
+              </a:rPr>
+              <a:t>A</a:t>
+            </a:r>
+            <a:r>
+              <a:rPr lang="en-US" dirty="0" smtClean="0"/>
+              <a:t>rea To </a:t>
+            </a:r>
+            <a:r>
+              <a:rPr lang="en-US" dirty="0" err="1" smtClean="0">
+                <a:solidFill>
+                  <a:schemeClr val="accent6">
+                    <a:lumMod val="75000"/>
+                  </a:schemeClr>
+                </a:solidFill>
+              </a:rPr>
+              <a:t>K</a:t>
+            </a:r>
+            <a:r>
+              <a:rPr lang="en-US" dirty="0" err="1" smtClean="0"/>
+              <a:t>eypoint</a:t>
+            </a:r>
+            <a:r>
+              <a:rPr lang="en-US" dirty="0" smtClean="0"/>
+              <a:t> </a:t>
+            </a:r>
+            <a:r>
+              <a:rPr lang="en-US" dirty="0" smtClean="0">
+                <a:solidFill>
+                  <a:schemeClr val="accent6">
+                    <a:lumMod val="75000"/>
+                  </a:schemeClr>
+                </a:solidFill>
+              </a:rPr>
+              <a:t>M</a:t>
+            </a:r>
+            <a:r>
+              <a:rPr lang="en-US" dirty="0" smtClean="0"/>
+              <a:t>ulti-</a:t>
+            </a:r>
+            <a:r>
+              <a:rPr lang="en-US" dirty="0" smtClean="0">
+                <a:solidFill>
+                  <a:schemeClr val="accent6">
+                    <a:lumMod val="75000"/>
+                  </a:schemeClr>
+                </a:solidFill>
+              </a:rPr>
+              <a:t>P</a:t>
+            </a:r>
+            <a:r>
+              <a:rPr lang="en-US" dirty="0" smtClean="0"/>
+              <a:t>oint </a:t>
+            </a:r>
+            <a:r>
+              <a:rPr lang="en-US" dirty="0" smtClean="0">
+                <a:solidFill>
+                  <a:schemeClr val="accent6">
+                    <a:lumMod val="75000"/>
+                  </a:schemeClr>
+                </a:solidFill>
+              </a:rPr>
+              <a:t>C</a:t>
+            </a:r>
+            <a:r>
+              <a:rPr lang="en-US" dirty="0" smtClean="0"/>
+              <a:t>onstraint”</a:t>
+            </a:r>
+            <a:endParaRPr lang="en-US" dirty="0"/>
+          </a:p>
+        </p:txBody>
+      </p:sp>
+      <p:sp>
+        <p:nvSpPr>
+          <p:cNvPr id="16" name="TextBox 15"/>
+          <p:cNvSpPr txBox="1"/>
+          <p:nvPr/>
+        </p:nvSpPr>
+        <p:spPr>
+          <a:xfrm>
+            <a:off x="340241" y="2275368"/>
+            <a:ext cx="946299" cy="307777"/>
+          </a:xfrm>
+          <a:prstGeom prst="rect">
+            <a:avLst/>
+          </a:prstGeom>
+          <a:solidFill>
+            <a:schemeClr val="tx1"/>
+          </a:solidFill>
+          <a:ln>
+            <a:noFill/>
+          </a:ln>
+        </p:spPr>
+        <p:txBody>
+          <a:bodyPr wrap="square" rtlCol="0">
+            <a:spAutoFit/>
+          </a:bodyPr>
+          <a:lstStyle/>
+          <a:p>
+            <a:r>
+              <a:rPr lang="en-US" sz="1400" b="1" dirty="0" smtClean="0">
+                <a:solidFill>
+                  <a:schemeClr val="accent6">
+                    <a:lumMod val="75000"/>
+                  </a:schemeClr>
+                </a:solidFill>
+              </a:rPr>
+              <a:t>AKMPC</a:t>
+            </a:r>
+            <a:endParaRPr lang="en-US" sz="1400" b="1" dirty="0" smtClean="0">
+              <a:solidFill>
+                <a:schemeClr val="bg1"/>
+              </a:solidFill>
+            </a:endParaRPr>
+          </a:p>
+        </p:txBody>
+      </p:sp>
+      <p:sp>
+        <p:nvSpPr>
+          <p:cNvPr id="17" name="Right Arrow 16"/>
+          <p:cNvSpPr/>
+          <p:nvPr/>
+        </p:nvSpPr>
+        <p:spPr>
+          <a:xfrm rot="2181010">
+            <a:off x="4380614" y="3944687"/>
+            <a:ext cx="637953" cy="414670"/>
+          </a:xfrm>
+          <a:prstGeom prst="rightArrow">
+            <a:avLst/>
+          </a:prstGeom>
+          <a:solidFill>
+            <a:srgbClr val="FF0000"/>
+          </a:solidFill>
+          <a:ln>
+            <a:solidFill>
+              <a:srgbClr val="C00000"/>
+            </a:solidFill>
+          </a:ln>
+        </p:spPr>
+        <p:style>
+          <a:lnRef idx="2">
+            <a:schemeClr val="accent1">
+              <a:shade val="50000"/>
+            </a:schemeClr>
+          </a:lnRef>
+          <a:fillRef idx="1">
+            <a:schemeClr val="accent1"/>
+          </a:fillRef>
+          <a:effectRef idx="0">
+            <a:schemeClr val="accent1"/>
+          </a:effectRef>
+          <a:fontRef idx="minor">
+            <a:schemeClr val="lt1"/>
+          </a:fontRef>
+        </p:style>
+        <p:txBody>
+          <a:bodyPr rtlCol="0" anchor="ctr"/>
+          <a:lstStyle/>
+          <a:p>
+            <a:pPr algn="ctr"/>
+            <a:endParaRPr lang="en-US"/>
+          </a:p>
+        </p:txBody>
+      </p:sp>
+      <p:sp>
+        <p:nvSpPr>
+          <p:cNvPr id="15" name="TextBox 14"/>
+          <p:cNvSpPr txBox="1"/>
+          <p:nvPr/>
+        </p:nvSpPr>
+        <p:spPr>
+          <a:xfrm>
+            <a:off x="244549" y="1701209"/>
+            <a:ext cx="8112642" cy="307777"/>
+          </a:xfrm>
+          <a:prstGeom prst="rect">
+            <a:avLst/>
+          </a:prstGeom>
+          <a:noFill/>
+          <a:ln>
+            <a:noFill/>
+          </a:ln>
+        </p:spPr>
+        <p:txBody>
+          <a:bodyPr wrap="square" rtlCol="0">
+            <a:spAutoFit/>
+          </a:bodyPr>
+          <a:lstStyle/>
+          <a:p>
+            <a:r>
+              <a:rPr lang="en-US" sz="1400" dirty="0" smtClean="0"/>
+              <a:t>Creates “Spider Web” of rigid elements between a key point and an area</a:t>
+            </a:r>
+          </a:p>
+        </p:txBody>
+      </p:sp>
+      <p:pic>
+        <p:nvPicPr>
+          <p:cNvPr id="2050" name="Picture 2"/>
+          <p:cNvPicPr>
+            <a:picLocks noChangeAspect="1" noChangeArrowheads="1"/>
+          </p:cNvPicPr>
+          <p:nvPr/>
+        </p:nvPicPr>
+        <p:blipFill>
+          <a:blip r:embed="rId3" cstate="print"/>
+          <a:srcRect/>
+          <a:stretch>
+            <a:fillRect/>
+          </a:stretch>
+        </p:blipFill>
+        <p:spPr bwMode="auto">
+          <a:xfrm>
+            <a:off x="299263" y="2903725"/>
+            <a:ext cx="3773007" cy="2014275"/>
+          </a:xfrm>
+          <a:prstGeom prst="rect">
+            <a:avLst/>
+          </a:prstGeom>
+          <a:noFill/>
+          <a:ln w="9525">
+            <a:noFill/>
+            <a:miter lim="800000"/>
+            <a:headEnd/>
+            <a:tailEnd/>
+          </a:ln>
+        </p:spPr>
+      </p:pic>
+      <p:sp>
+        <p:nvSpPr>
+          <p:cNvPr id="18" name="Oval 17"/>
+          <p:cNvSpPr/>
+          <p:nvPr/>
+        </p:nvSpPr>
+        <p:spPr>
+          <a:xfrm>
+            <a:off x="2049208" y="2879952"/>
+            <a:ext cx="241540" cy="232913"/>
+          </a:xfrm>
+          <a:prstGeom prst="ellipse">
+            <a:avLst/>
+          </a:prstGeom>
+          <a:noFill/>
+          <a:ln w="38100">
+            <a:solidFill>
+              <a:srgbClr val="FF0000"/>
+            </a:solidFill>
+          </a:ln>
+        </p:spPr>
+        <p:style>
+          <a:lnRef idx="2">
+            <a:schemeClr val="accent1">
+              <a:shade val="50000"/>
+            </a:schemeClr>
+          </a:lnRef>
+          <a:fillRef idx="1">
+            <a:schemeClr val="accent1"/>
+          </a:fillRef>
+          <a:effectRef idx="0">
+            <a:schemeClr val="accent1"/>
+          </a:effectRef>
+          <a:fontRef idx="minor">
+            <a:schemeClr val="lt1"/>
+          </a:fontRef>
+        </p:style>
+        <p:txBody>
+          <a:bodyPr rtlCol="0" anchor="ctr"/>
+          <a:lstStyle/>
+          <a:p>
+            <a:pPr algn="ctr"/>
+            <a:endParaRPr lang="en-US"/>
+          </a:p>
+        </p:txBody>
+      </p:sp>
+      <p:cxnSp>
+        <p:nvCxnSpPr>
+          <p:cNvPr id="19" name="Straight Arrow Connector 18"/>
+          <p:cNvCxnSpPr>
+            <a:stCxn id="20" idx="1"/>
+            <a:endCxn id="18" idx="7"/>
+          </p:cNvCxnSpPr>
+          <p:nvPr/>
+        </p:nvCxnSpPr>
+        <p:spPr>
+          <a:xfrm rot="10800000" flipV="1">
+            <a:off x="2255375" y="2533189"/>
+            <a:ext cx="752570" cy="380871"/>
+          </a:xfrm>
+          <a:prstGeom prst="straightConnector1">
+            <a:avLst/>
+          </a:prstGeom>
+          <a:ln w="41275">
+            <a:solidFill>
+              <a:srgbClr val="FF0000"/>
+            </a:solidFill>
+            <a:tailEnd type="triangle"/>
+          </a:ln>
+        </p:spPr>
+        <p:style>
+          <a:lnRef idx="1">
+            <a:schemeClr val="accent1"/>
+          </a:lnRef>
+          <a:fillRef idx="0">
+            <a:schemeClr val="accent1"/>
+          </a:fillRef>
+          <a:effectRef idx="0">
+            <a:schemeClr val="accent1"/>
+          </a:effectRef>
+          <a:fontRef idx="minor">
+            <a:schemeClr val="tx1"/>
+          </a:fontRef>
+        </p:style>
+      </p:cxnSp>
+      <p:sp>
+        <p:nvSpPr>
+          <p:cNvPr id="20" name="TextBox 19"/>
+          <p:cNvSpPr txBox="1"/>
+          <p:nvPr/>
+        </p:nvSpPr>
+        <p:spPr>
+          <a:xfrm>
+            <a:off x="3007945" y="2348524"/>
+            <a:ext cx="1390189" cy="369332"/>
+          </a:xfrm>
+          <a:prstGeom prst="rect">
+            <a:avLst/>
+          </a:prstGeom>
+          <a:noFill/>
+          <a:ln w="38100">
+            <a:solidFill>
+              <a:srgbClr val="FF0000"/>
+            </a:solidFill>
+          </a:ln>
+        </p:spPr>
+        <p:txBody>
+          <a:bodyPr wrap="none" rtlCol="0">
+            <a:spAutoFit/>
+          </a:bodyPr>
+          <a:lstStyle/>
+          <a:p>
+            <a:r>
+              <a:rPr lang="en-US" dirty="0" smtClean="0"/>
+              <a:t>To </a:t>
+            </a:r>
+            <a:r>
+              <a:rPr lang="en-US" dirty="0" err="1" smtClean="0"/>
+              <a:t>Keypoint</a:t>
+            </a:r>
+            <a:endParaRPr lang="en-US" dirty="0"/>
+          </a:p>
+        </p:txBody>
+      </p:sp>
+      <p:sp>
+        <p:nvSpPr>
+          <p:cNvPr id="23" name="TextBox 22"/>
+          <p:cNvSpPr txBox="1"/>
+          <p:nvPr/>
+        </p:nvSpPr>
+        <p:spPr>
+          <a:xfrm>
+            <a:off x="967161" y="3501722"/>
+            <a:ext cx="726481" cy="400110"/>
+          </a:xfrm>
+          <a:prstGeom prst="rect">
+            <a:avLst/>
+          </a:prstGeom>
+          <a:solidFill>
+            <a:schemeClr val="bg1"/>
+          </a:solidFill>
+          <a:ln w="38100">
+            <a:solidFill>
+              <a:srgbClr val="FF0000"/>
+            </a:solidFill>
+          </a:ln>
+        </p:spPr>
+        <p:txBody>
+          <a:bodyPr wrap="none" rtlCol="0">
+            <a:spAutoFit/>
+          </a:bodyPr>
+          <a:lstStyle/>
+          <a:p>
+            <a:r>
+              <a:rPr lang="en-US" sz="2000" dirty="0" smtClean="0"/>
+              <a:t>Area</a:t>
+            </a:r>
+            <a:endParaRPr lang="en-US" dirty="0"/>
+          </a:p>
+        </p:txBody>
+      </p:sp>
+      <p:cxnSp>
+        <p:nvCxnSpPr>
+          <p:cNvPr id="24" name="Straight Arrow Connector 23"/>
+          <p:cNvCxnSpPr>
+            <a:stCxn id="23" idx="3"/>
+          </p:cNvCxnSpPr>
+          <p:nvPr/>
+        </p:nvCxnSpPr>
+        <p:spPr>
+          <a:xfrm>
+            <a:off x="1693642" y="3701777"/>
+            <a:ext cx="911335" cy="370494"/>
+          </a:xfrm>
+          <a:prstGeom prst="straightConnector1">
+            <a:avLst/>
+          </a:prstGeom>
+          <a:ln w="41275">
+            <a:solidFill>
+              <a:srgbClr val="FF0000"/>
+            </a:solidFill>
+            <a:tailEnd type="triangle"/>
+          </a:ln>
+        </p:spPr>
+        <p:style>
+          <a:lnRef idx="1">
+            <a:schemeClr val="accent1"/>
+          </a:lnRef>
+          <a:fillRef idx="0">
+            <a:schemeClr val="accent1"/>
+          </a:fillRef>
+          <a:effectRef idx="0">
+            <a:schemeClr val="accent1"/>
+          </a:effectRef>
+          <a:fontRef idx="minor">
+            <a:schemeClr val="tx1"/>
+          </a:fontRef>
+        </p:style>
+      </p:cxnSp>
+      <p:sp>
+        <p:nvSpPr>
+          <p:cNvPr id="21" name="TextBox 20"/>
+          <p:cNvSpPr txBox="1"/>
+          <p:nvPr/>
+        </p:nvSpPr>
+        <p:spPr>
+          <a:xfrm>
+            <a:off x="903768" y="5773480"/>
+            <a:ext cx="2668772" cy="461665"/>
+          </a:xfrm>
+          <a:prstGeom prst="rect">
+            <a:avLst/>
+          </a:prstGeom>
+          <a:ln/>
+        </p:spPr>
+        <p:style>
+          <a:lnRef idx="1">
+            <a:schemeClr val="accent3"/>
+          </a:lnRef>
+          <a:fillRef idx="2">
+            <a:schemeClr val="accent3"/>
+          </a:fillRef>
+          <a:effectRef idx="1">
+            <a:schemeClr val="accent3"/>
+          </a:effectRef>
+          <a:fontRef idx="minor">
+            <a:schemeClr val="dk1"/>
+          </a:fontRef>
+        </p:style>
+        <p:txBody>
+          <a:bodyPr wrap="square" rtlCol="0">
+            <a:spAutoFit/>
+          </a:bodyPr>
+          <a:lstStyle/>
+          <a:p>
+            <a:pPr algn="ctr"/>
+            <a:r>
+              <a:rPr lang="en-US" sz="2400" dirty="0" smtClean="0"/>
+              <a:t>Works with _UNDO</a:t>
+            </a:r>
+          </a:p>
+        </p:txBody>
+      </p:sp>
+    </p:spTree>
+  </p:cSld>
+  <p:clrMapOvr>
+    <a:masterClrMapping/>
+  </p:clrMapOvr>
+  <p:timing>
+    <p:tnLst>
+      <p:par>
+        <p:cTn id="1" dur="indefinite" restart="never" nodeType="tmRoot">
+          <p:childTnLst>
+            <p:seq concurrent="1" nextAc="seek">
+              <p:cTn id="2" dur="indefinite" nodeType="mainSeq">
+                <p:childTnLst>
+                  <p:par>
+                    <p:cTn id="3" fill="hold">
+                      <p:stCondLst>
+                        <p:cond delay="indefinite"/>
+                      </p:stCondLst>
+                      <p:childTnLst>
+                        <p:par>
+                          <p:cTn id="4" fill="hold">
+                            <p:stCondLst>
+                              <p:cond delay="0"/>
+                            </p:stCondLst>
+                            <p:childTnLst>
+                              <p:par>
+                                <p:cTn id="5" presetID="1" presetClass="entr" presetSubtype="0" fill="hold" nodeType="clickEffect">
+                                  <p:stCondLst>
+                                    <p:cond delay="0"/>
+                                  </p:stCondLst>
+                                  <p:childTnLst>
+                                    <p:set>
+                                      <p:cBhvr>
+                                        <p:cTn id="6" dur="1" fill="hold">
+                                          <p:stCondLst>
+                                            <p:cond delay="0"/>
+                                          </p:stCondLst>
+                                        </p:cTn>
+                                        <p:tgtEl>
+                                          <p:spTgt spid="2050"/>
+                                        </p:tgtEl>
+                                        <p:attrNameLst>
+                                          <p:attrName>style.visibility</p:attrName>
+                                        </p:attrNameLst>
+                                      </p:cBhvr>
+                                      <p:to>
+                                        <p:strVal val="visible"/>
+                                      </p:to>
+                                    </p:set>
+                                  </p:childTnLst>
+                                </p:cTn>
+                              </p:par>
+                            </p:childTnLst>
+                          </p:cTn>
+                        </p:par>
+                      </p:childTnLst>
+                    </p:cTn>
+                  </p:par>
+                  <p:par>
+                    <p:cTn id="7" fill="hold">
+                      <p:stCondLst>
+                        <p:cond delay="indefinite"/>
+                      </p:stCondLst>
+                      <p:childTnLst>
+                        <p:par>
+                          <p:cTn id="8" fill="hold">
+                            <p:stCondLst>
+                              <p:cond delay="0"/>
+                            </p:stCondLst>
+                            <p:childTnLst>
+                              <p:par>
+                                <p:cTn id="9" presetID="1" presetClass="entr" presetSubtype="0" fill="hold" grpId="0" nodeType="clickEffect">
+                                  <p:stCondLst>
+                                    <p:cond delay="0"/>
+                                  </p:stCondLst>
+                                  <p:childTnLst>
+                                    <p:set>
+                                      <p:cBhvr>
+                                        <p:cTn id="10" dur="1" fill="hold">
+                                          <p:stCondLst>
+                                            <p:cond delay="0"/>
+                                          </p:stCondLst>
+                                        </p:cTn>
+                                        <p:tgtEl>
+                                          <p:spTgt spid="16"/>
+                                        </p:tgtEl>
+                                        <p:attrNameLst>
+                                          <p:attrName>style.visibility</p:attrName>
+                                        </p:attrNameLst>
+                                      </p:cBhvr>
+                                      <p:to>
+                                        <p:strVal val="visible"/>
+                                      </p:to>
+                                    </p:set>
+                                  </p:childTnLst>
+                                </p:cTn>
+                              </p:par>
+                            </p:childTnLst>
+                          </p:cTn>
+                        </p:par>
+                      </p:childTnLst>
+                    </p:cTn>
+                  </p:par>
+                  <p:par>
+                    <p:cTn id="11" fill="hold">
+                      <p:stCondLst>
+                        <p:cond delay="indefinite"/>
+                      </p:stCondLst>
+                      <p:childTnLst>
+                        <p:par>
+                          <p:cTn id="12" fill="hold">
+                            <p:stCondLst>
+                              <p:cond delay="0"/>
+                            </p:stCondLst>
+                            <p:childTnLst>
+                              <p:par>
+                                <p:cTn id="13" presetID="1" presetClass="entr" presetSubtype="0" fill="hold" grpId="0" nodeType="clickEffect">
+                                  <p:stCondLst>
+                                    <p:cond delay="0"/>
+                                  </p:stCondLst>
+                                  <p:childTnLst>
+                                    <p:set>
+                                      <p:cBhvr>
+                                        <p:cTn id="14" dur="1" fill="hold">
+                                          <p:stCondLst>
+                                            <p:cond delay="0"/>
+                                          </p:stCondLst>
+                                        </p:cTn>
+                                        <p:tgtEl>
+                                          <p:spTgt spid="18"/>
+                                        </p:tgtEl>
+                                        <p:attrNameLst>
+                                          <p:attrName>style.visibility</p:attrName>
+                                        </p:attrNameLst>
+                                      </p:cBhvr>
+                                      <p:to>
+                                        <p:strVal val="visible"/>
+                                      </p:to>
+                                    </p:set>
+                                  </p:childTnLst>
+                                </p:cTn>
+                              </p:par>
+                              <p:par>
+                                <p:cTn id="15" presetID="1" presetClass="entr" presetSubtype="0" fill="hold" nodeType="withEffect">
+                                  <p:stCondLst>
+                                    <p:cond delay="0"/>
+                                  </p:stCondLst>
+                                  <p:childTnLst>
+                                    <p:set>
+                                      <p:cBhvr>
+                                        <p:cTn id="16" dur="1" fill="hold">
+                                          <p:stCondLst>
+                                            <p:cond delay="0"/>
+                                          </p:stCondLst>
+                                        </p:cTn>
+                                        <p:tgtEl>
+                                          <p:spTgt spid="19"/>
+                                        </p:tgtEl>
+                                        <p:attrNameLst>
+                                          <p:attrName>style.visibility</p:attrName>
+                                        </p:attrNameLst>
+                                      </p:cBhvr>
+                                      <p:to>
+                                        <p:strVal val="visible"/>
+                                      </p:to>
+                                    </p:set>
+                                  </p:childTnLst>
+                                </p:cTn>
+                              </p:par>
+                              <p:par>
+                                <p:cTn id="17" presetID="1" presetClass="entr" presetSubtype="0" fill="hold" grpId="0" nodeType="withEffect">
+                                  <p:stCondLst>
+                                    <p:cond delay="0"/>
+                                  </p:stCondLst>
+                                  <p:childTnLst>
+                                    <p:set>
+                                      <p:cBhvr>
+                                        <p:cTn id="18" dur="1" fill="hold">
+                                          <p:stCondLst>
+                                            <p:cond delay="0"/>
+                                          </p:stCondLst>
+                                        </p:cTn>
+                                        <p:tgtEl>
+                                          <p:spTgt spid="20"/>
+                                        </p:tgtEl>
+                                        <p:attrNameLst>
+                                          <p:attrName>style.visibility</p:attrName>
+                                        </p:attrNameLst>
+                                      </p:cBhvr>
+                                      <p:to>
+                                        <p:strVal val="visible"/>
+                                      </p:to>
+                                    </p:set>
+                                  </p:childTnLst>
+                                </p:cTn>
+                              </p:par>
+                            </p:childTnLst>
+                          </p:cTn>
+                        </p:par>
+                      </p:childTnLst>
+                    </p:cTn>
+                  </p:par>
+                  <p:par>
+                    <p:cTn id="19" fill="hold">
+                      <p:stCondLst>
+                        <p:cond delay="indefinite"/>
+                      </p:stCondLst>
+                      <p:childTnLst>
+                        <p:par>
+                          <p:cTn id="20" fill="hold">
+                            <p:stCondLst>
+                              <p:cond delay="0"/>
+                            </p:stCondLst>
+                            <p:childTnLst>
+                              <p:par>
+                                <p:cTn id="21" presetID="1" presetClass="entr" presetSubtype="0" fill="hold" grpId="0" nodeType="clickEffect">
+                                  <p:stCondLst>
+                                    <p:cond delay="0"/>
+                                  </p:stCondLst>
+                                  <p:childTnLst>
+                                    <p:set>
+                                      <p:cBhvr>
+                                        <p:cTn id="22" dur="1" fill="hold">
+                                          <p:stCondLst>
+                                            <p:cond delay="0"/>
+                                          </p:stCondLst>
+                                        </p:cTn>
+                                        <p:tgtEl>
+                                          <p:spTgt spid="23"/>
+                                        </p:tgtEl>
+                                        <p:attrNameLst>
+                                          <p:attrName>style.visibility</p:attrName>
+                                        </p:attrNameLst>
+                                      </p:cBhvr>
+                                      <p:to>
+                                        <p:strVal val="visible"/>
+                                      </p:to>
+                                    </p:set>
+                                  </p:childTnLst>
+                                </p:cTn>
+                              </p:par>
+                              <p:par>
+                                <p:cTn id="23" presetID="1" presetClass="entr" presetSubtype="0" fill="hold" nodeType="withEffect">
+                                  <p:stCondLst>
+                                    <p:cond delay="0"/>
+                                  </p:stCondLst>
+                                  <p:childTnLst>
+                                    <p:set>
+                                      <p:cBhvr>
+                                        <p:cTn id="24" dur="1" fill="hold">
+                                          <p:stCondLst>
+                                            <p:cond delay="0"/>
+                                          </p:stCondLst>
+                                        </p:cTn>
+                                        <p:tgtEl>
+                                          <p:spTgt spid="24"/>
+                                        </p:tgtEl>
+                                        <p:attrNameLst>
+                                          <p:attrName>style.visibility</p:attrName>
+                                        </p:attrNameLst>
+                                      </p:cBhvr>
+                                      <p:to>
+                                        <p:strVal val="visible"/>
+                                      </p:to>
+                                    </p:set>
+                                  </p:childTnLst>
+                                </p:cTn>
+                              </p:par>
+                            </p:childTnLst>
+                          </p:cTn>
+                        </p:par>
+                      </p:childTnLst>
+                    </p:cTn>
+                  </p:par>
+                  <p:par>
+                    <p:cTn id="25" fill="hold">
+                      <p:stCondLst>
+                        <p:cond delay="indefinite"/>
+                      </p:stCondLst>
+                      <p:childTnLst>
+                        <p:par>
+                          <p:cTn id="26" fill="hold">
+                            <p:stCondLst>
+                              <p:cond delay="0"/>
+                            </p:stCondLst>
+                            <p:childTnLst>
+                              <p:par>
+                                <p:cTn id="27" presetID="1" presetClass="entr" presetSubtype="0" fill="hold" nodeType="clickEffect">
+                                  <p:stCondLst>
+                                    <p:cond delay="0"/>
+                                  </p:stCondLst>
+                                  <p:childTnLst>
+                                    <p:set>
+                                      <p:cBhvr>
+                                        <p:cTn id="28" dur="1" fill="hold">
+                                          <p:stCondLst>
+                                            <p:cond delay="0"/>
+                                          </p:stCondLst>
+                                        </p:cTn>
+                                        <p:tgtEl>
+                                          <p:spTgt spid="2051"/>
+                                        </p:tgtEl>
+                                        <p:attrNameLst>
+                                          <p:attrName>style.visibility</p:attrName>
+                                        </p:attrNameLst>
+                                      </p:cBhvr>
+                                      <p:to>
+                                        <p:strVal val="visible"/>
+                                      </p:to>
+                                    </p:set>
+                                  </p:childTnLst>
+                                </p:cTn>
+                              </p:par>
+                              <p:par>
+                                <p:cTn id="29" presetID="1" presetClass="entr" presetSubtype="0" fill="hold" grpId="0" nodeType="withEffect">
+                                  <p:stCondLst>
+                                    <p:cond delay="0"/>
+                                  </p:stCondLst>
+                                  <p:childTnLst>
+                                    <p:set>
+                                      <p:cBhvr>
+                                        <p:cTn id="30" dur="1" fill="hold">
+                                          <p:stCondLst>
+                                            <p:cond delay="0"/>
+                                          </p:stCondLst>
+                                        </p:cTn>
+                                        <p:tgtEl>
+                                          <p:spTgt spid="17"/>
+                                        </p:tgtEl>
+                                        <p:attrNameLst>
+                                          <p:attrName>style.visibility</p:attrName>
+                                        </p:attrNameLst>
+                                      </p:cBhvr>
+                                      <p:to>
+                                        <p:strVal val="visible"/>
+                                      </p:to>
+                                    </p:set>
+                                  </p:childTnLst>
+                                </p:cTn>
+                              </p:par>
+                            </p:childTnLst>
+                          </p:cTn>
+                        </p:par>
+                      </p:childTnLst>
+                    </p:cTn>
+                  </p:par>
+                  <p:par>
+                    <p:cTn id="31" fill="hold">
+                      <p:stCondLst>
+                        <p:cond delay="indefinite"/>
+                      </p:stCondLst>
+                      <p:childTnLst>
+                        <p:par>
+                          <p:cTn id="32" fill="hold">
+                            <p:stCondLst>
+                              <p:cond delay="0"/>
+                            </p:stCondLst>
+                            <p:childTnLst>
+                              <p:par>
+                                <p:cTn id="33" presetID="1" presetClass="entr" presetSubtype="0" fill="hold" grpId="0" nodeType="clickEffect">
+                                  <p:stCondLst>
+                                    <p:cond delay="0"/>
+                                  </p:stCondLst>
+                                  <p:childTnLst>
+                                    <p:set>
+                                      <p:cBhvr>
+                                        <p:cTn id="34" dur="1" fill="hold">
+                                          <p:stCondLst>
+                                            <p:cond delay="0"/>
+                                          </p:stCondLst>
+                                        </p:cTn>
+                                        <p:tgtEl>
+                                          <p:spTgt spid="21"/>
+                                        </p:tgtEl>
+                                        <p:attrNameLst>
+                                          <p:attrName>style.visibility</p:attrName>
+                                        </p:attrNameLst>
+                                      </p:cBhvr>
+                                      <p:to>
+                                        <p:strVal val="visible"/>
+                                      </p:to>
+                                    </p:set>
+                                  </p:childTnLst>
+                                </p:cTn>
+                              </p:par>
+                            </p:childTnLst>
+                          </p:cTn>
+                        </p:par>
+                      </p:childTnLst>
+                    </p:cTn>
+                  </p:par>
+                </p:childTnLst>
+              </p:cTn>
+              <p:prevCondLst>
+                <p:cond evt="onPrev" delay="0">
+                  <p:tgtEl>
+                    <p:sldTgt/>
+                  </p:tgtEl>
+                </p:cond>
+              </p:prevCondLst>
+              <p:nextCondLst>
+                <p:cond evt="onNext" delay="0">
+                  <p:tgtEl>
+                    <p:sldTgt/>
+                  </p:tgtEl>
+                </p:cond>
+              </p:nextCondLst>
+            </p:seq>
+          </p:childTnLst>
+        </p:cTn>
+      </p:par>
+    </p:tnLst>
+    <p:bldLst>
+      <p:bldP spid="16" grpId="0" animBg="1"/>
+      <p:bldP spid="17" grpId="0" animBg="1"/>
+      <p:bldP spid="18" grpId="0" animBg="1"/>
+      <p:bldP spid="20" grpId="0" animBg="1"/>
+      <p:bldP spid="23" grpId="0" animBg="1"/>
+      <p:bldP spid="21" grpId="0" animBg="1"/>
+    </p:bldLst>
+  </p:timing>
+</p:sld>
+</file>
+
+<file path=ppt/slides/slide45.xml><?xml version="1.0" encoding="utf-8"?>
+<p:sld xmlns:a="http://schemas.openxmlformats.org/drawingml/2006/main" xmlns:r="http://schemas.openxmlformats.org/officeDocument/2006/relationships" xmlns:p="http://schemas.openxmlformats.org/presentationml/2006/main">
+  <p:cSld>
+    <p:spTree>
+      <p:nvGrpSpPr>
+        <p:cNvPr id="1" name=""/>
+        <p:cNvGrpSpPr/>
+        <p:nvPr/>
+      </p:nvGrpSpPr>
+      <p:grpSpPr>
+        <a:xfrm>
+          <a:off x="0" y="0"/>
+          <a:ext cx="0" cy="0"/>
+          <a:chOff x="0" y="0"/>
+          <a:chExt cx="0" cy="0"/>
+        </a:xfrm>
+      </p:grpSpPr>
+      <p:sp>
+        <p:nvSpPr>
+          <p:cNvPr id="2" name="Title 1"/>
+          <p:cNvSpPr>
+            <a:spLocks noGrp="1"/>
+          </p:cNvSpPr>
+          <p:nvPr>
+            <p:ph type="title"/>
+          </p:nvPr>
+        </p:nvSpPr>
+        <p:spPr/>
+        <p:txBody>
+          <a:bodyPr/>
+          <a:lstStyle/>
+          <a:p>
+            <a:r>
+              <a:rPr lang="en-US" dirty="0" smtClean="0"/>
+              <a:t>ATA.mac </a:t>
+            </a:r>
+            <a:r>
+              <a:rPr lang="en-US" dirty="0" smtClean="0">
+                <a:sym typeface="Wingdings" pitchFamily="2" charset="2"/>
+              </a:rPr>
+              <a:t> Volumes from Areas… Quickly!</a:t>
+            </a:r>
+            <a:endParaRPr lang="en-US" dirty="0"/>
+          </a:p>
+        </p:txBody>
+      </p:sp>
+      <p:sp>
+        <p:nvSpPr>
+          <p:cNvPr id="3" name="TextBox 2"/>
+          <p:cNvSpPr txBox="1"/>
+          <p:nvPr/>
+        </p:nvSpPr>
+        <p:spPr>
+          <a:xfrm>
+            <a:off x="0" y="879895"/>
+            <a:ext cx="8888819" cy="923330"/>
+          </a:xfrm>
+          <a:prstGeom prst="rect">
+            <a:avLst/>
+          </a:prstGeom>
+          <a:noFill/>
+        </p:spPr>
+        <p:txBody>
+          <a:bodyPr wrap="square" rtlCol="0">
+            <a:spAutoFit/>
+          </a:bodyPr>
+          <a:lstStyle/>
+          <a:p>
+            <a:r>
+              <a:rPr lang="en-US" sz="5400" dirty="0" smtClean="0"/>
+              <a:t>ATA,</a:t>
+            </a:r>
+            <a:r>
+              <a:rPr lang="en-US" sz="2400" dirty="0" smtClean="0"/>
+              <a:t> </a:t>
+            </a:r>
+            <a:r>
+              <a:rPr lang="en-US" sz="1600" dirty="0" smtClean="0"/>
+              <a:t>&lt;First Area&gt;,&lt;Second Area&gt;,&lt;Link?&gt;</a:t>
+            </a:r>
+            <a:endParaRPr lang="en-US" sz="5400" dirty="0"/>
+          </a:p>
+        </p:txBody>
+      </p:sp>
+      <p:sp>
+        <p:nvSpPr>
+          <p:cNvPr id="4" name="TextBox 3"/>
+          <p:cNvSpPr txBox="1"/>
+          <p:nvPr/>
+        </p:nvSpPr>
+        <p:spPr>
+          <a:xfrm>
+            <a:off x="3062177" y="845389"/>
+            <a:ext cx="6081823" cy="369332"/>
+          </a:xfrm>
+          <a:prstGeom prst="rect">
+            <a:avLst/>
+          </a:prstGeom>
+          <a:noFill/>
+        </p:spPr>
+        <p:txBody>
+          <a:bodyPr wrap="square" rtlCol="0">
+            <a:spAutoFit/>
+          </a:bodyPr>
+          <a:lstStyle/>
+          <a:p>
+            <a:pPr algn="r"/>
+            <a:r>
+              <a:rPr lang="en-US" dirty="0" smtClean="0"/>
+              <a:t>“Think: </a:t>
+            </a:r>
+            <a:r>
+              <a:rPr lang="en-US" dirty="0" smtClean="0">
+                <a:solidFill>
+                  <a:schemeClr val="accent6">
+                    <a:lumMod val="75000"/>
+                  </a:schemeClr>
+                </a:solidFill>
+              </a:rPr>
+              <a:t>A</a:t>
+            </a:r>
+            <a:r>
+              <a:rPr lang="en-US" dirty="0" smtClean="0"/>
+              <a:t>rea </a:t>
+            </a:r>
+            <a:r>
+              <a:rPr lang="en-US" dirty="0" smtClean="0">
+                <a:solidFill>
+                  <a:schemeClr val="accent6">
+                    <a:lumMod val="75000"/>
+                  </a:schemeClr>
+                </a:solidFill>
+              </a:rPr>
+              <a:t>T</a:t>
+            </a:r>
+            <a:r>
+              <a:rPr lang="en-US" dirty="0" smtClean="0"/>
+              <a:t>o </a:t>
+            </a:r>
+            <a:r>
+              <a:rPr lang="en-US" dirty="0" smtClean="0">
+                <a:solidFill>
+                  <a:schemeClr val="accent6">
+                    <a:lumMod val="75000"/>
+                  </a:schemeClr>
+                </a:solidFill>
+              </a:rPr>
+              <a:t>A</a:t>
+            </a:r>
+            <a:r>
+              <a:rPr lang="en-US" dirty="0" smtClean="0"/>
+              <a:t>rea”</a:t>
+            </a:r>
+            <a:endParaRPr lang="en-US" dirty="0"/>
+          </a:p>
+        </p:txBody>
+      </p:sp>
+      <p:sp>
+        <p:nvSpPr>
+          <p:cNvPr id="5" name="TextBox 4"/>
+          <p:cNvSpPr txBox="1"/>
+          <p:nvPr/>
+        </p:nvSpPr>
+        <p:spPr>
+          <a:xfrm>
+            <a:off x="255181" y="1818167"/>
+            <a:ext cx="8729331" cy="307777"/>
+          </a:xfrm>
+          <a:prstGeom prst="rect">
+            <a:avLst/>
+          </a:prstGeom>
+          <a:noFill/>
+          <a:ln>
+            <a:noFill/>
+          </a:ln>
+        </p:spPr>
+        <p:txBody>
+          <a:bodyPr wrap="square" rtlCol="0">
+            <a:spAutoFit/>
+          </a:bodyPr>
+          <a:lstStyle/>
+          <a:p>
+            <a:r>
+              <a:rPr lang="en-US" sz="1400" dirty="0" smtClean="0"/>
+              <a:t>Creates a volume between two areas</a:t>
+            </a:r>
+          </a:p>
+        </p:txBody>
+      </p:sp>
+      <p:pic>
+        <p:nvPicPr>
+          <p:cNvPr id="3074" name="Picture 2"/>
+          <p:cNvPicPr>
+            <a:picLocks noChangeAspect="1" noChangeArrowheads="1"/>
+          </p:cNvPicPr>
+          <p:nvPr/>
+        </p:nvPicPr>
+        <p:blipFill>
+          <a:blip r:embed="rId2" cstate="print"/>
+          <a:srcRect/>
+          <a:stretch>
+            <a:fillRect/>
+          </a:stretch>
+        </p:blipFill>
+        <p:spPr bwMode="auto">
+          <a:xfrm>
+            <a:off x="178872" y="2232517"/>
+            <a:ext cx="4371863" cy="2305147"/>
+          </a:xfrm>
+          <a:prstGeom prst="rect">
+            <a:avLst/>
+          </a:prstGeom>
+          <a:noFill/>
+          <a:ln w="9525">
+            <a:noFill/>
+            <a:miter lim="800000"/>
+            <a:headEnd/>
+            <a:tailEnd/>
+          </a:ln>
+        </p:spPr>
+      </p:pic>
+      <p:pic>
+        <p:nvPicPr>
+          <p:cNvPr id="3075" name="Picture 3"/>
+          <p:cNvPicPr>
+            <a:picLocks noChangeAspect="1" noChangeArrowheads="1"/>
+          </p:cNvPicPr>
+          <p:nvPr/>
+        </p:nvPicPr>
+        <p:blipFill>
+          <a:blip r:embed="rId3" cstate="print"/>
+          <a:srcRect/>
+          <a:stretch>
+            <a:fillRect/>
+          </a:stretch>
+        </p:blipFill>
+        <p:spPr bwMode="auto">
+          <a:xfrm>
+            <a:off x="4411111" y="3625702"/>
+            <a:ext cx="4594666" cy="3030279"/>
+          </a:xfrm>
+          <a:prstGeom prst="rect">
+            <a:avLst/>
+          </a:prstGeom>
+          <a:noFill/>
+          <a:ln w="9525">
+            <a:noFill/>
+            <a:miter lim="800000"/>
+            <a:headEnd/>
+            <a:tailEnd/>
+          </a:ln>
+        </p:spPr>
+      </p:pic>
+      <p:sp>
+        <p:nvSpPr>
+          <p:cNvPr id="8" name="TextBox 7"/>
+          <p:cNvSpPr txBox="1"/>
+          <p:nvPr/>
+        </p:nvSpPr>
+        <p:spPr>
+          <a:xfrm>
+            <a:off x="444001" y="4707009"/>
+            <a:ext cx="2469314" cy="338554"/>
+          </a:xfrm>
+          <a:prstGeom prst="rect">
+            <a:avLst/>
+          </a:prstGeom>
+          <a:noFill/>
+          <a:ln w="28575">
+            <a:solidFill>
+              <a:srgbClr val="FF0000"/>
+            </a:solidFill>
+          </a:ln>
+        </p:spPr>
+        <p:txBody>
+          <a:bodyPr wrap="square" rtlCol="0">
+            <a:spAutoFit/>
+          </a:bodyPr>
+          <a:lstStyle/>
+          <a:p>
+            <a:r>
+              <a:rPr lang="en-US" sz="1600" dirty="0" smtClean="0"/>
+              <a:t>Step 1: Select Two </a:t>
+            </a:r>
+            <a:r>
+              <a:rPr lang="en-US" sz="1600" dirty="0" smtClean="0"/>
+              <a:t>Areas</a:t>
+            </a:r>
+            <a:endParaRPr lang="en-US" sz="1600" dirty="0" smtClean="0"/>
+          </a:p>
+        </p:txBody>
+      </p:sp>
+      <p:cxnSp>
+        <p:nvCxnSpPr>
+          <p:cNvPr id="9" name="Straight Arrow Connector 8"/>
+          <p:cNvCxnSpPr>
+            <a:stCxn id="8" idx="0"/>
+          </p:cNvCxnSpPr>
+          <p:nvPr/>
+        </p:nvCxnSpPr>
+        <p:spPr>
+          <a:xfrm rot="5400000" flipH="1" flipV="1">
+            <a:off x="957895" y="3612820"/>
+            <a:ext cx="1814952" cy="373427"/>
+          </a:xfrm>
+          <a:prstGeom prst="straightConnector1">
+            <a:avLst/>
+          </a:prstGeom>
+          <a:ln w="41275">
+            <a:solidFill>
+              <a:srgbClr val="FF0000"/>
+            </a:solidFill>
+            <a:tailEnd type="arrow"/>
+          </a:ln>
+        </p:spPr>
+        <p:style>
+          <a:lnRef idx="1">
+            <a:schemeClr val="accent1"/>
+          </a:lnRef>
+          <a:fillRef idx="0">
+            <a:schemeClr val="accent1"/>
+          </a:fillRef>
+          <a:effectRef idx="0">
+            <a:schemeClr val="accent1"/>
+          </a:effectRef>
+          <a:fontRef idx="minor">
+            <a:schemeClr val="tx1"/>
+          </a:fontRef>
+        </p:style>
+      </p:cxnSp>
+      <p:cxnSp>
+        <p:nvCxnSpPr>
+          <p:cNvPr id="10" name="Straight Arrow Connector 9"/>
+          <p:cNvCxnSpPr>
+            <a:stCxn id="8" idx="0"/>
+          </p:cNvCxnSpPr>
+          <p:nvPr/>
+        </p:nvCxnSpPr>
+        <p:spPr>
+          <a:xfrm rot="5400000" flipH="1" flipV="1">
+            <a:off x="1622430" y="3969009"/>
+            <a:ext cx="794228" cy="681773"/>
+          </a:xfrm>
+          <a:prstGeom prst="straightConnector1">
+            <a:avLst/>
+          </a:prstGeom>
+          <a:ln w="41275">
+            <a:solidFill>
+              <a:srgbClr val="FF0000"/>
+            </a:solidFill>
+            <a:tailEnd type="arrow"/>
+          </a:ln>
+        </p:spPr>
+        <p:style>
+          <a:lnRef idx="1">
+            <a:schemeClr val="accent1"/>
+          </a:lnRef>
+          <a:fillRef idx="0">
+            <a:schemeClr val="accent1"/>
+          </a:fillRef>
+          <a:effectRef idx="0">
+            <a:schemeClr val="accent1"/>
+          </a:effectRef>
+          <a:fontRef idx="minor">
+            <a:schemeClr val="tx1"/>
+          </a:fontRef>
+        </p:style>
+      </p:cxnSp>
+      <p:sp>
+        <p:nvSpPr>
+          <p:cNvPr id="13" name="Right Arrow 12"/>
+          <p:cNvSpPr/>
+          <p:nvPr/>
+        </p:nvSpPr>
+        <p:spPr>
+          <a:xfrm rot="2181010">
+            <a:off x="4582633" y="3487486"/>
+            <a:ext cx="637953" cy="414670"/>
+          </a:xfrm>
+          <a:prstGeom prst="rightArrow">
+            <a:avLst/>
+          </a:prstGeom>
+          <a:solidFill>
+            <a:srgbClr val="FF0000"/>
+          </a:solidFill>
+          <a:ln>
+            <a:solidFill>
+              <a:srgbClr val="C00000"/>
+            </a:solidFill>
+          </a:ln>
+        </p:spPr>
+        <p:style>
+          <a:lnRef idx="2">
+            <a:schemeClr val="accent1">
+              <a:shade val="50000"/>
+            </a:schemeClr>
+          </a:lnRef>
+          <a:fillRef idx="1">
+            <a:schemeClr val="accent1"/>
+          </a:fillRef>
+          <a:effectRef idx="0">
+            <a:schemeClr val="accent1"/>
+          </a:effectRef>
+          <a:fontRef idx="minor">
+            <a:schemeClr val="lt1"/>
+          </a:fontRef>
+        </p:style>
+        <p:txBody>
+          <a:bodyPr rtlCol="0" anchor="ctr"/>
+          <a:lstStyle/>
+          <a:p>
+            <a:pPr algn="ctr"/>
+            <a:endParaRPr lang="en-US"/>
+          </a:p>
+        </p:txBody>
+      </p:sp>
+      <p:sp>
+        <p:nvSpPr>
+          <p:cNvPr id="15" name="TextBox 14"/>
+          <p:cNvSpPr txBox="1"/>
+          <p:nvPr/>
+        </p:nvSpPr>
+        <p:spPr>
+          <a:xfrm>
+            <a:off x="935666" y="5433239"/>
+            <a:ext cx="2668772" cy="461665"/>
+          </a:xfrm>
+          <a:prstGeom prst="rect">
+            <a:avLst/>
+          </a:prstGeom>
+          <a:ln/>
+        </p:spPr>
+        <p:style>
+          <a:lnRef idx="1">
+            <a:schemeClr val="accent3"/>
+          </a:lnRef>
+          <a:fillRef idx="2">
+            <a:schemeClr val="accent3"/>
+          </a:fillRef>
+          <a:effectRef idx="1">
+            <a:schemeClr val="accent3"/>
+          </a:effectRef>
+          <a:fontRef idx="minor">
+            <a:schemeClr val="dk1"/>
+          </a:fontRef>
+        </p:style>
+        <p:txBody>
+          <a:bodyPr wrap="square" rtlCol="0">
+            <a:spAutoFit/>
+          </a:bodyPr>
+          <a:lstStyle/>
+          <a:p>
+            <a:pPr algn="ctr"/>
+            <a:r>
+              <a:rPr lang="en-US" sz="2400" dirty="0" smtClean="0"/>
+              <a:t>Works with _UNDO</a:t>
+            </a:r>
+          </a:p>
+        </p:txBody>
+      </p:sp>
+    </p:spTree>
+  </p:cSld>
+  <p:clrMapOvr>
+    <a:masterClrMapping/>
+  </p:clrMapOvr>
+  <p:timing>
+    <p:tnLst>
+      <p:par>
+        <p:cTn id="1" dur="indefinite" restart="never" nodeType="tmRoot">
+          <p:childTnLst>
+            <p:seq concurrent="1" nextAc="seek">
+              <p:cTn id="2" dur="indefinite" nodeType="mainSeq">
+                <p:childTnLst>
+                  <p:par>
+                    <p:cTn id="3" fill="hold">
+                      <p:stCondLst>
+                        <p:cond delay="indefinite"/>
+                      </p:stCondLst>
+                      <p:childTnLst>
+                        <p:par>
+                          <p:cTn id="4" fill="hold">
+                            <p:stCondLst>
+                              <p:cond delay="0"/>
+                            </p:stCondLst>
+                            <p:childTnLst>
+                              <p:par>
+                                <p:cTn id="5" presetID="1" presetClass="entr" presetSubtype="0" fill="hold" nodeType="clickEffect">
+                                  <p:stCondLst>
+                                    <p:cond delay="0"/>
+                                  </p:stCondLst>
+                                  <p:childTnLst>
+                                    <p:set>
+                                      <p:cBhvr>
+                                        <p:cTn id="6" dur="1" fill="hold">
+                                          <p:stCondLst>
+                                            <p:cond delay="0"/>
+                                          </p:stCondLst>
+                                        </p:cTn>
+                                        <p:tgtEl>
+                                          <p:spTgt spid="3074"/>
+                                        </p:tgtEl>
+                                        <p:attrNameLst>
+                                          <p:attrName>style.visibility</p:attrName>
+                                        </p:attrNameLst>
+                                      </p:cBhvr>
+                                      <p:to>
+                                        <p:strVal val="visible"/>
+                                      </p:to>
+                                    </p:set>
+                                  </p:childTnLst>
+                                </p:cTn>
+                              </p:par>
+                            </p:childTnLst>
+                          </p:cTn>
+                        </p:par>
+                      </p:childTnLst>
+                    </p:cTn>
+                  </p:par>
+                  <p:par>
+                    <p:cTn id="7" fill="hold">
+                      <p:stCondLst>
+                        <p:cond delay="indefinite"/>
+                      </p:stCondLst>
+                      <p:childTnLst>
+                        <p:par>
+                          <p:cTn id="8" fill="hold">
+                            <p:stCondLst>
+                              <p:cond delay="0"/>
+                            </p:stCondLst>
+                            <p:childTnLst>
+                              <p:par>
+                                <p:cTn id="9" presetID="1" presetClass="entr" presetSubtype="0" fill="hold" grpId="0" nodeType="clickEffect">
+                                  <p:stCondLst>
+                                    <p:cond delay="0"/>
+                                  </p:stCondLst>
+                                  <p:childTnLst>
+                                    <p:set>
+                                      <p:cBhvr>
+                                        <p:cTn id="10" dur="1" fill="hold">
+                                          <p:stCondLst>
+                                            <p:cond delay="0"/>
+                                          </p:stCondLst>
+                                        </p:cTn>
+                                        <p:tgtEl>
+                                          <p:spTgt spid="8"/>
+                                        </p:tgtEl>
+                                        <p:attrNameLst>
+                                          <p:attrName>style.visibility</p:attrName>
+                                        </p:attrNameLst>
+                                      </p:cBhvr>
+                                      <p:to>
+                                        <p:strVal val="visible"/>
+                                      </p:to>
+                                    </p:set>
+                                  </p:childTnLst>
+                                </p:cTn>
+                              </p:par>
+                              <p:par>
+                                <p:cTn id="11" presetID="1" presetClass="entr" presetSubtype="0" fill="hold" nodeType="withEffect">
+                                  <p:stCondLst>
+                                    <p:cond delay="0"/>
+                                  </p:stCondLst>
+                                  <p:childTnLst>
+                                    <p:set>
+                                      <p:cBhvr>
+                                        <p:cTn id="12" dur="1" fill="hold">
+                                          <p:stCondLst>
+                                            <p:cond delay="0"/>
+                                          </p:stCondLst>
+                                        </p:cTn>
+                                        <p:tgtEl>
+                                          <p:spTgt spid="9"/>
+                                        </p:tgtEl>
+                                        <p:attrNameLst>
+                                          <p:attrName>style.visibility</p:attrName>
+                                        </p:attrNameLst>
+                                      </p:cBhvr>
+                                      <p:to>
+                                        <p:strVal val="visible"/>
+                                      </p:to>
+                                    </p:set>
+                                  </p:childTnLst>
+                                </p:cTn>
+                              </p:par>
+                              <p:par>
+                                <p:cTn id="13" presetID="1" presetClass="entr" presetSubtype="0" fill="hold" nodeType="withEffect">
+                                  <p:stCondLst>
+                                    <p:cond delay="0"/>
+                                  </p:stCondLst>
+                                  <p:childTnLst>
+                                    <p:set>
+                                      <p:cBhvr>
+                                        <p:cTn id="14" dur="1" fill="hold">
+                                          <p:stCondLst>
+                                            <p:cond delay="0"/>
+                                          </p:stCondLst>
+                                        </p:cTn>
+                                        <p:tgtEl>
+                                          <p:spTgt spid="10"/>
+                                        </p:tgtEl>
+                                        <p:attrNameLst>
+                                          <p:attrName>style.visibility</p:attrName>
+                                        </p:attrNameLst>
+                                      </p:cBhvr>
+                                      <p:to>
+                                        <p:strVal val="visible"/>
+                                      </p:to>
+                                    </p:set>
+                                  </p:childTnLst>
+                                </p:cTn>
+                              </p:par>
+                            </p:childTnLst>
+                          </p:cTn>
+                        </p:par>
+                      </p:childTnLst>
+                    </p:cTn>
+                  </p:par>
+                  <p:par>
+                    <p:cTn id="15" fill="hold">
+                      <p:stCondLst>
+                        <p:cond delay="indefinite"/>
+                      </p:stCondLst>
+                      <p:childTnLst>
+                        <p:par>
+                          <p:cTn id="16" fill="hold">
+                            <p:stCondLst>
+                              <p:cond delay="0"/>
+                            </p:stCondLst>
+                            <p:childTnLst>
+                              <p:par>
+                                <p:cTn id="17" presetID="1" presetClass="entr" presetSubtype="0" fill="hold" grpId="0" nodeType="clickEffect">
+                                  <p:stCondLst>
+                                    <p:cond delay="0"/>
+                                  </p:stCondLst>
+                                  <p:childTnLst>
+                                    <p:set>
+                                      <p:cBhvr>
+                                        <p:cTn id="18" dur="1" fill="hold">
+                                          <p:stCondLst>
+                                            <p:cond delay="0"/>
+                                          </p:stCondLst>
+                                        </p:cTn>
+                                        <p:tgtEl>
+                                          <p:spTgt spid="13"/>
+                                        </p:tgtEl>
+                                        <p:attrNameLst>
+                                          <p:attrName>style.visibility</p:attrName>
+                                        </p:attrNameLst>
+                                      </p:cBhvr>
+                                      <p:to>
+                                        <p:strVal val="visible"/>
+                                      </p:to>
+                                    </p:set>
+                                  </p:childTnLst>
+                                </p:cTn>
+                              </p:par>
+                              <p:par>
+                                <p:cTn id="19" presetID="1" presetClass="entr" presetSubtype="0" fill="hold" nodeType="withEffect">
+                                  <p:stCondLst>
+                                    <p:cond delay="0"/>
+                                  </p:stCondLst>
+                                  <p:childTnLst>
+                                    <p:set>
+                                      <p:cBhvr>
+                                        <p:cTn id="20" dur="1" fill="hold">
+                                          <p:stCondLst>
+                                            <p:cond delay="0"/>
+                                          </p:stCondLst>
+                                        </p:cTn>
+                                        <p:tgtEl>
+                                          <p:spTgt spid="3075"/>
+                                        </p:tgtEl>
+                                        <p:attrNameLst>
+                                          <p:attrName>style.visibility</p:attrName>
+                                        </p:attrNameLst>
+                                      </p:cBhvr>
+                                      <p:to>
+                                        <p:strVal val="visible"/>
+                                      </p:to>
+                                    </p:set>
+                                  </p:childTnLst>
+                                </p:cTn>
+                              </p:par>
+                            </p:childTnLst>
+                          </p:cTn>
+                        </p:par>
+                      </p:childTnLst>
+                    </p:cTn>
+                  </p:par>
+                  <p:par>
+                    <p:cTn id="21" fill="hold">
+                      <p:stCondLst>
+                        <p:cond delay="indefinite"/>
+                      </p:stCondLst>
+                      <p:childTnLst>
+                        <p:par>
+                          <p:cTn id="22" fill="hold">
+                            <p:stCondLst>
+                              <p:cond delay="0"/>
+                            </p:stCondLst>
+                            <p:childTnLst>
+                              <p:par>
+                                <p:cTn id="23" presetID="1" presetClass="entr" presetSubtype="0" fill="hold" grpId="0" nodeType="clickEffect">
+                                  <p:stCondLst>
+                                    <p:cond delay="0"/>
+                                  </p:stCondLst>
+                                  <p:childTnLst>
+                                    <p:set>
+                                      <p:cBhvr>
+                                        <p:cTn id="24" dur="1" fill="hold">
+                                          <p:stCondLst>
+                                            <p:cond delay="0"/>
+                                          </p:stCondLst>
+                                        </p:cTn>
+                                        <p:tgtEl>
+                                          <p:spTgt spid="15"/>
+                                        </p:tgtEl>
+                                        <p:attrNameLst>
+                                          <p:attrName>style.visibility</p:attrName>
+                                        </p:attrNameLst>
+                                      </p:cBhvr>
+                                      <p:to>
+                                        <p:strVal val="visible"/>
+                                      </p:to>
+                                    </p:set>
+                                  </p:childTnLst>
+                                </p:cTn>
+                              </p:par>
+                            </p:childTnLst>
+                          </p:cTn>
+                        </p:par>
+                      </p:childTnLst>
+                    </p:cTn>
+                  </p:par>
+                </p:childTnLst>
+              </p:cTn>
+              <p:prevCondLst>
+                <p:cond evt="onPrev" delay="0">
+                  <p:tgtEl>
+                    <p:sldTgt/>
+                  </p:tgtEl>
+                </p:cond>
+              </p:prevCondLst>
+              <p:nextCondLst>
+                <p:cond evt="onNext" delay="0">
+                  <p:tgtEl>
+                    <p:sldTgt/>
+                  </p:tgtEl>
+                </p:cond>
+              </p:nextCondLst>
+            </p:seq>
+          </p:childTnLst>
+        </p:cTn>
+      </p:par>
+    </p:tnLst>
+    <p:bldLst>
+      <p:bldP spid="8" grpId="0" animBg="1"/>
+      <p:bldP spid="13" grpId="0" animBg="1"/>
+      <p:bldP spid="15" grpId="0" animBg="1"/>
+    </p:bldLst>
+  </p:timing>
+</p:sld>
+</file>
+
+<file path=ppt/slides/slide46.xml><?xml version="1.0" encoding="utf-8"?>
+<p:sld xmlns:a="http://schemas.openxmlformats.org/drawingml/2006/main" xmlns:r="http://schemas.openxmlformats.org/officeDocument/2006/relationships" xmlns:p="http://schemas.openxmlformats.org/presentationml/2006/main">
+  <p:cSld>
+    <p:spTree>
+      <p:nvGrpSpPr>
+        <p:cNvPr id="1" name=""/>
+        <p:cNvGrpSpPr/>
+        <p:nvPr/>
+      </p:nvGrpSpPr>
+      <p:grpSpPr>
+        <a:xfrm>
+          <a:off x="0" y="0"/>
+          <a:ext cx="0" cy="0"/>
+          <a:chOff x="0" y="0"/>
+          <a:chExt cx="0" cy="0"/>
+        </a:xfrm>
+      </p:grpSpPr>
+      <p:sp>
+        <p:nvSpPr>
+          <p:cNvPr id="2" name="Title 1"/>
+          <p:cNvSpPr>
+            <a:spLocks noGrp="1"/>
+          </p:cNvSpPr>
+          <p:nvPr>
+            <p:ph type="title"/>
+          </p:nvPr>
+        </p:nvSpPr>
+        <p:spPr/>
+        <p:txBody>
+          <a:bodyPr/>
+          <a:lstStyle/>
+          <a:p>
+            <a:r>
+              <a:rPr lang="en-US" dirty="0" smtClean="0"/>
+              <a:t>ATT.mac </a:t>
+            </a:r>
+            <a:r>
+              <a:rPr lang="en-US" dirty="0" smtClean="0">
+                <a:sym typeface="Wingdings" pitchFamily="2" charset="2"/>
+              </a:rPr>
+              <a:t> Quick Set Attributes</a:t>
+            </a:r>
+            <a:endParaRPr lang="en-US" dirty="0"/>
+          </a:p>
+        </p:txBody>
+      </p:sp>
+      <p:sp>
+        <p:nvSpPr>
+          <p:cNvPr id="3" name="TextBox 2"/>
+          <p:cNvSpPr txBox="1"/>
+          <p:nvPr/>
+        </p:nvSpPr>
+        <p:spPr>
+          <a:xfrm>
+            <a:off x="3062177" y="845389"/>
+            <a:ext cx="6081823" cy="369332"/>
+          </a:xfrm>
+          <a:prstGeom prst="rect">
+            <a:avLst/>
+          </a:prstGeom>
+          <a:noFill/>
+        </p:spPr>
+        <p:txBody>
+          <a:bodyPr wrap="square" rtlCol="0">
+            <a:spAutoFit/>
+          </a:bodyPr>
+          <a:lstStyle/>
+          <a:p>
+            <a:pPr algn="r"/>
+            <a:r>
+              <a:rPr lang="en-US" dirty="0" smtClean="0"/>
+              <a:t>“Think: </a:t>
+            </a:r>
+            <a:r>
+              <a:rPr lang="en-US" dirty="0" smtClean="0">
+                <a:solidFill>
+                  <a:schemeClr val="accent6">
+                    <a:lumMod val="75000"/>
+                  </a:schemeClr>
+                </a:solidFill>
+              </a:rPr>
+              <a:t>Att</a:t>
+            </a:r>
+            <a:r>
+              <a:rPr lang="en-US" dirty="0" smtClean="0"/>
+              <a:t>ributes”</a:t>
+            </a:r>
+            <a:endParaRPr lang="en-US" dirty="0"/>
+          </a:p>
+        </p:txBody>
+      </p:sp>
+      <p:sp>
+        <p:nvSpPr>
+          <p:cNvPr id="4" name="TextBox 3"/>
+          <p:cNvSpPr txBox="1"/>
+          <p:nvPr/>
+        </p:nvSpPr>
+        <p:spPr>
+          <a:xfrm>
+            <a:off x="0" y="879895"/>
+            <a:ext cx="8888819" cy="923330"/>
+          </a:xfrm>
+          <a:prstGeom prst="rect">
+            <a:avLst/>
+          </a:prstGeom>
+          <a:noFill/>
+        </p:spPr>
+        <p:txBody>
+          <a:bodyPr wrap="square" rtlCol="0">
+            <a:spAutoFit/>
+          </a:bodyPr>
+          <a:lstStyle/>
+          <a:p>
+            <a:r>
+              <a:rPr lang="en-US" sz="5400" dirty="0" smtClean="0"/>
+              <a:t>ATT,</a:t>
+            </a:r>
+            <a:r>
+              <a:rPr lang="en-US" sz="2400" dirty="0" smtClean="0"/>
+              <a:t> </a:t>
+            </a:r>
+            <a:r>
+              <a:rPr lang="en-US" sz="1600" dirty="0" smtClean="0"/>
+              <a:t>&lt;Attributes Number&gt;,&lt;Coordinate System&gt;</a:t>
+            </a:r>
+            <a:endParaRPr lang="en-US" sz="5400" dirty="0"/>
+          </a:p>
+        </p:txBody>
+      </p:sp>
+      <p:pic>
+        <p:nvPicPr>
+          <p:cNvPr id="4098" name="Picture 2"/>
+          <p:cNvPicPr>
+            <a:picLocks noChangeAspect="1" noChangeArrowheads="1"/>
+          </p:cNvPicPr>
+          <p:nvPr/>
+        </p:nvPicPr>
+        <p:blipFill>
+          <a:blip r:embed="rId2" cstate="print"/>
+          <a:srcRect/>
+          <a:stretch>
+            <a:fillRect/>
+          </a:stretch>
+        </p:blipFill>
+        <p:spPr bwMode="auto">
+          <a:xfrm>
+            <a:off x="1322867" y="2299512"/>
+            <a:ext cx="6215287" cy="2729687"/>
+          </a:xfrm>
+          <a:prstGeom prst="rect">
+            <a:avLst/>
+          </a:prstGeom>
+          <a:noFill/>
+          <a:ln w="9525">
+            <a:noFill/>
+            <a:miter lim="800000"/>
+            <a:headEnd/>
+            <a:tailEnd/>
+          </a:ln>
+        </p:spPr>
+      </p:pic>
+    </p:spTree>
+  </p:cSld>
+  <p:clrMapOvr>
+    <a:masterClrMapping/>
+  </p:clrMapOvr>
+  <p:timing>
+    <p:tnLst>
+      <p:par>
+        <p:cTn id="1" dur="indefinite" restart="never" nodeType="tmRoot"/>
+      </p:par>
+    </p:tnLst>
+  </p:timing>
+</p:sld>
+</file>
+
+<file path=ppt/slides/slide47.xml><?xml version="1.0" encoding="utf-8"?>
+<p:sld xmlns:a="http://schemas.openxmlformats.org/drawingml/2006/main" xmlns:r="http://schemas.openxmlformats.org/officeDocument/2006/relationships" xmlns:p="http://schemas.openxmlformats.org/presentationml/2006/main">
+  <p:cSld>
+    <p:spTree>
+      <p:nvGrpSpPr>
+        <p:cNvPr id="1" name=""/>
+        <p:cNvGrpSpPr/>
+        <p:nvPr/>
+      </p:nvGrpSpPr>
+      <p:grpSpPr>
+        <a:xfrm>
+          <a:off x="0" y="0"/>
+          <a:ext cx="0" cy="0"/>
+          <a:chOff x="0" y="0"/>
+          <a:chExt cx="0" cy="0"/>
+        </a:xfrm>
+      </p:grpSpPr>
+      <p:sp>
+        <p:nvSpPr>
+          <p:cNvPr id="2" name="Title 1"/>
+          <p:cNvSpPr>
+            <a:spLocks noGrp="1"/>
+          </p:cNvSpPr>
+          <p:nvPr>
+            <p:ph type="title"/>
+          </p:nvPr>
+        </p:nvSpPr>
+        <p:spPr/>
+        <p:txBody>
+          <a:bodyPr/>
+          <a:lstStyle/>
+          <a:p>
+            <a:r>
+              <a:rPr lang="en-US" dirty="0" smtClean="0"/>
+              <a:t>ATTMESH.mac </a:t>
+            </a:r>
+            <a:r>
+              <a:rPr lang="en-US" dirty="0" smtClean="0">
+                <a:sym typeface="Wingdings" pitchFamily="2" charset="2"/>
+              </a:rPr>
+              <a:t> Set Attributes and Mesh</a:t>
+            </a:r>
+            <a:endParaRPr lang="en-US" dirty="0"/>
+          </a:p>
+        </p:txBody>
+      </p:sp>
+      <p:sp>
+        <p:nvSpPr>
+          <p:cNvPr id="3" name="TextBox 2"/>
+          <p:cNvSpPr txBox="1"/>
+          <p:nvPr/>
+        </p:nvSpPr>
+        <p:spPr>
+          <a:xfrm>
+            <a:off x="3062177" y="845389"/>
+            <a:ext cx="6081823" cy="369332"/>
+          </a:xfrm>
+          <a:prstGeom prst="rect">
+            <a:avLst/>
+          </a:prstGeom>
+          <a:noFill/>
+        </p:spPr>
+        <p:txBody>
+          <a:bodyPr wrap="square" rtlCol="0">
+            <a:spAutoFit/>
+          </a:bodyPr>
+          <a:lstStyle/>
+          <a:p>
+            <a:pPr algn="r"/>
+            <a:r>
+              <a:rPr lang="en-US" dirty="0" smtClean="0"/>
+              <a:t>“Think: </a:t>
+            </a:r>
+            <a:r>
+              <a:rPr lang="en-US" dirty="0" smtClean="0">
+                <a:solidFill>
+                  <a:schemeClr val="accent6">
+                    <a:lumMod val="75000"/>
+                  </a:schemeClr>
+                </a:solidFill>
+              </a:rPr>
+              <a:t>Att</a:t>
+            </a:r>
+            <a:r>
+              <a:rPr lang="en-US" dirty="0" smtClean="0"/>
+              <a:t>ribute </a:t>
+            </a:r>
+            <a:r>
+              <a:rPr lang="en-US" dirty="0" smtClean="0">
+                <a:solidFill>
+                  <a:schemeClr val="accent6">
+                    <a:lumMod val="75000"/>
+                  </a:schemeClr>
+                </a:solidFill>
+              </a:rPr>
+              <a:t>Mesh</a:t>
+            </a:r>
+            <a:r>
+              <a:rPr lang="en-US" dirty="0" smtClean="0"/>
+              <a:t>”</a:t>
+            </a:r>
+            <a:endParaRPr lang="en-US" dirty="0"/>
+          </a:p>
+        </p:txBody>
+      </p:sp>
+      <p:sp>
+        <p:nvSpPr>
+          <p:cNvPr id="4" name="TextBox 3"/>
+          <p:cNvSpPr txBox="1"/>
+          <p:nvPr/>
+        </p:nvSpPr>
+        <p:spPr>
+          <a:xfrm>
+            <a:off x="0" y="879895"/>
+            <a:ext cx="8888819" cy="1169551"/>
+          </a:xfrm>
+          <a:prstGeom prst="rect">
+            <a:avLst/>
+          </a:prstGeom>
+          <a:noFill/>
+        </p:spPr>
+        <p:txBody>
+          <a:bodyPr wrap="square" rtlCol="0">
+            <a:spAutoFit/>
+          </a:bodyPr>
+          <a:lstStyle/>
+          <a:p>
+            <a:r>
+              <a:rPr lang="en-US" sz="5400" dirty="0" smtClean="0"/>
+              <a:t>ATTMESH,</a:t>
+            </a:r>
+            <a:r>
+              <a:rPr lang="en-US" sz="2400" dirty="0" smtClean="0"/>
+              <a:t> </a:t>
+            </a:r>
+            <a:r>
+              <a:rPr lang="en-US" sz="1600" dirty="0" smtClean="0"/>
+              <a:t>&lt;Type&gt;,&lt;Element Type / Real &gt;, &lt;First Thing&gt;, </a:t>
+            </a:r>
+          </a:p>
+          <a:p>
+            <a:r>
+              <a:rPr lang="en-US" sz="1600" dirty="0" smtClean="0"/>
+              <a:t>&lt;Last Thing&gt;, &lt;Inclement&gt;, &lt;KP Orient&gt;</a:t>
+            </a:r>
+            <a:endParaRPr lang="en-US" sz="5400" dirty="0"/>
+          </a:p>
+        </p:txBody>
+      </p:sp>
+      <p:sp>
+        <p:nvSpPr>
+          <p:cNvPr id="5" name="TextBox 4"/>
+          <p:cNvSpPr txBox="1"/>
+          <p:nvPr/>
+        </p:nvSpPr>
+        <p:spPr>
+          <a:xfrm>
+            <a:off x="0" y="2105245"/>
+            <a:ext cx="8006316" cy="307777"/>
+          </a:xfrm>
+          <a:prstGeom prst="rect">
+            <a:avLst/>
+          </a:prstGeom>
+          <a:noFill/>
+          <a:ln>
+            <a:noFill/>
+          </a:ln>
+        </p:spPr>
+        <p:txBody>
+          <a:bodyPr wrap="square" rtlCol="0">
+            <a:spAutoFit/>
+          </a:bodyPr>
+          <a:lstStyle/>
+          <a:p>
+            <a:r>
+              <a:rPr lang="en-US" sz="1400" dirty="0" smtClean="0"/>
+              <a:t>Lots of stuff on one line…</a:t>
+            </a:r>
+          </a:p>
+        </p:txBody>
+      </p:sp>
+      <p:sp>
+        <p:nvSpPr>
+          <p:cNvPr id="6" name="TextBox 5"/>
+          <p:cNvSpPr txBox="1"/>
+          <p:nvPr/>
+        </p:nvSpPr>
+        <p:spPr>
+          <a:xfrm>
+            <a:off x="106322" y="2466783"/>
+            <a:ext cx="1892595" cy="307777"/>
+          </a:xfrm>
+          <a:prstGeom prst="rect">
+            <a:avLst/>
+          </a:prstGeom>
+          <a:noFill/>
+          <a:ln>
+            <a:noFill/>
+          </a:ln>
+        </p:spPr>
+        <p:txBody>
+          <a:bodyPr wrap="square" rtlCol="0">
+            <a:spAutoFit/>
+          </a:bodyPr>
+          <a:lstStyle/>
+          <a:p>
+            <a:r>
+              <a:rPr lang="en-US" sz="1400" b="1" dirty="0" smtClean="0"/>
+              <a:t>Type</a:t>
+            </a:r>
+            <a:endParaRPr lang="en-US" sz="1400" dirty="0" smtClean="0"/>
+          </a:p>
+        </p:txBody>
+      </p:sp>
+      <p:sp>
+        <p:nvSpPr>
+          <p:cNvPr id="7" name="Rectangle 6"/>
+          <p:cNvSpPr/>
+          <p:nvPr/>
+        </p:nvSpPr>
+        <p:spPr>
+          <a:xfrm>
+            <a:off x="1977633" y="2443103"/>
+            <a:ext cx="6025117" cy="307777"/>
+          </a:xfrm>
+          <a:prstGeom prst="rect">
+            <a:avLst/>
+          </a:prstGeom>
+        </p:spPr>
+        <p:txBody>
+          <a:bodyPr wrap="square">
+            <a:spAutoFit/>
+          </a:bodyPr>
+          <a:lstStyle/>
+          <a:p>
+            <a:r>
+              <a:rPr lang="en-US" sz="1400" dirty="0" smtClean="0"/>
+              <a:t>Type of thing to mesh “</a:t>
+            </a:r>
+            <a:r>
+              <a:rPr lang="en-US" sz="1400" dirty="0" err="1" smtClean="0"/>
+              <a:t>kp</a:t>
+            </a:r>
+            <a:r>
+              <a:rPr lang="en-US" sz="1400" dirty="0" smtClean="0"/>
+              <a:t>”, “line”, “area”, “</a:t>
+            </a:r>
+            <a:r>
+              <a:rPr lang="en-US" sz="1400" dirty="0" err="1" smtClean="0"/>
+              <a:t>volu</a:t>
+            </a:r>
+            <a:r>
+              <a:rPr lang="en-US" sz="1400" dirty="0" smtClean="0"/>
+              <a:t>” </a:t>
+            </a:r>
+          </a:p>
+        </p:txBody>
+      </p:sp>
+      <p:sp>
+        <p:nvSpPr>
+          <p:cNvPr id="8" name="TextBox 7"/>
+          <p:cNvSpPr txBox="1"/>
+          <p:nvPr/>
+        </p:nvSpPr>
+        <p:spPr>
+          <a:xfrm>
+            <a:off x="109864" y="2733727"/>
+            <a:ext cx="1892595" cy="307777"/>
+          </a:xfrm>
+          <a:prstGeom prst="rect">
+            <a:avLst/>
+          </a:prstGeom>
+          <a:noFill/>
+          <a:ln>
+            <a:noFill/>
+          </a:ln>
+        </p:spPr>
+        <p:txBody>
+          <a:bodyPr wrap="square" rtlCol="0">
+            <a:spAutoFit/>
+          </a:bodyPr>
+          <a:lstStyle/>
+          <a:p>
+            <a:r>
+              <a:rPr lang="en-US" sz="1400" b="1" dirty="0" smtClean="0"/>
+              <a:t>Element Type / Real</a:t>
+            </a:r>
+            <a:endParaRPr lang="en-US" sz="1400" dirty="0" smtClean="0"/>
+          </a:p>
+        </p:txBody>
+      </p:sp>
+      <p:sp>
+        <p:nvSpPr>
+          <p:cNvPr id="9" name="Rectangle 8"/>
+          <p:cNvSpPr/>
+          <p:nvPr/>
+        </p:nvSpPr>
+        <p:spPr>
+          <a:xfrm>
+            <a:off x="1981175" y="2733727"/>
+            <a:ext cx="6514239" cy="307777"/>
+          </a:xfrm>
+          <a:prstGeom prst="rect">
+            <a:avLst/>
+          </a:prstGeom>
+        </p:spPr>
+        <p:txBody>
+          <a:bodyPr wrap="square">
+            <a:spAutoFit/>
+          </a:bodyPr>
+          <a:lstStyle/>
+          <a:p>
+            <a:r>
+              <a:rPr lang="en-US" sz="1400" dirty="0" smtClean="0"/>
+              <a:t>Element Type and Real Number to be assigned</a:t>
+            </a:r>
+          </a:p>
+        </p:txBody>
+      </p:sp>
+      <p:sp>
+        <p:nvSpPr>
+          <p:cNvPr id="10" name="TextBox 9"/>
+          <p:cNvSpPr txBox="1"/>
+          <p:nvPr/>
+        </p:nvSpPr>
+        <p:spPr>
+          <a:xfrm>
+            <a:off x="124041" y="2981820"/>
+            <a:ext cx="1892595" cy="307777"/>
+          </a:xfrm>
+          <a:prstGeom prst="rect">
+            <a:avLst/>
+          </a:prstGeom>
+          <a:noFill/>
+          <a:ln>
+            <a:noFill/>
+          </a:ln>
+        </p:spPr>
+        <p:txBody>
+          <a:bodyPr wrap="square" rtlCol="0">
+            <a:spAutoFit/>
+          </a:bodyPr>
+          <a:lstStyle/>
+          <a:p>
+            <a:r>
+              <a:rPr lang="en-US" sz="1400" b="1" dirty="0" smtClean="0"/>
+              <a:t>Material Number</a:t>
+            </a:r>
+            <a:endParaRPr lang="en-US" sz="1400" dirty="0" smtClean="0"/>
+          </a:p>
+        </p:txBody>
+      </p:sp>
+      <p:sp>
+        <p:nvSpPr>
+          <p:cNvPr id="11" name="Rectangle 10"/>
+          <p:cNvSpPr/>
+          <p:nvPr/>
+        </p:nvSpPr>
+        <p:spPr>
+          <a:xfrm>
+            <a:off x="1995353" y="2981820"/>
+            <a:ext cx="6383076" cy="307777"/>
+          </a:xfrm>
+          <a:prstGeom prst="rect">
+            <a:avLst/>
+          </a:prstGeom>
+        </p:spPr>
+        <p:txBody>
+          <a:bodyPr wrap="square">
+            <a:spAutoFit/>
+          </a:bodyPr>
+          <a:lstStyle/>
+          <a:p>
+            <a:r>
+              <a:rPr lang="en-US" sz="1400" dirty="0" smtClean="0"/>
+              <a:t>Material Number to be assigned</a:t>
+            </a:r>
+          </a:p>
+        </p:txBody>
+      </p:sp>
+      <p:sp>
+        <p:nvSpPr>
+          <p:cNvPr id="12" name="TextBox 11"/>
+          <p:cNvSpPr txBox="1"/>
+          <p:nvPr/>
+        </p:nvSpPr>
+        <p:spPr>
+          <a:xfrm>
+            <a:off x="124036" y="3261805"/>
+            <a:ext cx="1892595" cy="307777"/>
+          </a:xfrm>
+          <a:prstGeom prst="rect">
+            <a:avLst/>
+          </a:prstGeom>
+          <a:noFill/>
+          <a:ln>
+            <a:noFill/>
+          </a:ln>
+        </p:spPr>
+        <p:txBody>
+          <a:bodyPr wrap="square" rtlCol="0">
+            <a:spAutoFit/>
+          </a:bodyPr>
+          <a:lstStyle/>
+          <a:p>
+            <a:r>
+              <a:rPr lang="en-US" sz="1400" b="1" dirty="0" smtClean="0"/>
+              <a:t>First Thing</a:t>
+            </a:r>
+            <a:endParaRPr lang="en-US" sz="1400" dirty="0" smtClean="0"/>
+          </a:p>
+        </p:txBody>
+      </p:sp>
+      <p:sp>
+        <p:nvSpPr>
+          <p:cNvPr id="13" name="Rectangle 12"/>
+          <p:cNvSpPr/>
+          <p:nvPr/>
+        </p:nvSpPr>
+        <p:spPr>
+          <a:xfrm>
+            <a:off x="1995348" y="3261805"/>
+            <a:ext cx="6383076" cy="307777"/>
+          </a:xfrm>
+          <a:prstGeom prst="rect">
+            <a:avLst/>
+          </a:prstGeom>
+        </p:spPr>
+        <p:txBody>
+          <a:bodyPr wrap="square">
+            <a:spAutoFit/>
+          </a:bodyPr>
+          <a:lstStyle/>
+          <a:p>
+            <a:r>
+              <a:rPr lang="en-US" sz="1400" dirty="0" smtClean="0"/>
+              <a:t>First “</a:t>
+            </a:r>
+            <a:r>
+              <a:rPr lang="en-US" sz="1400" dirty="0" err="1" smtClean="0"/>
+              <a:t>kp</a:t>
+            </a:r>
+            <a:r>
+              <a:rPr lang="en-US" sz="1400" dirty="0" smtClean="0"/>
+              <a:t>”, “line”, “area” or “</a:t>
+            </a:r>
+            <a:r>
+              <a:rPr lang="en-US" sz="1400" dirty="0" err="1" smtClean="0"/>
+              <a:t>volu</a:t>
+            </a:r>
+            <a:r>
+              <a:rPr lang="en-US" sz="1400" dirty="0" smtClean="0"/>
+              <a:t>” to be meshed </a:t>
+            </a:r>
+          </a:p>
+        </p:txBody>
+      </p:sp>
+      <p:sp>
+        <p:nvSpPr>
+          <p:cNvPr id="14" name="TextBox 13"/>
+          <p:cNvSpPr txBox="1"/>
+          <p:nvPr/>
+        </p:nvSpPr>
+        <p:spPr>
+          <a:xfrm>
+            <a:off x="116963" y="3541792"/>
+            <a:ext cx="1892595" cy="307777"/>
+          </a:xfrm>
+          <a:prstGeom prst="rect">
+            <a:avLst/>
+          </a:prstGeom>
+          <a:noFill/>
+          <a:ln>
+            <a:noFill/>
+          </a:ln>
+        </p:spPr>
+        <p:txBody>
+          <a:bodyPr wrap="square" rtlCol="0">
+            <a:spAutoFit/>
+          </a:bodyPr>
+          <a:lstStyle/>
+          <a:p>
+            <a:r>
+              <a:rPr lang="en-US" sz="1400" b="1" dirty="0" smtClean="0"/>
+              <a:t>Last Thing</a:t>
+            </a:r>
+            <a:endParaRPr lang="en-US" sz="1400" dirty="0" smtClean="0"/>
+          </a:p>
+        </p:txBody>
+      </p:sp>
+      <p:sp>
+        <p:nvSpPr>
+          <p:cNvPr id="15" name="Rectangle 14"/>
+          <p:cNvSpPr/>
+          <p:nvPr/>
+        </p:nvSpPr>
+        <p:spPr>
+          <a:xfrm>
+            <a:off x="1988275" y="3541792"/>
+            <a:ext cx="6383076" cy="307777"/>
+          </a:xfrm>
+          <a:prstGeom prst="rect">
+            <a:avLst/>
+          </a:prstGeom>
+        </p:spPr>
+        <p:txBody>
+          <a:bodyPr wrap="square">
+            <a:spAutoFit/>
+          </a:bodyPr>
+          <a:lstStyle/>
+          <a:p>
+            <a:r>
+              <a:rPr lang="en-US" sz="1400" dirty="0" smtClean="0"/>
+              <a:t>Last “</a:t>
+            </a:r>
+            <a:r>
+              <a:rPr lang="en-US" sz="1400" dirty="0" err="1" smtClean="0"/>
+              <a:t>kp</a:t>
+            </a:r>
+            <a:r>
+              <a:rPr lang="en-US" sz="1400" dirty="0" smtClean="0"/>
+              <a:t>”, “line”, “area” or “</a:t>
+            </a:r>
+            <a:r>
+              <a:rPr lang="en-US" sz="1400" dirty="0" err="1" smtClean="0"/>
+              <a:t>volu</a:t>
+            </a:r>
+            <a:r>
+              <a:rPr lang="en-US" sz="1400" dirty="0" smtClean="0"/>
+              <a:t>” to be meshed </a:t>
+            </a:r>
+          </a:p>
+        </p:txBody>
+      </p:sp>
+      <p:sp>
+        <p:nvSpPr>
+          <p:cNvPr id="16" name="TextBox 15"/>
+          <p:cNvSpPr txBox="1"/>
+          <p:nvPr/>
+        </p:nvSpPr>
+        <p:spPr>
+          <a:xfrm>
+            <a:off x="116963" y="3811142"/>
+            <a:ext cx="1892595" cy="307777"/>
+          </a:xfrm>
+          <a:prstGeom prst="rect">
+            <a:avLst/>
+          </a:prstGeom>
+          <a:noFill/>
+          <a:ln>
+            <a:noFill/>
+          </a:ln>
+        </p:spPr>
+        <p:txBody>
+          <a:bodyPr wrap="square" rtlCol="0">
+            <a:spAutoFit/>
+          </a:bodyPr>
+          <a:lstStyle/>
+          <a:p>
+            <a:r>
+              <a:rPr lang="en-US" sz="1400" b="1" dirty="0" smtClean="0"/>
+              <a:t>Increment</a:t>
+            </a:r>
+            <a:endParaRPr lang="en-US" sz="1400" dirty="0" smtClean="0"/>
+          </a:p>
+        </p:txBody>
+      </p:sp>
+      <p:sp>
+        <p:nvSpPr>
+          <p:cNvPr id="17" name="Rectangle 16"/>
+          <p:cNvSpPr/>
+          <p:nvPr/>
+        </p:nvSpPr>
+        <p:spPr>
+          <a:xfrm>
+            <a:off x="1988275" y="3811142"/>
+            <a:ext cx="6383076" cy="307777"/>
+          </a:xfrm>
+          <a:prstGeom prst="rect">
+            <a:avLst/>
+          </a:prstGeom>
+        </p:spPr>
+        <p:txBody>
+          <a:bodyPr wrap="square">
+            <a:spAutoFit/>
+          </a:bodyPr>
+          <a:lstStyle/>
+          <a:p>
+            <a:r>
+              <a:rPr lang="en-US" sz="1400" dirty="0" smtClean="0"/>
+              <a:t>Increment through things, </a:t>
+            </a:r>
+            <a:r>
+              <a:rPr lang="en-US" sz="1400" dirty="0" err="1" smtClean="0"/>
+              <a:t>ie</a:t>
+            </a:r>
+            <a:r>
+              <a:rPr lang="en-US" sz="1400" dirty="0" smtClean="0"/>
+              <a:t> 2 </a:t>
+            </a:r>
+            <a:r>
+              <a:rPr lang="en-US" sz="1400" dirty="0" smtClean="0">
+                <a:sym typeface="Wingdings" pitchFamily="2" charset="2"/>
+              </a:rPr>
+              <a:t> every other thing from first to last</a:t>
+            </a:r>
+            <a:endParaRPr lang="en-US" sz="1400" dirty="0" smtClean="0"/>
+          </a:p>
+        </p:txBody>
+      </p:sp>
+      <p:sp>
+        <p:nvSpPr>
+          <p:cNvPr id="18" name="TextBox 17"/>
+          <p:cNvSpPr txBox="1"/>
+          <p:nvPr/>
+        </p:nvSpPr>
+        <p:spPr>
+          <a:xfrm>
+            <a:off x="138229" y="4112393"/>
+            <a:ext cx="1892595" cy="307777"/>
+          </a:xfrm>
+          <a:prstGeom prst="rect">
+            <a:avLst/>
+          </a:prstGeom>
+          <a:noFill/>
+          <a:ln>
+            <a:noFill/>
+          </a:ln>
+        </p:spPr>
+        <p:txBody>
+          <a:bodyPr wrap="square" rtlCol="0">
+            <a:spAutoFit/>
+          </a:bodyPr>
+          <a:lstStyle/>
+          <a:p>
+            <a:r>
+              <a:rPr lang="en-US" sz="1400" b="1" dirty="0" smtClean="0"/>
+              <a:t>KP Orient</a:t>
+            </a:r>
+            <a:endParaRPr lang="en-US" sz="1400" dirty="0" smtClean="0"/>
+          </a:p>
+        </p:txBody>
+      </p:sp>
+      <p:sp>
+        <p:nvSpPr>
+          <p:cNvPr id="19" name="Rectangle 18"/>
+          <p:cNvSpPr/>
+          <p:nvPr/>
+        </p:nvSpPr>
+        <p:spPr>
+          <a:xfrm>
+            <a:off x="2009541" y="4112393"/>
+            <a:ext cx="6383076" cy="307777"/>
+          </a:xfrm>
+          <a:prstGeom prst="rect">
+            <a:avLst/>
+          </a:prstGeom>
+        </p:spPr>
+        <p:txBody>
+          <a:bodyPr wrap="square">
+            <a:spAutoFit/>
+          </a:bodyPr>
+          <a:lstStyle/>
+          <a:p>
+            <a:r>
+              <a:rPr lang="en-US" sz="1400" dirty="0" smtClean="0"/>
+              <a:t>Orients meshed lines to that </a:t>
+            </a:r>
+            <a:r>
+              <a:rPr lang="en-US" sz="1400" dirty="0" err="1" smtClean="0"/>
+              <a:t>keypoint</a:t>
+            </a:r>
+            <a:r>
+              <a:rPr lang="en-US" sz="1400" dirty="0" smtClean="0"/>
+              <a:t> (optional)</a:t>
+            </a:r>
+            <a:endParaRPr lang="en-US" sz="1400" dirty="0" smtClean="0"/>
+          </a:p>
+        </p:txBody>
+      </p:sp>
+      <p:pic>
+        <p:nvPicPr>
+          <p:cNvPr id="5122" name="Picture 2"/>
+          <p:cNvPicPr>
+            <a:picLocks noChangeAspect="1" noChangeArrowheads="1"/>
+          </p:cNvPicPr>
+          <p:nvPr/>
+        </p:nvPicPr>
+        <p:blipFill>
+          <a:blip r:embed="rId2" cstate="print"/>
+          <a:srcRect/>
+          <a:stretch>
+            <a:fillRect/>
+          </a:stretch>
+        </p:blipFill>
+        <p:spPr bwMode="auto">
+          <a:xfrm>
+            <a:off x="206449" y="4742119"/>
+            <a:ext cx="3974307" cy="1588015"/>
+          </a:xfrm>
+          <a:prstGeom prst="rect">
+            <a:avLst/>
+          </a:prstGeom>
+          <a:noFill/>
+          <a:ln w="9525">
+            <a:noFill/>
+            <a:miter lim="800000"/>
+            <a:headEnd/>
+            <a:tailEnd/>
+          </a:ln>
+        </p:spPr>
+      </p:pic>
+      <p:pic>
+        <p:nvPicPr>
+          <p:cNvPr id="5125" name="Picture 5"/>
+          <p:cNvPicPr>
+            <a:picLocks noChangeAspect="1" noChangeArrowheads="1"/>
+          </p:cNvPicPr>
+          <p:nvPr/>
+        </p:nvPicPr>
+        <p:blipFill>
+          <a:blip r:embed="rId3" cstate="print"/>
+          <a:srcRect/>
+          <a:stretch>
+            <a:fillRect/>
+          </a:stretch>
+        </p:blipFill>
+        <p:spPr bwMode="auto">
+          <a:xfrm>
+            <a:off x="4391247" y="4556739"/>
+            <a:ext cx="4478595" cy="1982284"/>
+          </a:xfrm>
+          <a:prstGeom prst="rect">
+            <a:avLst/>
+          </a:prstGeom>
+          <a:noFill/>
+          <a:ln w="9525">
+            <a:noFill/>
+            <a:miter lim="800000"/>
+            <a:headEnd/>
+            <a:tailEnd/>
+          </a:ln>
+        </p:spPr>
+      </p:pic>
+      <p:pic>
+        <p:nvPicPr>
+          <p:cNvPr id="5124" name="Picture 4"/>
+          <p:cNvPicPr>
+            <a:picLocks noChangeAspect="1" noChangeArrowheads="1"/>
+          </p:cNvPicPr>
+          <p:nvPr/>
+        </p:nvPicPr>
+        <p:blipFill>
+          <a:blip r:embed="rId4" cstate="print"/>
+          <a:srcRect/>
+          <a:stretch>
+            <a:fillRect/>
+          </a:stretch>
+        </p:blipFill>
+        <p:spPr bwMode="auto">
+          <a:xfrm>
+            <a:off x="2717062" y="4578978"/>
+            <a:ext cx="3120214" cy="612042"/>
+          </a:xfrm>
+          <a:prstGeom prst="rect">
+            <a:avLst/>
+          </a:prstGeom>
+          <a:noFill/>
+          <a:ln w="9525">
+            <a:noFill/>
+            <a:miter lim="800000"/>
+            <a:headEnd/>
+            <a:tailEnd/>
+          </a:ln>
+        </p:spPr>
+      </p:pic>
+      <p:sp>
+        <p:nvSpPr>
+          <p:cNvPr id="23" name="TextBox 22"/>
+          <p:cNvSpPr txBox="1"/>
+          <p:nvPr/>
+        </p:nvSpPr>
+        <p:spPr>
+          <a:xfrm>
+            <a:off x="3104707" y="6396335"/>
+            <a:ext cx="2668772" cy="461665"/>
+          </a:xfrm>
+          <a:prstGeom prst="rect">
+            <a:avLst/>
+          </a:prstGeom>
+          <a:ln/>
+        </p:spPr>
+        <p:style>
+          <a:lnRef idx="1">
+            <a:schemeClr val="accent3"/>
+          </a:lnRef>
+          <a:fillRef idx="2">
+            <a:schemeClr val="accent3"/>
+          </a:fillRef>
+          <a:effectRef idx="1">
+            <a:schemeClr val="accent3"/>
+          </a:effectRef>
+          <a:fontRef idx="minor">
+            <a:schemeClr val="dk1"/>
+          </a:fontRef>
+        </p:style>
+        <p:txBody>
+          <a:bodyPr wrap="square" rtlCol="0">
+            <a:spAutoFit/>
+          </a:bodyPr>
+          <a:lstStyle/>
+          <a:p>
+            <a:pPr algn="ctr"/>
+            <a:r>
+              <a:rPr lang="en-US" sz="2400" dirty="0" smtClean="0"/>
+              <a:t>Works with _UNDO</a:t>
+            </a:r>
+          </a:p>
+        </p:txBody>
+      </p:sp>
+    </p:spTree>
+  </p:cSld>
+  <p:clrMapOvr>
+    <a:masterClrMapping/>
+  </p:clrMapOvr>
+  <p:timing>
+    <p:tnLst>
+      <p:par>
+        <p:cTn id="1" dur="indefinite" restart="never" nodeType="tmRoot">
+          <p:childTnLst>
+            <p:seq concurrent="1" nextAc="seek">
+              <p:cTn id="2" dur="indefinite" nodeType="mainSeq">
+                <p:childTnLst>
+                  <p:par>
+                    <p:cTn id="3" fill="hold">
+                      <p:stCondLst>
+                        <p:cond delay="indefinite"/>
+                      </p:stCondLst>
+                      <p:childTnLst>
+                        <p:par>
+                          <p:cTn id="4" fill="hold">
+                            <p:stCondLst>
+                              <p:cond delay="0"/>
+                            </p:stCondLst>
+                            <p:childTnLst>
+                              <p:par>
+                                <p:cTn id="5" presetID="1" presetClass="entr" presetSubtype="0" fill="hold" grpId="0" nodeType="clickEffect">
+                                  <p:stCondLst>
+                                    <p:cond delay="0"/>
+                                  </p:stCondLst>
+                                  <p:childTnLst>
+                                    <p:set>
+                                      <p:cBhvr>
+                                        <p:cTn id="6" dur="1" fill="hold">
+                                          <p:stCondLst>
+                                            <p:cond delay="0"/>
+                                          </p:stCondLst>
+                                        </p:cTn>
+                                        <p:tgtEl>
+                                          <p:spTgt spid="6"/>
+                                        </p:tgtEl>
+                                        <p:attrNameLst>
+                                          <p:attrName>style.visibility</p:attrName>
+                                        </p:attrNameLst>
+                                      </p:cBhvr>
+                                      <p:to>
+                                        <p:strVal val="visible"/>
+                                      </p:to>
+                                    </p:set>
+                                  </p:childTnLst>
+                                </p:cTn>
+                              </p:par>
+                              <p:par>
+                                <p:cTn id="7" presetID="1" presetClass="entr" presetSubtype="0" fill="hold" grpId="0" nodeType="withEffect">
+                                  <p:stCondLst>
+                                    <p:cond delay="0"/>
+                                  </p:stCondLst>
+                                  <p:childTnLst>
+                                    <p:set>
+                                      <p:cBhvr>
+                                        <p:cTn id="8" dur="1" fill="hold">
+                                          <p:stCondLst>
+                                            <p:cond delay="0"/>
+                                          </p:stCondLst>
+                                        </p:cTn>
+                                        <p:tgtEl>
+                                          <p:spTgt spid="7"/>
+                                        </p:tgtEl>
+                                        <p:attrNameLst>
+                                          <p:attrName>style.visibility</p:attrName>
+                                        </p:attrNameLst>
+                                      </p:cBhvr>
+                                      <p:to>
+                                        <p:strVal val="visible"/>
+                                      </p:to>
+                                    </p:set>
+                                  </p:childTnLst>
+                                </p:cTn>
+                              </p:par>
+                            </p:childTnLst>
+                          </p:cTn>
+                        </p:par>
+                      </p:childTnLst>
+                    </p:cTn>
+                  </p:par>
+                  <p:par>
+                    <p:cTn id="9" fill="hold">
+                      <p:stCondLst>
+                        <p:cond delay="indefinite"/>
+                      </p:stCondLst>
+                      <p:childTnLst>
+                        <p:par>
+                          <p:cTn id="10" fill="hold">
+                            <p:stCondLst>
+                              <p:cond delay="0"/>
+                            </p:stCondLst>
+                            <p:childTnLst>
+                              <p:par>
+                                <p:cTn id="11" presetID="1" presetClass="entr" presetSubtype="0" fill="hold" grpId="0" nodeType="clickEffect">
+                                  <p:stCondLst>
+                                    <p:cond delay="0"/>
+                                  </p:stCondLst>
+                                  <p:childTnLst>
+                                    <p:set>
+                                      <p:cBhvr>
+                                        <p:cTn id="12" dur="1" fill="hold">
+                                          <p:stCondLst>
+                                            <p:cond delay="0"/>
+                                          </p:stCondLst>
+                                        </p:cTn>
+                                        <p:tgtEl>
+                                          <p:spTgt spid="8"/>
+                                        </p:tgtEl>
+                                        <p:attrNameLst>
+                                          <p:attrName>style.visibility</p:attrName>
+                                        </p:attrNameLst>
+                                      </p:cBhvr>
+                                      <p:to>
+                                        <p:strVal val="visible"/>
+                                      </p:to>
+                                    </p:set>
+                                  </p:childTnLst>
+                                </p:cTn>
+                              </p:par>
+                              <p:par>
+                                <p:cTn id="13" presetID="1" presetClass="entr" presetSubtype="0" fill="hold" grpId="0" nodeType="withEffect">
+                                  <p:stCondLst>
+                                    <p:cond delay="0"/>
+                                  </p:stCondLst>
+                                  <p:childTnLst>
+                                    <p:set>
+                                      <p:cBhvr>
+                                        <p:cTn id="14" dur="1" fill="hold">
+                                          <p:stCondLst>
+                                            <p:cond delay="0"/>
+                                          </p:stCondLst>
+                                        </p:cTn>
+                                        <p:tgtEl>
+                                          <p:spTgt spid="9"/>
+                                        </p:tgtEl>
+                                        <p:attrNameLst>
+                                          <p:attrName>style.visibility</p:attrName>
+                                        </p:attrNameLst>
+                                      </p:cBhvr>
+                                      <p:to>
+                                        <p:strVal val="visible"/>
+                                      </p:to>
+                                    </p:set>
+                                  </p:childTnLst>
+                                </p:cTn>
+                              </p:par>
+                            </p:childTnLst>
+                          </p:cTn>
+                        </p:par>
+                      </p:childTnLst>
+                    </p:cTn>
+                  </p:par>
+                  <p:par>
+                    <p:cTn id="15" fill="hold">
+                      <p:stCondLst>
+                        <p:cond delay="indefinite"/>
+                      </p:stCondLst>
+                      <p:childTnLst>
+                        <p:par>
+                          <p:cTn id="16" fill="hold">
+                            <p:stCondLst>
+                              <p:cond delay="0"/>
+                            </p:stCondLst>
+                            <p:childTnLst>
+                              <p:par>
+                                <p:cTn id="17" presetID="1" presetClass="entr" presetSubtype="0" fill="hold" grpId="0" nodeType="clickEffect">
+                                  <p:stCondLst>
+                                    <p:cond delay="0"/>
+                                  </p:stCondLst>
+                                  <p:childTnLst>
+                                    <p:set>
+                                      <p:cBhvr>
+                                        <p:cTn id="18" dur="1" fill="hold">
+                                          <p:stCondLst>
+                                            <p:cond delay="0"/>
+                                          </p:stCondLst>
+                                        </p:cTn>
+                                        <p:tgtEl>
+                                          <p:spTgt spid="10"/>
+                                        </p:tgtEl>
+                                        <p:attrNameLst>
+                                          <p:attrName>style.visibility</p:attrName>
+                                        </p:attrNameLst>
+                                      </p:cBhvr>
+                                      <p:to>
+                                        <p:strVal val="visible"/>
+                                      </p:to>
+                                    </p:set>
+                                  </p:childTnLst>
+                                </p:cTn>
+                              </p:par>
+                              <p:par>
+                                <p:cTn id="19" presetID="1" presetClass="entr" presetSubtype="0" fill="hold" grpId="0" nodeType="withEffect">
+                                  <p:stCondLst>
+                                    <p:cond delay="0"/>
+                                  </p:stCondLst>
+                                  <p:childTnLst>
+                                    <p:set>
+                                      <p:cBhvr>
+                                        <p:cTn id="20" dur="1" fill="hold">
+                                          <p:stCondLst>
+                                            <p:cond delay="0"/>
+                                          </p:stCondLst>
+                                        </p:cTn>
+                                        <p:tgtEl>
+                                          <p:spTgt spid="11"/>
+                                        </p:tgtEl>
+                                        <p:attrNameLst>
+                                          <p:attrName>style.visibility</p:attrName>
+                                        </p:attrNameLst>
+                                      </p:cBhvr>
+                                      <p:to>
+                                        <p:strVal val="visible"/>
+                                      </p:to>
+                                    </p:set>
+                                  </p:childTnLst>
+                                </p:cTn>
+                              </p:par>
+                            </p:childTnLst>
+                          </p:cTn>
+                        </p:par>
+                      </p:childTnLst>
+                    </p:cTn>
+                  </p:par>
+                  <p:par>
+                    <p:cTn id="21" fill="hold">
+                      <p:stCondLst>
+                        <p:cond delay="indefinite"/>
+                      </p:stCondLst>
+                      <p:childTnLst>
+                        <p:par>
+                          <p:cTn id="22" fill="hold">
+                            <p:stCondLst>
+                              <p:cond delay="0"/>
+                            </p:stCondLst>
+                            <p:childTnLst>
+                              <p:par>
+                                <p:cTn id="23" presetID="1" presetClass="entr" presetSubtype="0" fill="hold" grpId="0" nodeType="clickEffect">
+                                  <p:stCondLst>
+                                    <p:cond delay="0"/>
+                                  </p:stCondLst>
+                                  <p:childTnLst>
+                                    <p:set>
+                                      <p:cBhvr>
+                                        <p:cTn id="24" dur="1" fill="hold">
+                                          <p:stCondLst>
+                                            <p:cond delay="0"/>
+                                          </p:stCondLst>
+                                        </p:cTn>
+                                        <p:tgtEl>
+                                          <p:spTgt spid="12"/>
+                                        </p:tgtEl>
+                                        <p:attrNameLst>
+                                          <p:attrName>style.visibility</p:attrName>
+                                        </p:attrNameLst>
+                                      </p:cBhvr>
+                                      <p:to>
+                                        <p:strVal val="visible"/>
+                                      </p:to>
+                                    </p:set>
+                                  </p:childTnLst>
+                                </p:cTn>
+                              </p:par>
+                              <p:par>
+                                <p:cTn id="25" presetID="1" presetClass="entr" presetSubtype="0" fill="hold" grpId="0" nodeType="withEffect">
+                                  <p:stCondLst>
+                                    <p:cond delay="0"/>
+                                  </p:stCondLst>
+                                  <p:childTnLst>
+                                    <p:set>
+                                      <p:cBhvr>
+                                        <p:cTn id="26" dur="1" fill="hold">
+                                          <p:stCondLst>
+                                            <p:cond delay="0"/>
+                                          </p:stCondLst>
+                                        </p:cTn>
+                                        <p:tgtEl>
+                                          <p:spTgt spid="13"/>
+                                        </p:tgtEl>
+                                        <p:attrNameLst>
+                                          <p:attrName>style.visibility</p:attrName>
+                                        </p:attrNameLst>
+                                      </p:cBhvr>
+                                      <p:to>
+                                        <p:strVal val="visible"/>
+                                      </p:to>
+                                    </p:set>
+                                  </p:childTnLst>
+                                </p:cTn>
+                              </p:par>
+                            </p:childTnLst>
+                          </p:cTn>
+                        </p:par>
+                      </p:childTnLst>
+                    </p:cTn>
+                  </p:par>
+                  <p:par>
+                    <p:cTn id="27" fill="hold">
+                      <p:stCondLst>
+                        <p:cond delay="indefinite"/>
+                      </p:stCondLst>
+                      <p:childTnLst>
+                        <p:par>
+                          <p:cTn id="28" fill="hold">
+                            <p:stCondLst>
+                              <p:cond delay="0"/>
+                            </p:stCondLst>
+                            <p:childTnLst>
+                              <p:par>
+                                <p:cTn id="29" presetID="1" presetClass="entr" presetSubtype="0" fill="hold" grpId="0" nodeType="clickEffect">
+                                  <p:stCondLst>
+                                    <p:cond delay="0"/>
+                                  </p:stCondLst>
+                                  <p:childTnLst>
+                                    <p:set>
+                                      <p:cBhvr>
+                                        <p:cTn id="30" dur="1" fill="hold">
+                                          <p:stCondLst>
+                                            <p:cond delay="0"/>
+                                          </p:stCondLst>
+                                        </p:cTn>
+                                        <p:tgtEl>
+                                          <p:spTgt spid="14"/>
+                                        </p:tgtEl>
+                                        <p:attrNameLst>
+                                          <p:attrName>style.visibility</p:attrName>
+                                        </p:attrNameLst>
+                                      </p:cBhvr>
+                                      <p:to>
+                                        <p:strVal val="visible"/>
+                                      </p:to>
+                                    </p:set>
+                                  </p:childTnLst>
+                                </p:cTn>
+                              </p:par>
+                              <p:par>
+                                <p:cTn id="31" presetID="1" presetClass="entr" presetSubtype="0" fill="hold" grpId="0" nodeType="withEffect">
+                                  <p:stCondLst>
+                                    <p:cond delay="0"/>
+                                  </p:stCondLst>
+                                  <p:childTnLst>
+                                    <p:set>
+                                      <p:cBhvr>
+                                        <p:cTn id="32" dur="1" fill="hold">
+                                          <p:stCondLst>
+                                            <p:cond delay="0"/>
+                                          </p:stCondLst>
+                                        </p:cTn>
+                                        <p:tgtEl>
+                                          <p:spTgt spid="15"/>
+                                        </p:tgtEl>
+                                        <p:attrNameLst>
+                                          <p:attrName>style.visibility</p:attrName>
+                                        </p:attrNameLst>
+                                      </p:cBhvr>
+                                      <p:to>
+                                        <p:strVal val="visible"/>
+                                      </p:to>
+                                    </p:set>
+                                  </p:childTnLst>
+                                </p:cTn>
+                              </p:par>
+                            </p:childTnLst>
+                          </p:cTn>
+                        </p:par>
+                      </p:childTnLst>
+                    </p:cTn>
+                  </p:par>
+                  <p:par>
+                    <p:cTn id="33" fill="hold">
+                      <p:stCondLst>
+                        <p:cond delay="indefinite"/>
+                      </p:stCondLst>
+                      <p:childTnLst>
+                        <p:par>
+                          <p:cTn id="34" fill="hold">
+                            <p:stCondLst>
+                              <p:cond delay="0"/>
+                            </p:stCondLst>
+                            <p:childTnLst>
+                              <p:par>
+                                <p:cTn id="35" presetID="1" presetClass="entr" presetSubtype="0" fill="hold" grpId="0" nodeType="clickEffect">
+                                  <p:stCondLst>
+                                    <p:cond delay="0"/>
+                                  </p:stCondLst>
+                                  <p:childTnLst>
+                                    <p:set>
+                                      <p:cBhvr>
+                                        <p:cTn id="36" dur="1" fill="hold">
+                                          <p:stCondLst>
+                                            <p:cond delay="0"/>
+                                          </p:stCondLst>
+                                        </p:cTn>
+                                        <p:tgtEl>
+                                          <p:spTgt spid="16"/>
+                                        </p:tgtEl>
+                                        <p:attrNameLst>
+                                          <p:attrName>style.visibility</p:attrName>
+                                        </p:attrNameLst>
+                                      </p:cBhvr>
+                                      <p:to>
+                                        <p:strVal val="visible"/>
+                                      </p:to>
+                                    </p:set>
+                                  </p:childTnLst>
+                                </p:cTn>
+                              </p:par>
+                              <p:par>
+                                <p:cTn id="37" presetID="1" presetClass="entr" presetSubtype="0" fill="hold" grpId="0" nodeType="withEffect">
+                                  <p:stCondLst>
+                                    <p:cond delay="0"/>
+                                  </p:stCondLst>
+                                  <p:childTnLst>
+                                    <p:set>
+                                      <p:cBhvr>
+                                        <p:cTn id="38" dur="1" fill="hold">
+                                          <p:stCondLst>
+                                            <p:cond delay="0"/>
+                                          </p:stCondLst>
+                                        </p:cTn>
+                                        <p:tgtEl>
+                                          <p:spTgt spid="17"/>
+                                        </p:tgtEl>
+                                        <p:attrNameLst>
+                                          <p:attrName>style.visibility</p:attrName>
+                                        </p:attrNameLst>
+                                      </p:cBhvr>
+                                      <p:to>
+                                        <p:strVal val="visible"/>
+                                      </p:to>
+                                    </p:set>
+                                  </p:childTnLst>
+                                </p:cTn>
+                              </p:par>
+                            </p:childTnLst>
+                          </p:cTn>
+                        </p:par>
+                      </p:childTnLst>
+                    </p:cTn>
+                  </p:par>
+                  <p:par>
+                    <p:cTn id="39" fill="hold">
+                      <p:stCondLst>
+                        <p:cond delay="indefinite"/>
+                      </p:stCondLst>
+                      <p:childTnLst>
+                        <p:par>
+                          <p:cTn id="40" fill="hold">
+                            <p:stCondLst>
+                              <p:cond delay="0"/>
+                            </p:stCondLst>
+                            <p:childTnLst>
+                              <p:par>
+                                <p:cTn id="41" presetID="1" presetClass="entr" presetSubtype="0" fill="hold" grpId="0" nodeType="clickEffect">
+                                  <p:stCondLst>
+                                    <p:cond delay="0"/>
+                                  </p:stCondLst>
+                                  <p:childTnLst>
+                                    <p:set>
+                                      <p:cBhvr>
+                                        <p:cTn id="42" dur="1" fill="hold">
+                                          <p:stCondLst>
+                                            <p:cond delay="0"/>
+                                          </p:stCondLst>
+                                        </p:cTn>
+                                        <p:tgtEl>
+                                          <p:spTgt spid="18"/>
+                                        </p:tgtEl>
+                                        <p:attrNameLst>
+                                          <p:attrName>style.visibility</p:attrName>
+                                        </p:attrNameLst>
+                                      </p:cBhvr>
+                                      <p:to>
+                                        <p:strVal val="visible"/>
+                                      </p:to>
+                                    </p:set>
+                                  </p:childTnLst>
+                                </p:cTn>
+                              </p:par>
+                              <p:par>
+                                <p:cTn id="43" presetID="1" presetClass="entr" presetSubtype="0" fill="hold" grpId="0" nodeType="withEffect">
+                                  <p:stCondLst>
+                                    <p:cond delay="0"/>
+                                  </p:stCondLst>
+                                  <p:childTnLst>
+                                    <p:set>
+                                      <p:cBhvr>
+                                        <p:cTn id="44" dur="1" fill="hold">
+                                          <p:stCondLst>
+                                            <p:cond delay="0"/>
+                                          </p:stCondLst>
+                                        </p:cTn>
+                                        <p:tgtEl>
+                                          <p:spTgt spid="19"/>
+                                        </p:tgtEl>
+                                        <p:attrNameLst>
+                                          <p:attrName>style.visibility</p:attrName>
+                                        </p:attrNameLst>
+                                      </p:cBhvr>
+                                      <p:to>
+                                        <p:strVal val="visible"/>
+                                      </p:to>
+                                    </p:set>
+                                  </p:childTnLst>
+                                </p:cTn>
+                              </p:par>
+                            </p:childTnLst>
+                          </p:cTn>
+                        </p:par>
+                      </p:childTnLst>
+                    </p:cTn>
+                  </p:par>
+                  <p:par>
+                    <p:cTn id="45" fill="hold">
+                      <p:stCondLst>
+                        <p:cond delay="indefinite"/>
+                      </p:stCondLst>
+                      <p:childTnLst>
+                        <p:par>
+                          <p:cTn id="46" fill="hold">
+                            <p:stCondLst>
+                              <p:cond delay="0"/>
+                            </p:stCondLst>
+                            <p:childTnLst>
+                              <p:par>
+                                <p:cTn id="47" presetID="1" presetClass="entr" presetSubtype="0" fill="hold" nodeType="clickEffect">
+                                  <p:stCondLst>
+                                    <p:cond delay="0"/>
+                                  </p:stCondLst>
+                                  <p:childTnLst>
+                                    <p:set>
+                                      <p:cBhvr>
+                                        <p:cTn id="48" dur="1" fill="hold">
+                                          <p:stCondLst>
+                                            <p:cond delay="0"/>
+                                          </p:stCondLst>
+                                        </p:cTn>
+                                        <p:tgtEl>
+                                          <p:spTgt spid="5122"/>
+                                        </p:tgtEl>
+                                        <p:attrNameLst>
+                                          <p:attrName>style.visibility</p:attrName>
+                                        </p:attrNameLst>
+                                      </p:cBhvr>
+                                      <p:to>
+                                        <p:strVal val="visible"/>
+                                      </p:to>
+                                    </p:set>
+                                  </p:childTnLst>
+                                </p:cTn>
+                              </p:par>
+                            </p:childTnLst>
+                          </p:cTn>
+                        </p:par>
+                      </p:childTnLst>
+                    </p:cTn>
+                  </p:par>
+                  <p:par>
+                    <p:cTn id="49" fill="hold">
+                      <p:stCondLst>
+                        <p:cond delay="indefinite"/>
+                      </p:stCondLst>
+                      <p:childTnLst>
+                        <p:par>
+                          <p:cTn id="50" fill="hold">
+                            <p:stCondLst>
+                              <p:cond delay="0"/>
+                            </p:stCondLst>
+                            <p:childTnLst>
+                              <p:par>
+                                <p:cTn id="51" presetID="1" presetClass="entr" presetSubtype="0" fill="hold" nodeType="clickEffect">
+                                  <p:stCondLst>
+                                    <p:cond delay="0"/>
+                                  </p:stCondLst>
+                                  <p:childTnLst>
+                                    <p:set>
+                                      <p:cBhvr>
+                                        <p:cTn id="52" dur="1" fill="hold">
+                                          <p:stCondLst>
+                                            <p:cond delay="0"/>
+                                          </p:stCondLst>
+                                        </p:cTn>
+                                        <p:tgtEl>
+                                          <p:spTgt spid="5124"/>
+                                        </p:tgtEl>
+                                        <p:attrNameLst>
+                                          <p:attrName>style.visibility</p:attrName>
+                                        </p:attrNameLst>
+                                      </p:cBhvr>
+                                      <p:to>
+                                        <p:strVal val="visible"/>
+                                      </p:to>
+                                    </p:set>
+                                  </p:childTnLst>
+                                </p:cTn>
+                              </p:par>
+                            </p:childTnLst>
+                          </p:cTn>
+                        </p:par>
+                      </p:childTnLst>
+                    </p:cTn>
+                  </p:par>
+                  <p:par>
+                    <p:cTn id="53" fill="hold">
+                      <p:stCondLst>
+                        <p:cond delay="indefinite"/>
+                      </p:stCondLst>
+                      <p:childTnLst>
+                        <p:par>
+                          <p:cTn id="54" fill="hold">
+                            <p:stCondLst>
+                              <p:cond delay="0"/>
+                            </p:stCondLst>
+                            <p:childTnLst>
+                              <p:par>
+                                <p:cTn id="55" presetID="1" presetClass="entr" presetSubtype="0" fill="hold" nodeType="clickEffect">
+                                  <p:stCondLst>
+                                    <p:cond delay="0"/>
+                                  </p:stCondLst>
+                                  <p:childTnLst>
+                                    <p:set>
+                                      <p:cBhvr>
+                                        <p:cTn id="56" dur="1" fill="hold">
+                                          <p:stCondLst>
+                                            <p:cond delay="0"/>
+                                          </p:stCondLst>
+                                        </p:cTn>
+                                        <p:tgtEl>
+                                          <p:spTgt spid="5125"/>
+                                        </p:tgtEl>
+                                        <p:attrNameLst>
+                                          <p:attrName>style.visibility</p:attrName>
+                                        </p:attrNameLst>
+                                      </p:cBhvr>
+                                      <p:to>
+                                        <p:strVal val="visible"/>
+                                      </p:to>
+                                    </p:set>
+                                  </p:childTnLst>
+                                </p:cTn>
+                              </p:par>
+                            </p:childTnLst>
+                          </p:cTn>
+                        </p:par>
+                      </p:childTnLst>
+                    </p:cTn>
+                  </p:par>
+                  <p:par>
+                    <p:cTn id="57" fill="hold">
+                      <p:stCondLst>
+                        <p:cond delay="indefinite"/>
+                      </p:stCondLst>
+                      <p:childTnLst>
+                        <p:par>
+                          <p:cTn id="58" fill="hold">
+                            <p:stCondLst>
+                              <p:cond delay="0"/>
+                            </p:stCondLst>
+                            <p:childTnLst>
+                              <p:par>
+                                <p:cTn id="59" presetID="1" presetClass="entr" presetSubtype="0" fill="hold" grpId="0" nodeType="clickEffect">
+                                  <p:stCondLst>
+                                    <p:cond delay="0"/>
+                                  </p:stCondLst>
+                                  <p:childTnLst>
+                                    <p:set>
+                                      <p:cBhvr>
+                                        <p:cTn id="60" dur="1" fill="hold">
+                                          <p:stCondLst>
+                                            <p:cond delay="0"/>
+                                          </p:stCondLst>
+                                        </p:cTn>
+                                        <p:tgtEl>
+                                          <p:spTgt spid="23"/>
+                                        </p:tgtEl>
+                                        <p:attrNameLst>
+                                          <p:attrName>style.visibility</p:attrName>
+                                        </p:attrNameLst>
+                                      </p:cBhvr>
+                                      <p:to>
+                                        <p:strVal val="visible"/>
+                                      </p:to>
+                                    </p:set>
+                                  </p:childTnLst>
+                                </p:cTn>
+                              </p:par>
+                            </p:childTnLst>
+                          </p:cTn>
+                        </p:par>
+                      </p:childTnLst>
+                    </p:cTn>
+                  </p:par>
+                </p:childTnLst>
+              </p:cTn>
+              <p:prevCondLst>
+                <p:cond evt="onPrev" delay="0">
+                  <p:tgtEl>
+                    <p:sldTgt/>
+                  </p:tgtEl>
+                </p:cond>
+              </p:prevCondLst>
+              <p:nextCondLst>
+                <p:cond evt="onNext" delay="0">
+                  <p:tgtEl>
+                    <p:sldTgt/>
+                  </p:tgtEl>
+                </p:cond>
+              </p:nextCondLst>
+            </p:seq>
+          </p:childTnLst>
+        </p:cTn>
+      </p:par>
+    </p:tnLst>
+    <p:bldLst>
+      <p:bldP spid="6" grpId="0"/>
+      <p:bldP spid="7" grpId="0"/>
+      <p:bldP spid="8" grpId="0"/>
+      <p:bldP spid="9" grpId="0"/>
+      <p:bldP spid="10" grpId="0"/>
+      <p:bldP spid="11" grpId="0"/>
+      <p:bldP spid="12" grpId="0"/>
+      <p:bldP spid="13" grpId="0"/>
+      <p:bldP spid="14" grpId="0"/>
+      <p:bldP spid="15" grpId="0"/>
+      <p:bldP spid="16" grpId="0"/>
+      <p:bldP spid="17" grpId="0"/>
+      <p:bldP spid="18" grpId="0"/>
+      <p:bldP spid="19" grpId="0"/>
+      <p:bldP spid="23" grpId="0" animBg="1"/>
+    </p:bldLst>
+  </p:timing>
+</p:sld>
+</file>
+
+<file path=ppt/slides/slide48.xml><?xml version="1.0" encoding="utf-8"?>
 <p:sld xmlns:a="http://schemas.openxmlformats.org/drawingml/2006/main" xmlns:r="http://schemas.openxmlformats.org/officeDocument/2006/relationships" xmlns:p="http://schemas.openxmlformats.org/presentationml/2006/main">
   <p:cSld>
     <p:spTree>

</xml_diff>

<commit_message>
Added PCOMP, fixed typo in SqBeam44.mac
</commit_message>
<xml_diff>
--- a/Macro-Mania.pptx
+++ b/Macro-Mania.pptx
@@ -8710,11 +8710,7 @@
           <a:p>
             <a:r>
               <a:rPr lang="en-US" sz="1100" dirty="0" smtClean="0"/>
-              <a:t>I have one of the extra buttons on my mouse set to “return” that way in order to quickly refresh the screen, all I have to do is type “g” and press a button, </a:t>
-            </a:r>
-            <a:r>
-              <a:rPr lang="en-US" sz="1100" dirty="0" smtClean="0"/>
-              <a:t>Hooray Laziness!</a:t>
+              <a:t>I have one of the extra buttons on my mouse set to “return” that way in order to quickly refresh the screen, all I have to do is type “g” and press a button, Hooray Laziness!</a:t>
             </a:r>
             <a:endParaRPr lang="en-US" sz="1100" dirty="0"/>
           </a:p>
@@ -9806,7 +9802,6 @@
               <a:rPr lang="en-US" sz="1600" i="1" dirty="0" smtClean="0"/>
               <a:t>Creates Circular Beam 44 Element</a:t>
             </a:r>
-            <a:endParaRPr lang="en-US" sz="1600" i="1" dirty="0" smtClean="0"/>
           </a:p>
         </p:txBody>
       </p:sp>
@@ -9872,7 +9867,6 @@
               <a:rPr lang="en-US" sz="1400" dirty="0" smtClean="0"/>
               <a:t>Resulting Type, Real (and Material Number if Material is specified)</a:t>
             </a:r>
-            <a:endParaRPr lang="en-US" sz="1400" dirty="0" smtClean="0"/>
           </a:p>
         </p:txBody>
       </p:sp>
@@ -9905,7 +9899,6 @@
               <a:rPr lang="en-US" sz="1400" b="1" dirty="0" smtClean="0"/>
               <a:t>Area</a:t>
             </a:r>
-            <a:endParaRPr lang="en-US" sz="1400" b="1" dirty="0" smtClean="0"/>
           </a:p>
         </p:txBody>
       </p:sp>
@@ -9938,7 +9931,6 @@
               <a:rPr lang="en-US" sz="1400" dirty="0" smtClean="0"/>
               <a:t>X-Sectional Area</a:t>
             </a:r>
-            <a:endParaRPr lang="en-US" sz="1400" dirty="0" smtClean="0"/>
           </a:p>
         </p:txBody>
       </p:sp>
@@ -10008,7 +10000,6 @@
               <a:rPr lang="en-US" sz="1400" dirty="0" smtClean="0"/>
               <a:t> Moment of Inertia </a:t>
             </a:r>
-            <a:endParaRPr lang="en-US" sz="1400" dirty="0" smtClean="0"/>
           </a:p>
         </p:txBody>
       </p:sp>
@@ -10041,7 +10032,6 @@
               <a:rPr lang="en-US" sz="1400" b="1" dirty="0" smtClean="0"/>
               <a:t>Material</a:t>
             </a:r>
-            <a:endParaRPr lang="en-US" sz="1400" b="1" dirty="0" smtClean="0"/>
           </a:p>
         </p:txBody>
       </p:sp>
@@ -10074,7 +10064,6 @@
               <a:rPr lang="en-US" sz="1400" dirty="0" smtClean="0"/>
               <a:t>See _MAT.mac</a:t>
             </a:r>
-            <a:endParaRPr lang="en-US" sz="1400" dirty="0" smtClean="0"/>
           </a:p>
         </p:txBody>
       </p:sp>
@@ -10179,11 +10168,6 @@
               </a:rPr>
               <a:t> = 8.1 </a:t>
             </a:r>
-            <a:endParaRPr lang="en-US" sz="1400" b="1" dirty="0" smtClean="0">
-              <a:solidFill>
-                <a:srgbClr val="00B050"/>
-              </a:solidFill>
-            </a:endParaRPr>
           </a:p>
         </p:txBody>
       </p:sp>
@@ -10216,7 +10200,6 @@
               <a:rPr lang="en-US" sz="1400" b="1" dirty="0" smtClean="0"/>
               <a:t>Example</a:t>
             </a:r>
-            <a:endParaRPr lang="en-US" sz="1400" b="1" dirty="0" smtClean="0"/>
           </a:p>
         </p:txBody>
       </p:sp>
@@ -10265,7 +10248,6 @@
               <a:rPr lang="en-US" sz="1400" dirty="0" smtClean="0"/>
               <a:t> SqBeam44.mac &amp; CirBeam44.mac</a:t>
             </a:r>
-            <a:endParaRPr lang="en-US" sz="1400" dirty="0" smtClean="0"/>
           </a:p>
         </p:txBody>
       </p:sp>
@@ -10331,7 +10313,6 @@
               <a:rPr lang="en-US" sz="1400" dirty="0" smtClean="0"/>
               <a:t>Bending Moment of Inertia about Y - axis </a:t>
             </a:r>
-            <a:endParaRPr lang="en-US" sz="1400" dirty="0" smtClean="0"/>
           </a:p>
         </p:txBody>
       </p:sp>
@@ -10397,7 +10378,6 @@
               <a:rPr lang="en-US" sz="1400" dirty="0" smtClean="0"/>
               <a:t>Bending Moment of Inertia about Z - axis </a:t>
             </a:r>
-            <a:endParaRPr lang="en-US" sz="1400" dirty="0" smtClean="0"/>
           </a:p>
         </p:txBody>
       </p:sp>
@@ -41485,7 +41465,6 @@
               <a:rPr lang="en-US" sz="1400" dirty="0" smtClean="0"/>
               <a:t>Sets background to white and optionally shrinks viewing window. </a:t>
             </a:r>
-            <a:endParaRPr lang="en-US" sz="1400" dirty="0" smtClean="0"/>
           </a:p>
         </p:txBody>
       </p:sp>
@@ -41566,11 +41545,6 @@
               </a:rPr>
               <a:t>, 1</a:t>
             </a:r>
-            <a:endParaRPr lang="en-US" sz="1400" b="1" dirty="0" smtClean="0">
-              <a:solidFill>
-                <a:schemeClr val="bg1"/>
-              </a:solidFill>
-            </a:endParaRPr>
           </a:p>
         </p:txBody>
       </p:sp>
@@ -41936,7 +41910,6 @@
               <a:rPr lang="en-US" sz="1400" dirty="0" smtClean="0"/>
               <a:t>Resets Window back to black background and full size</a:t>
             </a:r>
-            <a:endParaRPr lang="en-US" sz="1400" dirty="0" smtClean="0"/>
           </a:p>
         </p:txBody>
       </p:sp>
@@ -42183,11 +42156,7 @@
             <a:pPr algn="r"/>
             <a:r>
               <a:rPr lang="en-US" dirty="0" smtClean="0"/>
-              <a:t>“Think: </a:t>
-            </a:r>
-            <a:r>
-              <a:rPr lang="en-US" dirty="0" smtClean="0"/>
-              <a:t>Sandwich Structure</a:t>
+              <a:t>“Think: Sandwich Structure</a:t>
             </a:r>
             <a:r>
               <a:rPr lang="en-US" dirty="0" smtClean="0">
@@ -42201,11 +42170,7 @@
             </a:r>
             <a:r>
               <a:rPr lang="en-US" dirty="0" smtClean="0"/>
-              <a:t>ling</a:t>
-            </a:r>
-            <a:r>
-              <a:rPr lang="en-US" dirty="0" smtClean="0"/>
-              <a:t>”</a:t>
+              <a:t>ling”</a:t>
             </a:r>
             <a:endParaRPr lang="en-US" dirty="0"/>
           </a:p>
@@ -42274,7 +42239,6 @@
               <a:rPr lang="en-US" sz="1400" dirty="0" smtClean="0"/>
               <a:t>Calculates Composite Sandwich Structure Buckling </a:t>
             </a:r>
-            <a:endParaRPr lang="en-US" sz="1400" dirty="0" smtClean="0"/>
           </a:p>
         </p:txBody>
       </p:sp>
@@ -42326,21 +42290,12 @@
             </a:r>
             <a:r>
               <a:rPr lang="en-US" sz="1400" dirty="0" err="1" smtClean="0"/>
-              <a:t>faceshee</a:t>
-            </a:r>
-            <a:r>
-              <a:rPr lang="en-US" sz="1400" dirty="0" err="1" smtClean="0"/>
-              <a:t>t</a:t>
+              <a:t>facesheet</a:t>
             </a:r>
             <a:r>
               <a:rPr lang="en-US" sz="1400" dirty="0" smtClean="0"/>
-              <a:t> </a:t>
-            </a:r>
-            <a:r>
-              <a:rPr lang="en-US" sz="1400" dirty="0" smtClean="0"/>
-              <a:t>stiffness for every element…</a:t>
-            </a:r>
-            <a:endParaRPr lang="en-US" sz="1400" dirty="0" smtClean="0"/>
+              <a:t> stiffness for every element…</a:t>
+            </a:r>
           </a:p>
         </p:txBody>
       </p:sp>
@@ -42373,7 +42328,6 @@
               <a:rPr lang="en-US" sz="1400" b="1" dirty="0" smtClean="0"/>
               <a:t>Cell Size</a:t>
             </a:r>
-            <a:endParaRPr lang="en-US" sz="1400" b="1" dirty="0" smtClean="0"/>
           </a:p>
         </p:txBody>
       </p:sp>
@@ -42429,7 +42383,6 @@
               <a:rPr lang="en-US" sz="1400" b="1" dirty="0" smtClean="0"/>
               <a:t>Doesn’t Work For Shell91!!!</a:t>
             </a:r>
-            <a:endParaRPr lang="en-US" sz="1400" b="1" dirty="0" smtClean="0"/>
           </a:p>
         </p:txBody>
       </p:sp>
@@ -42462,7 +42415,6 @@
               <a:rPr lang="en-US" sz="1400" dirty="0" smtClean="0"/>
               <a:t>Cell Size of Honeycomb core</a:t>
             </a:r>
-            <a:endParaRPr lang="en-US" sz="1400" dirty="0" smtClean="0"/>
           </a:p>
         </p:txBody>
       </p:sp>
@@ -42628,7 +42580,6 @@
               <a:rPr lang="en-US" sz="1400" b="1" dirty="0" smtClean="0"/>
               <a:t>Display Results</a:t>
             </a:r>
-            <a:endParaRPr lang="en-US" sz="1400" b="1" dirty="0" smtClean="0"/>
           </a:p>
         </p:txBody>
       </p:sp>
@@ -42889,7 +42840,6 @@
               <a:rPr lang="en-US" sz="1400" b="1" dirty="0" smtClean="0"/>
               <a:t>Calculations</a:t>
             </a:r>
-            <a:endParaRPr lang="en-US" sz="1400" b="1" dirty="0" smtClean="0"/>
           </a:p>
         </p:txBody>
       </p:sp>
@@ -43580,7 +43530,6 @@
               <a:rPr lang="en-US" sz="1600" i="1" dirty="0" smtClean="0"/>
               <a:t>Creates Circular Beam 44 Element</a:t>
             </a:r>
-            <a:endParaRPr lang="en-US" sz="1600" i="1" dirty="0" smtClean="0"/>
           </a:p>
         </p:txBody>
       </p:sp>
@@ -43646,7 +43595,6 @@
               <a:rPr lang="en-US" sz="1400" dirty="0" smtClean="0"/>
               <a:t>Resulting Type, Real (and Material Number if Material is specified)</a:t>
             </a:r>
-            <a:endParaRPr lang="en-US" sz="1400" dirty="0" smtClean="0"/>
           </a:p>
         </p:txBody>
       </p:sp>
@@ -43679,7 +43627,6 @@
               <a:rPr lang="en-US" sz="1400" b="1" dirty="0" smtClean="0"/>
               <a:t>Outer Diameter</a:t>
             </a:r>
-            <a:endParaRPr lang="en-US" sz="1400" b="1" dirty="0" smtClean="0"/>
           </a:p>
         </p:txBody>
       </p:sp>
@@ -43712,7 +43659,6 @@
               <a:rPr lang="en-US" sz="1400" dirty="0" smtClean="0"/>
               <a:t>Circular Beam outer diameter</a:t>
             </a:r>
-            <a:endParaRPr lang="en-US" sz="1400" dirty="0" smtClean="0"/>
           </a:p>
         </p:txBody>
       </p:sp>
@@ -43745,7 +43691,6 @@
               <a:rPr lang="en-US" sz="1400" b="1" dirty="0" smtClean="0"/>
               <a:t>Thickness</a:t>
             </a:r>
-            <a:endParaRPr lang="en-US" sz="1400" b="1" dirty="0" smtClean="0"/>
           </a:p>
         </p:txBody>
       </p:sp>
@@ -43778,7 +43723,6 @@
               <a:rPr lang="en-US" sz="1400" dirty="0" smtClean="0"/>
               <a:t>Tube wall thickness (default = ½ Outer Diameter)</a:t>
             </a:r>
-            <a:endParaRPr lang="en-US" sz="1400" dirty="0" smtClean="0"/>
           </a:p>
         </p:txBody>
       </p:sp>
@@ -44116,7 +44060,6 @@
               <a:rPr lang="en-US" sz="1400" b="1" dirty="0" smtClean="0"/>
               <a:t>Material</a:t>
             </a:r>
-            <a:endParaRPr lang="en-US" sz="1400" b="1" dirty="0" smtClean="0"/>
           </a:p>
         </p:txBody>
       </p:sp>
@@ -44149,7 +44092,6 @@
               <a:rPr lang="en-US" sz="1400" dirty="0" smtClean="0"/>
               <a:t>See _MAT.mac</a:t>
             </a:r>
-            <a:endParaRPr lang="en-US" sz="1400" dirty="0" smtClean="0"/>
           </a:p>
         </p:txBody>
       </p:sp>
@@ -44206,11 +44148,6 @@
               </a:rPr>
               <a:t>!Circular Aluminum Beam, Diameter = 1.25”, Wall thickness = 0.25”</a:t>
             </a:r>
-            <a:endParaRPr lang="en-US" sz="1400" b="1" dirty="0" smtClean="0">
-              <a:solidFill>
-                <a:srgbClr val="00B050"/>
-              </a:solidFill>
-            </a:endParaRPr>
           </a:p>
         </p:txBody>
       </p:sp>
@@ -44243,7 +44180,6 @@
               <a:rPr lang="en-US" sz="1400" b="1" dirty="0" smtClean="0"/>
               <a:t>Example</a:t>
             </a:r>
-            <a:endParaRPr lang="en-US" sz="1400" b="1" dirty="0" smtClean="0"/>
           </a:p>
         </p:txBody>
       </p:sp>
@@ -44292,7 +44228,6 @@
               <a:rPr lang="en-US" sz="1400" dirty="0" smtClean="0"/>
               <a:t> SqBeam44.mac &amp; _Beam44.mac</a:t>
             </a:r>
-            <a:endParaRPr lang="en-US" sz="1400" dirty="0" smtClean="0"/>
           </a:p>
         </p:txBody>
       </p:sp>

</xml_diff>

<commit_message>
Added ability to combign multiple runs for BUCK.mac
</commit_message>
<xml_diff>
--- a/Macro-Mania.pptx
+++ b/Macro-Mania.pptx
@@ -10110,7 +10110,15 @@
                   <a:schemeClr val="bg1"/>
                 </a:solidFill>
               </a:rPr>
-              <a:t>, 10, 1.1, 4.25, 8.1, 8.1, 802   </a:t>
+              <a:t>, 10, 1.1, 4.25, 8.1, 8.1, </a:t>
+            </a:r>
+            <a:r>
+              <a:rPr lang="en-US" sz="1400" b="1" dirty="0" smtClean="0">
+                <a:solidFill>
+                  <a:schemeClr val="bg1"/>
+                </a:solidFill>
+              </a:rPr>
+              <a:t>44 </a:t>
             </a:r>
             <a:r>
               <a:rPr lang="en-US" sz="1400" b="1" dirty="0" smtClean="0">
@@ -10118,7 +10126,15 @@
                   <a:srgbClr val="00B050"/>
                 </a:solidFill>
               </a:rPr>
-              <a:t>!General Aluminum Beam, A = 1.1, </a:t>
+              <a:t>!Material 44 Beam</a:t>
+            </a:r>
+            <a:r>
+              <a:rPr lang="en-US" sz="1400" b="1" dirty="0" smtClean="0">
+                <a:solidFill>
+                  <a:srgbClr val="00B050"/>
+                </a:solidFill>
+              </a:rPr>
+              <a:t>, A = 1.1, </a:t>
             </a:r>
             <a:r>
               <a:rPr lang="en-US" sz="1400" b="1" dirty="0" err="1" smtClean="0">

</xml_diff>